<commit_message>
Edited the tasks document with some more defined instructions Added the helloworld.py program as starter task code (removed line that places diamond block)
</commit_message>
<xml_diff>
--- a/programming_challenge/tasks.horizontal.pptx
+++ b/programming_challenge/tasks.horizontal.pptx
@@ -4,6 +4,9 @@
   <p:sldMasterIdLst>
     <p:sldMasterId id="2147483672" r:id="rId1"/>
   </p:sldMasterIdLst>
+  <p:notesMasterIdLst>
+    <p:notesMasterId r:id="rId3"/>
+  </p:notesMasterIdLst>
   <p:sldIdLst>
     <p:sldId id="257" r:id="rId2"/>
   </p:sldIdLst>
@@ -112,6 +115,356 @@
 </p:presentation>
 </file>
 
+<file path=ppt/notesMasters/notesMaster1.xml><?xml version="1.0" encoding="utf-8"?>
+<p:notesMaster xmlns:a="http://schemas.openxmlformats.org/drawingml/2006/main" xmlns:r="http://schemas.openxmlformats.org/officeDocument/2006/relationships" xmlns:p="http://schemas.openxmlformats.org/presentationml/2006/main">
+  <p:cSld>
+    <p:bg>
+      <p:bgRef idx="1001">
+        <a:schemeClr val="bg1"/>
+      </p:bgRef>
+    </p:bg>
+    <p:spTree>
+      <p:nvGrpSpPr>
+        <p:cNvPr id="1" name=""/>
+        <p:cNvGrpSpPr/>
+        <p:nvPr/>
+      </p:nvGrpSpPr>
+      <p:grpSpPr>
+        <a:xfrm>
+          <a:off x="0" y="0"/>
+          <a:ext cx="0" cy="0"/>
+          <a:chOff x="0" y="0"/>
+          <a:chExt cx="0" cy="0"/>
+        </a:xfrm>
+      </p:grpSpPr>
+      <p:sp>
+        <p:nvSpPr>
+          <p:cNvPr id="2" name="Header Placeholder 1"/>
+          <p:cNvSpPr>
+            <a:spLocks noGrp="1"/>
+          </p:cNvSpPr>
+          <p:nvPr>
+            <p:ph type="hdr" sz="quarter"/>
+          </p:nvPr>
+        </p:nvSpPr>
+        <p:spPr>
+          <a:xfrm>
+            <a:off x="0" y="0"/>
+            <a:ext cx="2971800" cy="458788"/>
+          </a:xfrm>
+          <a:prstGeom prst="rect">
+            <a:avLst/>
+          </a:prstGeom>
+        </p:spPr>
+        <p:txBody>
+          <a:bodyPr vert="horz" lIns="91440" tIns="45720" rIns="91440" bIns="45720" rtlCol="0"/>
+          <a:lstStyle>
+            <a:lvl1pPr algn="l">
+              <a:defRPr sz="1200"/>
+            </a:lvl1pPr>
+          </a:lstStyle>
+          <a:p>
+            <a:endParaRPr lang="en-US"/>
+          </a:p>
+        </p:txBody>
+      </p:sp>
+      <p:sp>
+        <p:nvSpPr>
+          <p:cNvPr id="3" name="Date Placeholder 2"/>
+          <p:cNvSpPr>
+            <a:spLocks noGrp="1"/>
+          </p:cNvSpPr>
+          <p:nvPr>
+            <p:ph type="dt" idx="1"/>
+          </p:nvPr>
+        </p:nvSpPr>
+        <p:spPr>
+          <a:xfrm>
+            <a:off x="3884613" y="0"/>
+            <a:ext cx="2971800" cy="458788"/>
+          </a:xfrm>
+          <a:prstGeom prst="rect">
+            <a:avLst/>
+          </a:prstGeom>
+        </p:spPr>
+        <p:txBody>
+          <a:bodyPr vert="horz" lIns="91440" tIns="45720" rIns="91440" bIns="45720" rtlCol="0"/>
+          <a:lstStyle>
+            <a:lvl1pPr algn="r">
+              <a:defRPr sz="1200"/>
+            </a:lvl1pPr>
+          </a:lstStyle>
+          <a:p>
+            <a:fld id="{227BA57D-FEB7-7D40-AB44-A416CA343704}" type="datetimeFigureOut">
+              <a:rPr lang="en-US" smtClean="0"/>
+              <a:t>2/13/17</a:t>
+            </a:fld>
+            <a:endParaRPr lang="en-US"/>
+          </a:p>
+        </p:txBody>
+      </p:sp>
+      <p:sp>
+        <p:nvSpPr>
+          <p:cNvPr id="4" name="Slide Image Placeholder 3"/>
+          <p:cNvSpPr>
+            <a:spLocks noGrp="1" noRot="1" noChangeAspect="1"/>
+          </p:cNvSpPr>
+          <p:nvPr>
+            <p:ph type="sldImg" idx="2"/>
+          </p:nvPr>
+        </p:nvSpPr>
+        <p:spPr>
+          <a:xfrm>
+            <a:off x="685800" y="1143000"/>
+            <a:ext cx="5486400" cy="3086100"/>
+          </a:xfrm>
+          <a:prstGeom prst="rect">
+            <a:avLst/>
+          </a:prstGeom>
+          <a:noFill/>
+          <a:ln w="12700">
+            <a:solidFill>
+              <a:prstClr val="black"/>
+            </a:solidFill>
+          </a:ln>
+        </p:spPr>
+        <p:txBody>
+          <a:bodyPr vert="horz" lIns="91440" tIns="45720" rIns="91440" bIns="45720" rtlCol="0" anchor="ctr"/>
+          <a:lstStyle/>
+          <a:p>
+            <a:endParaRPr lang="en-US"/>
+          </a:p>
+        </p:txBody>
+      </p:sp>
+      <p:sp>
+        <p:nvSpPr>
+          <p:cNvPr id="5" name="Notes Placeholder 4"/>
+          <p:cNvSpPr>
+            <a:spLocks noGrp="1"/>
+          </p:cNvSpPr>
+          <p:nvPr>
+            <p:ph type="body" sz="quarter" idx="3"/>
+          </p:nvPr>
+        </p:nvSpPr>
+        <p:spPr>
+          <a:xfrm>
+            <a:off x="685800" y="4400550"/>
+            <a:ext cx="5486400" cy="3600450"/>
+          </a:xfrm>
+          <a:prstGeom prst="rect">
+            <a:avLst/>
+          </a:prstGeom>
+        </p:spPr>
+        <p:txBody>
+          <a:bodyPr vert="horz" lIns="91440" tIns="45720" rIns="91440" bIns="45720" rtlCol="0"/>
+          <a:lstStyle/>
+          <a:p>
+            <a:pPr lvl="0"/>
+            <a:r>
+              <a:rPr lang="en-US" smtClean="0"/>
+              <a:t>Click to edit Master text styles</a:t>
+            </a:r>
+          </a:p>
+          <a:p>
+            <a:pPr lvl="1"/>
+            <a:r>
+              <a:rPr lang="en-US" smtClean="0"/>
+              <a:t>Second level</a:t>
+            </a:r>
+          </a:p>
+          <a:p>
+            <a:pPr lvl="2"/>
+            <a:r>
+              <a:rPr lang="en-US" smtClean="0"/>
+              <a:t>Third level</a:t>
+            </a:r>
+          </a:p>
+          <a:p>
+            <a:pPr lvl="3"/>
+            <a:r>
+              <a:rPr lang="en-US" smtClean="0"/>
+              <a:t>Fourth level</a:t>
+            </a:r>
+          </a:p>
+          <a:p>
+            <a:pPr lvl="4"/>
+            <a:r>
+              <a:rPr lang="en-US" smtClean="0"/>
+              <a:t>Fifth level</a:t>
+            </a:r>
+            <a:endParaRPr lang="en-US"/>
+          </a:p>
+        </p:txBody>
+      </p:sp>
+      <p:sp>
+        <p:nvSpPr>
+          <p:cNvPr id="6" name="Footer Placeholder 5"/>
+          <p:cNvSpPr>
+            <a:spLocks noGrp="1"/>
+          </p:cNvSpPr>
+          <p:nvPr>
+            <p:ph type="ftr" sz="quarter" idx="4"/>
+          </p:nvPr>
+        </p:nvSpPr>
+        <p:spPr>
+          <a:xfrm>
+            <a:off x="0" y="8685213"/>
+            <a:ext cx="2971800" cy="458787"/>
+          </a:xfrm>
+          <a:prstGeom prst="rect">
+            <a:avLst/>
+          </a:prstGeom>
+        </p:spPr>
+        <p:txBody>
+          <a:bodyPr vert="horz" lIns="91440" tIns="45720" rIns="91440" bIns="45720" rtlCol="0" anchor="b"/>
+          <a:lstStyle>
+            <a:lvl1pPr algn="l">
+              <a:defRPr sz="1200"/>
+            </a:lvl1pPr>
+          </a:lstStyle>
+          <a:p>
+            <a:endParaRPr lang="en-US"/>
+          </a:p>
+        </p:txBody>
+      </p:sp>
+      <p:sp>
+        <p:nvSpPr>
+          <p:cNvPr id="7" name="Slide Number Placeholder 6"/>
+          <p:cNvSpPr>
+            <a:spLocks noGrp="1"/>
+          </p:cNvSpPr>
+          <p:nvPr>
+            <p:ph type="sldNum" sz="quarter" idx="5"/>
+          </p:nvPr>
+        </p:nvSpPr>
+        <p:spPr>
+          <a:xfrm>
+            <a:off x="3884613" y="8685213"/>
+            <a:ext cx="2971800" cy="458787"/>
+          </a:xfrm>
+          <a:prstGeom prst="rect">
+            <a:avLst/>
+          </a:prstGeom>
+        </p:spPr>
+        <p:txBody>
+          <a:bodyPr vert="horz" lIns="91440" tIns="45720" rIns="91440" bIns="45720" rtlCol="0" anchor="b"/>
+          <a:lstStyle>
+            <a:lvl1pPr algn="r">
+              <a:defRPr sz="1200"/>
+            </a:lvl1pPr>
+          </a:lstStyle>
+          <a:p>
+            <a:fld id="{BEE34F27-6021-D64F-A54A-64FD9165EC91}" type="slidenum">
+              <a:rPr lang="en-US" smtClean="0"/>
+              <a:t>‹#›</a:t>
+            </a:fld>
+            <a:endParaRPr lang="en-US"/>
+          </a:p>
+        </p:txBody>
+      </p:sp>
+    </p:spTree>
+    <p:extLst>
+      <p:ext uri="{BB962C8B-B14F-4D97-AF65-F5344CB8AC3E}">
+        <p14:creationId xmlns:p14="http://schemas.microsoft.com/office/powerpoint/2010/main" val="537070193"/>
+      </p:ext>
+    </p:extLst>
+  </p:cSld>
+  <p:clrMap bg1="lt1" tx1="dk1" bg2="lt2" tx2="dk2" accent1="accent1" accent2="accent2" accent3="accent3" accent4="accent4" accent5="accent5" accent6="accent6" hlink="hlink" folHlink="folHlink"/>
+  <p:notesStyle>
+    <a:lvl1pPr marL="0" algn="l" defTabSz="914400" rtl="0" eaLnBrk="1" latinLnBrk="0" hangingPunct="1">
+      <a:defRPr sz="1200" kern="1200">
+        <a:solidFill>
+          <a:schemeClr val="tx1"/>
+        </a:solidFill>
+        <a:latin typeface="+mn-lt"/>
+        <a:ea typeface="+mn-ea"/>
+        <a:cs typeface="+mn-cs"/>
+      </a:defRPr>
+    </a:lvl1pPr>
+    <a:lvl2pPr marL="457200" algn="l" defTabSz="914400" rtl="0" eaLnBrk="1" latinLnBrk="0" hangingPunct="1">
+      <a:defRPr sz="1200" kern="1200">
+        <a:solidFill>
+          <a:schemeClr val="tx1"/>
+        </a:solidFill>
+        <a:latin typeface="+mn-lt"/>
+        <a:ea typeface="+mn-ea"/>
+        <a:cs typeface="+mn-cs"/>
+      </a:defRPr>
+    </a:lvl2pPr>
+    <a:lvl3pPr marL="914400" algn="l" defTabSz="914400" rtl="0" eaLnBrk="1" latinLnBrk="0" hangingPunct="1">
+      <a:defRPr sz="1200" kern="1200">
+        <a:solidFill>
+          <a:schemeClr val="tx1"/>
+        </a:solidFill>
+        <a:latin typeface="+mn-lt"/>
+        <a:ea typeface="+mn-ea"/>
+        <a:cs typeface="+mn-cs"/>
+      </a:defRPr>
+    </a:lvl3pPr>
+    <a:lvl4pPr marL="1371600" algn="l" defTabSz="914400" rtl="0" eaLnBrk="1" latinLnBrk="0" hangingPunct="1">
+      <a:defRPr sz="1200" kern="1200">
+        <a:solidFill>
+          <a:schemeClr val="tx1"/>
+        </a:solidFill>
+        <a:latin typeface="+mn-lt"/>
+        <a:ea typeface="+mn-ea"/>
+        <a:cs typeface="+mn-cs"/>
+      </a:defRPr>
+    </a:lvl4pPr>
+    <a:lvl5pPr marL="1828800" algn="l" defTabSz="914400" rtl="0" eaLnBrk="1" latinLnBrk="0" hangingPunct="1">
+      <a:defRPr sz="1200" kern="1200">
+        <a:solidFill>
+          <a:schemeClr val="tx1"/>
+        </a:solidFill>
+        <a:latin typeface="+mn-lt"/>
+        <a:ea typeface="+mn-ea"/>
+        <a:cs typeface="+mn-cs"/>
+      </a:defRPr>
+    </a:lvl5pPr>
+    <a:lvl6pPr marL="2286000" algn="l" defTabSz="914400" rtl="0" eaLnBrk="1" latinLnBrk="0" hangingPunct="1">
+      <a:defRPr sz="1200" kern="1200">
+        <a:solidFill>
+          <a:schemeClr val="tx1"/>
+        </a:solidFill>
+        <a:latin typeface="+mn-lt"/>
+        <a:ea typeface="+mn-ea"/>
+        <a:cs typeface="+mn-cs"/>
+      </a:defRPr>
+    </a:lvl6pPr>
+    <a:lvl7pPr marL="2743200" algn="l" defTabSz="914400" rtl="0" eaLnBrk="1" latinLnBrk="0" hangingPunct="1">
+      <a:defRPr sz="1200" kern="1200">
+        <a:solidFill>
+          <a:schemeClr val="tx1"/>
+        </a:solidFill>
+        <a:latin typeface="+mn-lt"/>
+        <a:ea typeface="+mn-ea"/>
+        <a:cs typeface="+mn-cs"/>
+      </a:defRPr>
+    </a:lvl7pPr>
+    <a:lvl8pPr marL="3200400" algn="l" defTabSz="914400" rtl="0" eaLnBrk="1" latinLnBrk="0" hangingPunct="1">
+      <a:defRPr sz="1200" kern="1200">
+        <a:solidFill>
+          <a:schemeClr val="tx1"/>
+        </a:solidFill>
+        <a:latin typeface="+mn-lt"/>
+        <a:ea typeface="+mn-ea"/>
+        <a:cs typeface="+mn-cs"/>
+      </a:defRPr>
+    </a:lvl8pPr>
+    <a:lvl9pPr marL="3657600" algn="l" defTabSz="914400" rtl="0" eaLnBrk="1" latinLnBrk="0" hangingPunct="1">
+      <a:defRPr sz="1200" kern="1200">
+        <a:solidFill>
+          <a:schemeClr val="tx1"/>
+        </a:solidFill>
+        <a:latin typeface="+mn-lt"/>
+        <a:ea typeface="+mn-ea"/>
+        <a:cs typeface="+mn-cs"/>
+      </a:defRPr>
+    </a:lvl9pPr>
+  </p:notesStyle>
+</p:notesMaster>
+</file>
+
 <file path=ppt/slideLayouts/slideLayout1.xml><?xml version="1.0" encoding="utf-8"?>
 <p:sldLayout xmlns:a="http://schemas.openxmlformats.org/drawingml/2006/main" xmlns:r="http://schemas.openxmlformats.org/officeDocument/2006/relationships" xmlns:p="http://schemas.openxmlformats.org/presentationml/2006/main" type="title" preserve="1">
   <p:cSld name="Title Slide">
@@ -243,7 +596,7 @@
           <a:p>
             <a:fld id="{95152C5E-F11D-7D48-B0EF-D154E0F808AA}" type="datetimeFigureOut">
               <a:rPr lang="en-US" smtClean="0"/>
-              <a:t>2/12/2017</a:t>
+              <a:t>2/13/17</a:t>
             </a:fld>
             <a:endParaRPr lang="en-US"/>
           </a:p>
@@ -413,7 +766,7 @@
           <a:p>
             <a:fld id="{95152C5E-F11D-7D48-B0EF-D154E0F808AA}" type="datetimeFigureOut">
               <a:rPr lang="en-US" smtClean="0"/>
-              <a:t>2/12/2017</a:t>
+              <a:t>2/13/17</a:t>
             </a:fld>
             <a:endParaRPr lang="en-US"/>
           </a:p>
@@ -593,7 +946,7 @@
           <a:p>
             <a:fld id="{95152C5E-F11D-7D48-B0EF-D154E0F808AA}" type="datetimeFigureOut">
               <a:rPr lang="en-US" smtClean="0"/>
-              <a:t>2/12/2017</a:t>
+              <a:t>2/13/17</a:t>
             </a:fld>
             <a:endParaRPr lang="en-US"/>
           </a:p>
@@ -763,7 +1116,7 @@
           <a:p>
             <a:fld id="{95152C5E-F11D-7D48-B0EF-D154E0F808AA}" type="datetimeFigureOut">
               <a:rPr lang="en-US" smtClean="0"/>
-              <a:t>2/12/2017</a:t>
+              <a:t>2/13/17</a:t>
             </a:fld>
             <a:endParaRPr lang="en-US"/>
           </a:p>
@@ -1009,7 +1362,7 @@
           <a:p>
             <a:fld id="{95152C5E-F11D-7D48-B0EF-D154E0F808AA}" type="datetimeFigureOut">
               <a:rPr lang="en-US" smtClean="0"/>
-              <a:t>2/12/2017</a:t>
+              <a:t>2/13/17</a:t>
             </a:fld>
             <a:endParaRPr lang="en-US"/>
           </a:p>
@@ -1241,7 +1594,7 @@
           <a:p>
             <a:fld id="{95152C5E-F11D-7D48-B0EF-D154E0F808AA}" type="datetimeFigureOut">
               <a:rPr lang="en-US" smtClean="0"/>
-              <a:t>2/12/2017</a:t>
+              <a:t>2/13/17</a:t>
             </a:fld>
             <a:endParaRPr lang="en-US"/>
           </a:p>
@@ -1608,7 +1961,7 @@
           <a:p>
             <a:fld id="{95152C5E-F11D-7D48-B0EF-D154E0F808AA}" type="datetimeFigureOut">
               <a:rPr lang="en-US" smtClean="0"/>
-              <a:t>2/12/2017</a:t>
+              <a:t>2/13/17</a:t>
             </a:fld>
             <a:endParaRPr lang="en-US"/>
           </a:p>
@@ -1726,7 +2079,7 @@
           <a:p>
             <a:fld id="{95152C5E-F11D-7D48-B0EF-D154E0F808AA}" type="datetimeFigureOut">
               <a:rPr lang="en-US" smtClean="0"/>
-              <a:t>2/12/2017</a:t>
+              <a:t>2/13/17</a:t>
             </a:fld>
             <a:endParaRPr lang="en-US"/>
           </a:p>
@@ -1821,7 +2174,7 @@
           <a:p>
             <a:fld id="{95152C5E-F11D-7D48-B0EF-D154E0F808AA}" type="datetimeFigureOut">
               <a:rPr lang="en-US" smtClean="0"/>
-              <a:t>2/12/2017</a:t>
+              <a:t>2/13/17</a:t>
             </a:fld>
             <a:endParaRPr lang="en-US"/>
           </a:p>
@@ -2098,7 +2451,7 @@
           <a:p>
             <a:fld id="{95152C5E-F11D-7D48-B0EF-D154E0F808AA}" type="datetimeFigureOut">
               <a:rPr lang="en-US" smtClean="0"/>
-              <a:t>2/12/2017</a:t>
+              <a:t>2/13/17</a:t>
             </a:fld>
             <a:endParaRPr lang="en-US"/>
           </a:p>
@@ -2355,7 +2708,7 @@
           <a:p>
             <a:fld id="{95152C5E-F11D-7D48-B0EF-D154E0F808AA}" type="datetimeFigureOut">
               <a:rPr lang="en-US" smtClean="0"/>
-              <a:t>2/12/2017</a:t>
+              <a:t>2/13/17</a:t>
             </a:fld>
             <a:endParaRPr lang="en-US"/>
           </a:p>
@@ -2568,7 +2921,7 @@
           <a:p>
             <a:fld id="{95152C5E-F11D-7D48-B0EF-D154E0F808AA}" type="datetimeFigureOut">
               <a:rPr lang="en-US" smtClean="0"/>
-              <a:t>2/12/2017</a:t>
+              <a:t>2/13/17</a:t>
             </a:fld>
             <a:endParaRPr lang="en-US"/>
           </a:p>
@@ -3011,8 +3364,8 @@
         </p:nvSpPr>
         <p:spPr>
           <a:xfrm>
-            <a:off x="1914169" y="2723027"/>
-            <a:ext cx="6800348" cy="6784296"/>
+            <a:off x="2005184" y="1880750"/>
+            <a:ext cx="6800348" cy="7703092"/>
           </a:xfrm>
           <a:prstGeom prst="roundRect">
             <a:avLst/>
@@ -3092,7 +3445,7 @@
         </p:nvSpPr>
         <p:spPr>
           <a:xfrm>
-            <a:off x="4554214" y="1828116"/>
+            <a:off x="4186251" y="1331998"/>
             <a:ext cx="9669587" cy="523220"/>
           </a:xfrm>
           <a:prstGeom prst="rect">
@@ -3149,8 +3502,8 @@
         </p:blipFill>
         <p:spPr>
           <a:xfrm>
-            <a:off x="8016228" y="1001971"/>
-            <a:ext cx="1014715" cy="1014715"/>
+            <a:off x="10754386" y="774746"/>
+            <a:ext cx="688605" cy="688605"/>
           </a:xfrm>
           <a:prstGeom prst="rect">
             <a:avLst/>
@@ -3165,7 +3518,7 @@
         </p:nvSpPr>
         <p:spPr>
           <a:xfrm>
-            <a:off x="5853080" y="893812"/>
+            <a:off x="5853079" y="721691"/>
             <a:ext cx="5408665" cy="584775"/>
           </a:xfrm>
           <a:prstGeom prst="rect">
@@ -3200,8 +3553,8 @@
         </p:nvSpPr>
         <p:spPr>
           <a:xfrm>
-            <a:off x="2253265" y="7828716"/>
-            <a:ext cx="5735985" cy="954107"/>
+            <a:off x="2306275" y="7352466"/>
+            <a:ext cx="5735985" cy="1815882"/>
           </a:xfrm>
           <a:prstGeom prst="rect">
             <a:avLst/>
@@ -3220,20 +3573,74 @@
             </a:pPr>
             <a:r>
               <a:rPr lang="en-US" sz="2800" dirty="0" smtClean="0"/>
-              <a:t>Right-click </a:t>
-            </a:r>
-            <a:r>
-              <a:rPr lang="en-US" sz="2800" dirty="0"/>
-              <a:t>with the script in your </a:t>
-            </a:r>
+              <a:t>Close the computer by pressing </a:t>
+            </a:r>
+            <a:r>
+              <a:rPr lang="en-US" sz="2800" b="1" dirty="0" smtClean="0"/>
+              <a:t>E</a:t>
+            </a:r>
+            <a:endParaRPr lang="en-US" sz="2800" b="1" dirty="0"/>
+          </a:p>
+          <a:p>
+            <a:pPr marL="514350" indent="-514350">
+              <a:buFont typeface="+mj-lt"/>
+              <a:buAutoNum type="arabicPeriod" startAt="3"/>
+            </a:pPr>
+            <a:endParaRPr lang="en-US" sz="2800" b="1" dirty="0"/>
+          </a:p>
+          <a:p>
+            <a:pPr marL="514350" indent="-514350">
+              <a:buFont typeface="+mj-lt"/>
+              <a:buAutoNum type="arabicPeriod" startAt="3"/>
+            </a:pPr>
             <a:r>
               <a:rPr lang="en-US" sz="2800" dirty="0" smtClean="0"/>
-              <a:t>hand. Did something happen?</a:t>
-            </a:r>
-            <a:endParaRPr lang="en-US" sz="2800" dirty="0"/>
-          </a:p>
-        </p:txBody>
-      </p:sp>
+              <a:t>Right-click with the script in your hand, what happens?</a:t>
+            </a:r>
+          </a:p>
+        </p:txBody>
+      </p:sp>
+      <p:pic>
+        <p:nvPicPr>
+          <p:cNvPr id="1026" name="Picture 2" descr="Image result for borders corner png"/>
+          <p:cNvPicPr>
+            <a:picLocks noChangeAspect="1" noChangeArrowheads="1"/>
+          </p:cNvPicPr>
+          <p:nvPr/>
+        </p:nvPicPr>
+        <p:blipFill>
+          <a:blip r:embed="rId5">
+            <a:extLst>
+              <a:ext uri="{28A0092B-C50C-407E-A947-70E740481C1C}">
+                <a14:useLocalDpi xmlns:a14="http://schemas.microsoft.com/office/drawing/2010/main" val="0"/>
+              </a:ext>
+            </a:extLst>
+          </a:blip>
+          <a:srcRect/>
+          <a:stretch>
+            <a:fillRect/>
+          </a:stretch>
+        </p:blipFill>
+        <p:spPr bwMode="auto">
+          <a:xfrm>
+            <a:off x="1882056" y="1753281"/>
+            <a:ext cx="2847975" cy="2686051"/>
+          </a:xfrm>
+          <a:prstGeom prst="rect">
+            <a:avLst/>
+          </a:prstGeom>
+          <a:noFill/>
+          <a:extLst>
+            <a:ext uri="{909E8E84-426E-40DD-AFC4-6F175D3DCCD1}">
+              <a14:hiddenFill xmlns:a14="http://schemas.microsoft.com/office/drawing/2010/main">
+                <a:solidFill>
+                  <a:srgbClr val="FFFFFF"/>
+                </a:solidFill>
+              </a14:hiddenFill>
+            </a:ext>
+          </a:extLst>
+        </p:spPr>
+      </p:pic>
       <p:sp>
         <p:nvSpPr>
           <p:cNvPr id="14" name="TextBox 13"/>
@@ -3242,14 +3649,14 @@
         </p:nvSpPr>
         <p:spPr>
           <a:xfrm>
-            <a:off x="2507849" y="2799546"/>
+            <a:off x="2640834" y="2149652"/>
             <a:ext cx="2089197" cy="707886"/>
           </a:xfrm>
           <a:prstGeom prst="rect">
             <a:avLst/>
           </a:prstGeom>
           <a:blipFill>
-            <a:blip r:embed="rId5">
+            <a:blip r:embed="rId6">
               <a:alphaModFix amt="49000"/>
             </a:blip>
             <a:tile tx="0" ty="0" sx="100000" sy="100000" flip="none" algn="tl"/>
@@ -3289,8 +3696,8 @@
         </p:nvSpPr>
         <p:spPr>
           <a:xfrm>
-            <a:off x="8806797" y="2716101"/>
-            <a:ext cx="6800348" cy="6784296"/>
+            <a:off x="8806797" y="1880750"/>
+            <a:ext cx="6800348" cy="7703092"/>
           </a:xfrm>
           <a:prstGeom prst="roundRect">
             <a:avLst/>
@@ -3337,12 +3744,13 @@
         </p:nvSpPr>
         <p:spPr>
           <a:xfrm>
-            <a:off x="8858151" y="3184048"/>
-            <a:ext cx="6310448" cy="5693866"/>
+            <a:off x="9017176" y="2806360"/>
+            <a:ext cx="6310448" cy="6555641"/>
           </a:xfrm>
           <a:prstGeom prst="rect">
             <a:avLst/>
           </a:prstGeom>
+          <a:noFill/>
         </p:spPr>
         <p:txBody>
           <a:bodyPr wrap="square">
@@ -3356,11 +3764,19 @@
             </a:pPr>
             <a:r>
               <a:rPr lang="en-US" sz="2800" dirty="0"/>
-              <a:t>Next, we’ll look at the script itself: look on the right hand side of </a:t>
+              <a:t>Next, we’ll look at the script </a:t>
             </a:r>
             <a:r>
               <a:rPr lang="en-US" sz="2800" dirty="0" smtClean="0"/>
-              <a:t>your screen</a:t>
+              <a:t>itself, first pause the game by pressing </a:t>
+            </a:r>
+            <a:r>
+              <a:rPr lang="en-US" sz="2800" b="1" dirty="0" smtClean="0"/>
+              <a:t>Esc</a:t>
+            </a:r>
+            <a:r>
+              <a:rPr lang="en-US" sz="2800" dirty="0" smtClean="0"/>
+              <a:t> </a:t>
             </a:r>
           </a:p>
           <a:p>
@@ -3368,7 +3784,7 @@
               <a:buFont typeface="+mj-lt"/>
               <a:buAutoNum type="arabicPeriod" startAt="5"/>
             </a:pPr>
-            <a:endParaRPr lang="en-US" sz="2800" dirty="0"/>
+            <a:endParaRPr lang="en-US" sz="2800" dirty="0" smtClean="0"/>
           </a:p>
           <a:p>
             <a:pPr marL="457200" indent="-457200">
@@ -3377,20 +3793,29 @@
             </a:pPr>
             <a:r>
               <a:rPr lang="en-US" sz="2800" dirty="0" smtClean="0"/>
-              <a:t>Open </a:t>
+              <a:t>Now </a:t>
+            </a:r>
+            <a:r>
+              <a:rPr lang="en-US" sz="2800" dirty="0" smtClean="0"/>
+              <a:t>look </a:t>
             </a:r>
             <a:r>
               <a:rPr lang="en-US" sz="2800" dirty="0"/>
-              <a:t>the file called “</a:t>
-            </a:r>
-            <a:r>
-              <a:rPr lang="en-US" sz="2800" b="1" dirty="0"/>
-              <a:t>hellominecraft.py</a:t>
-            </a:r>
-            <a:r>
-              <a:rPr lang="en-US" sz="2800" dirty="0"/>
-              <a:t>”</a:t>
-            </a:r>
+              <a:t>on the right hand side of </a:t>
+            </a:r>
+            <a:r>
+              <a:rPr lang="en-US" sz="2800" dirty="0" smtClean="0"/>
+              <a:t>your </a:t>
+            </a:r>
+            <a:r>
+              <a:rPr lang="en-US" sz="2800" dirty="0" smtClean="0"/>
+              <a:t>screen and double-click the file called </a:t>
+            </a:r>
+            <a:r>
+              <a:rPr lang="en-US" sz="2800" b="1" dirty="0" err="1" smtClean="0"/>
+              <a:t>helloworld.py</a:t>
+            </a:r>
+            <a:endParaRPr lang="en-US" sz="2800" b="1" dirty="0"/>
           </a:p>
           <a:p>
             <a:pPr marL="342900" indent="-342900">
@@ -3406,20 +3831,49 @@
             </a:pPr>
             <a:r>
               <a:rPr lang="en-US" sz="2800" dirty="0"/>
-              <a:t>Fine the line that says “</a:t>
-            </a:r>
-            <a:r>
-              <a:rPr lang="en-US" sz="2800" b="1" dirty="0" err="1"/>
-              <a:t>mc.post_to_chat</a:t>
-            </a:r>
-            <a:r>
-              <a:rPr lang="en-US" sz="2800" b="1" dirty="0"/>
-              <a:t>”: </a:t>
-            </a:r>
-            <a:r>
-              <a:rPr lang="en-US" sz="2800" dirty="0"/>
-              <a:t>“Hello World!”</a:t>
-            </a:r>
+              <a:t>Fine the line that </a:t>
+            </a:r>
+            <a:r>
+              <a:rPr lang="en-US" sz="2800" dirty="0" smtClean="0"/>
+              <a:t>says </a:t>
+            </a:r>
+            <a:r>
+              <a:rPr lang="en-US" sz="2800" b="1" dirty="0" err="1" smtClean="0"/>
+              <a:t>mc.postToChat</a:t>
+            </a:r>
+            <a:r>
+              <a:rPr lang="en-US" sz="2800" b="1" dirty="0" smtClean="0"/>
+              <a:t>(</a:t>
+            </a:r>
+            <a:r>
+              <a:rPr lang="en-US" sz="2800" dirty="0" smtClean="0">
+                <a:solidFill>
+                  <a:srgbClr val="00B050"/>
+                </a:solidFill>
+              </a:rPr>
+              <a:t>“</a:t>
+            </a:r>
+            <a:r>
+              <a:rPr lang="en-US" sz="2800" dirty="0">
+                <a:solidFill>
+                  <a:srgbClr val="00B050"/>
+                </a:solidFill>
+              </a:rPr>
+              <a:t>Hello World</a:t>
+            </a:r>
+            <a:r>
+              <a:rPr lang="en-US" sz="2800" dirty="0" smtClean="0">
+                <a:solidFill>
+                  <a:srgbClr val="00B050"/>
+                </a:solidFill>
+              </a:rPr>
+              <a:t>!”</a:t>
+            </a:r>
+            <a:r>
+              <a:rPr lang="en-US" sz="2800" b="1" dirty="0" smtClean="0"/>
+              <a:t>)</a:t>
+            </a:r>
+            <a:endParaRPr lang="en-US" sz="2800" dirty="0"/>
           </a:p>
           <a:p>
             <a:pPr marL="342900" indent="-342900">
@@ -3443,8 +3897,13 @@
             </a:r>
             <a:r>
               <a:rPr lang="en-US" sz="2800" dirty="0"/>
-              <a:t>” to your name</a:t>
-            </a:r>
+              <a:t>” to your </a:t>
+            </a:r>
+            <a:r>
+              <a:rPr lang="en-US" sz="2800" dirty="0" smtClean="0"/>
+              <a:t>name and then save the file</a:t>
+            </a:r>
+            <a:endParaRPr lang="en-US" sz="2800" dirty="0"/>
           </a:p>
           <a:p>
             <a:pPr marL="342900" indent="-342900">
@@ -3459,22 +3918,26 @@
               <a:buAutoNum type="arabicPeriod" startAt="5"/>
             </a:pPr>
             <a:r>
+              <a:rPr lang="en-US" sz="2800" dirty="0" smtClean="0"/>
+              <a:t>Repeat steps 1, 2, 3, and 4. </a:t>
+            </a:r>
+            <a:r>
               <a:rPr lang="en-US" sz="2800" dirty="0"/>
-              <a:t>Repeat the FIRST, SECOND and THIRD steps. What changed?</a:t>
+              <a:t>What changed?</a:t>
             </a:r>
           </a:p>
         </p:txBody>
       </p:sp>
       <p:pic>
         <p:nvPicPr>
-          <p:cNvPr id="1026" name="Picture 2" descr="Image result for borders corner png"/>
+          <p:cNvPr id="15" name="Picture 2" descr="Image result for borders corner png"/>
           <p:cNvPicPr>
             <a:picLocks noChangeAspect="1" noChangeArrowheads="1"/>
           </p:cNvPicPr>
           <p:nvPr/>
         </p:nvPicPr>
         <p:blipFill>
-          <a:blip r:embed="rId6">
+          <a:blip r:embed="rId5">
             <a:extLst>
               <a:ext uri="{28A0092B-C50C-407E-A947-70E740481C1C}">
                 <a14:useLocalDpi xmlns:a14="http://schemas.microsoft.com/office/drawing/2010/main" val="0"/>
@@ -3487,8 +3950,8 @@
           </a:stretch>
         </p:blipFill>
         <p:spPr bwMode="auto">
-          <a:xfrm>
-            <a:off x="1529798" y="2430420"/>
+          <a:xfrm rot="5400000">
+            <a:off x="12945032" y="1906412"/>
             <a:ext cx="2847975" cy="2686051"/>
           </a:xfrm>
           <a:prstGeom prst="rect">
@@ -3508,14 +3971,14 @@
       </p:pic>
       <p:pic>
         <p:nvPicPr>
-          <p:cNvPr id="15" name="Picture 2" descr="Image result for borders corner png"/>
+          <p:cNvPr id="16" name="Picture 2" descr="Image result for borders corner png"/>
           <p:cNvPicPr>
             <a:picLocks noChangeAspect="1" noChangeArrowheads="1"/>
           </p:cNvPicPr>
           <p:nvPr/>
         </p:nvPicPr>
         <p:blipFill>
-          <a:blip r:embed="rId6">
+          <a:blip r:embed="rId5">
             <a:extLst>
               <a:ext uri="{28A0092B-C50C-407E-A947-70E740481C1C}">
                 <a14:useLocalDpi xmlns:a14="http://schemas.microsoft.com/office/drawing/2010/main" val="0"/>
@@ -3528,8 +3991,8 @@
           </a:stretch>
         </p:blipFill>
         <p:spPr bwMode="auto">
-          <a:xfrm rot="5400000">
-            <a:off x="13091492" y="2579468"/>
+          <a:xfrm rot="16200000">
+            <a:off x="1819322" y="6897939"/>
             <a:ext cx="2847975" cy="2686051"/>
           </a:xfrm>
           <a:prstGeom prst="rect">
@@ -3549,47 +4012,6 @@
       </p:pic>
       <p:pic>
         <p:nvPicPr>
-          <p:cNvPr id="16" name="Picture 2" descr="Image result for borders corner png"/>
-          <p:cNvPicPr>
-            <a:picLocks noChangeAspect="1" noChangeArrowheads="1"/>
-          </p:cNvPicPr>
-          <p:nvPr/>
-        </p:nvPicPr>
-        <p:blipFill>
-          <a:blip r:embed="rId6">
-            <a:extLst>
-              <a:ext uri="{28A0092B-C50C-407E-A947-70E740481C1C}">
-                <a14:useLocalDpi xmlns:a14="http://schemas.microsoft.com/office/drawing/2010/main" val="0"/>
-              </a:ext>
-            </a:extLst>
-          </a:blip>
-          <a:srcRect/>
-          <a:stretch>
-            <a:fillRect/>
-          </a:stretch>
-        </p:blipFill>
-        <p:spPr bwMode="auto">
-          <a:xfrm rot="16200000">
-            <a:off x="1448836" y="6962170"/>
-            <a:ext cx="2847975" cy="2686051"/>
-          </a:xfrm>
-          <a:prstGeom prst="rect">
-            <a:avLst/>
-          </a:prstGeom>
-          <a:noFill/>
-          <a:extLst>
-            <a:ext uri="{909E8E84-426E-40DD-AFC4-6F175D3DCCD1}">
-              <a14:hiddenFill xmlns:a14="http://schemas.microsoft.com/office/drawing/2010/main">
-                <a:solidFill>
-                  <a:srgbClr val="FFFFFF"/>
-                </a:solidFill>
-              </a14:hiddenFill>
-            </a:ext>
-          </a:extLst>
-        </p:spPr>
-      </p:pic>
-      <p:pic>
-        <p:nvPicPr>
           <p:cNvPr id="17" name="Picture 2" descr="Image result for borders corner png"/>
           <p:cNvPicPr>
             <a:picLocks noChangeAspect="1" noChangeArrowheads="1"/>
@@ -3597,7 +4019,7 @@
           <p:nvPr/>
         </p:nvPicPr>
         <p:blipFill>
-          <a:blip r:embed="rId6">
+          <a:blip r:embed="rId5">
             <a:extLst>
               <a:ext uri="{28A0092B-C50C-407E-A947-70E740481C1C}">
                 <a14:useLocalDpi xmlns:a14="http://schemas.microsoft.com/office/drawing/2010/main" val="0"/>
@@ -3611,7 +4033,7 @@
         </p:blipFill>
         <p:spPr bwMode="auto">
           <a:xfrm rot="10800000">
-            <a:off x="12968970" y="7146368"/>
+            <a:off x="12864070" y="6897791"/>
             <a:ext cx="2847975" cy="2686051"/>
           </a:xfrm>
           <a:prstGeom prst="rect">
@@ -3651,7 +4073,7 @@
         </p:blipFill>
         <p:spPr>
           <a:xfrm>
-            <a:off x="6473941" y="3712830"/>
+            <a:off x="6171048" y="2440500"/>
             <a:ext cx="1304222" cy="1304222"/>
           </a:xfrm>
           <a:prstGeom prst="rect">
@@ -3659,29 +4081,114 @@
           </a:prstGeom>
         </p:spPr>
       </p:pic>
+      <p:sp>
+        <p:nvSpPr>
+          <p:cNvPr id="18" name="Rectangle 17"/>
+          <p:cNvSpPr/>
+          <p:nvPr/>
+        </p:nvSpPr>
+        <p:spPr>
+          <a:xfrm>
+            <a:off x="2315238" y="2873385"/>
+            <a:ext cx="3887606" cy="954107"/>
+          </a:xfrm>
+          <a:prstGeom prst="rect">
+            <a:avLst/>
+          </a:prstGeom>
+        </p:spPr>
+        <p:txBody>
+          <a:bodyPr wrap="square">
+            <a:spAutoFit/>
+          </a:bodyPr>
+          <a:lstStyle/>
+          <a:p>
+            <a:pPr marL="514350" indent="-514350">
+              <a:buFont typeface="+mj-lt"/>
+              <a:buAutoNum type="arabicPeriod"/>
+            </a:pPr>
+            <a:r>
+              <a:rPr lang="en-US" sz="2800" dirty="0"/>
+              <a:t>Find and right-click the computer block</a:t>
+            </a:r>
+            <a:endParaRPr lang="en-GB" sz="2800" dirty="0"/>
+          </a:p>
+        </p:txBody>
+      </p:sp>
+      <p:sp>
+        <p:nvSpPr>
+          <p:cNvPr id="19" name="Rectangle 18"/>
+          <p:cNvSpPr/>
+          <p:nvPr/>
+        </p:nvSpPr>
+        <p:spPr>
+          <a:xfrm>
+            <a:off x="2314508" y="4121851"/>
+            <a:ext cx="6354549" cy="1384995"/>
+          </a:xfrm>
+          <a:prstGeom prst="rect">
+            <a:avLst/>
+          </a:prstGeom>
+        </p:spPr>
+        <p:txBody>
+          <a:bodyPr wrap="square">
+            <a:spAutoFit/>
+          </a:bodyPr>
+          <a:lstStyle/>
+          <a:p>
+            <a:pPr marL="514350" indent="-514350">
+              <a:buFont typeface="+mj-lt"/>
+              <a:buAutoNum type="arabicPeriod" startAt="2"/>
+            </a:pPr>
+            <a:r>
+              <a:rPr lang="en-US" sz="2800" dirty="0" smtClean="0"/>
+              <a:t>Drag the </a:t>
+            </a:r>
+            <a:r>
+              <a:rPr lang="en-US" sz="2800" dirty="0"/>
+              <a:t>yellow and blue </a:t>
+            </a:r>
+            <a:r>
+              <a:rPr lang="en-US" sz="2800" dirty="0" smtClean="0"/>
+              <a:t>item called “</a:t>
+            </a:r>
+            <a:r>
+              <a:rPr lang="en-US" sz="2800" dirty="0" err="1" smtClean="0"/>
+              <a:t>helloworld</a:t>
+            </a:r>
+            <a:r>
+              <a:rPr lang="en-US" sz="2800" dirty="0" smtClean="0"/>
+              <a:t>” to your inventory:</a:t>
+            </a:r>
+            <a:r>
+              <a:rPr lang="en-US" sz="2800" dirty="0" smtClean="0"/>
+              <a:t> </a:t>
+            </a:r>
+            <a:r>
+              <a:rPr lang="en-US" sz="2800" dirty="0" smtClean="0"/>
+              <a:t>this is called a SCRIPT</a:t>
+            </a:r>
+            <a:endParaRPr lang="en-US" sz="2800" dirty="0"/>
+          </a:p>
+        </p:txBody>
+      </p:sp>
       <p:pic>
         <p:nvPicPr>
-          <p:cNvPr id="6" name="Picture 5"/>
+          <p:cNvPr id="2" name="Picture 1"/>
           <p:cNvPicPr>
             <a:picLocks noChangeAspect="1"/>
           </p:cNvPicPr>
           <p:nvPr/>
         </p:nvPicPr>
-        <p:blipFill rotWithShape="1">
-          <a:blip r:embed="rId8">
-            <a:extLst>
-              <a:ext uri="{28A0092B-C50C-407E-A947-70E740481C1C}">
-                <a14:useLocalDpi xmlns:a14="http://schemas.microsoft.com/office/drawing/2010/main" val="0"/>
-              </a:ext>
-            </a:extLst>
-          </a:blip>
-          <a:srcRect l="3477" t="5238" r="33634" b="72427"/>
-          <a:stretch/>
+        <p:blipFill>
+          <a:blip r:embed="rId8"/>
+          <a:stretch>
+            <a:fillRect/>
+          </a:stretch>
         </p:blipFill>
         <p:spPr>
           <a:xfrm>
-            <a:off x="4040514" y="6625160"/>
-            <a:ext cx="2487191" cy="883319"/>
+            <a:off x="5599262" y="5110815"/>
+            <a:ext cx="2447793" cy="2228885"/>
           </a:xfrm>
           <a:prstGeom prst="rect">
             <a:avLst/>
@@ -3690,79 +4197,54 @@
       </p:pic>
       <p:sp>
         <p:nvSpPr>
-          <p:cNvPr id="18" name="Rectangle 17"/>
+          <p:cNvPr id="29" name="U-Turn Arrow 28"/>
           <p:cNvSpPr/>
           <p:nvPr/>
         </p:nvSpPr>
         <p:spPr>
-          <a:xfrm>
-            <a:off x="2242448" y="3786334"/>
-            <a:ext cx="3887606" cy="954107"/>
-          </a:xfrm>
-          <a:prstGeom prst="rect">
-            <a:avLst/>
+          <a:xfrm rot="16200000" flipH="1">
+            <a:off x="4452183" y="6052450"/>
+            <a:ext cx="1892732" cy="569706"/>
+          </a:xfrm>
+          <a:prstGeom prst="uturnArrow">
+            <a:avLst>
+              <a:gd name="adj1" fmla="val 21154"/>
+              <a:gd name="adj2" fmla="val 25000"/>
+              <a:gd name="adj3" fmla="val 25000"/>
+              <a:gd name="adj4" fmla="val 43750"/>
+              <a:gd name="adj5" fmla="val 94459"/>
+            </a:avLst>
           </a:prstGeom>
-        </p:spPr>
-        <p:txBody>
-          <a:bodyPr wrap="square">
-            <a:spAutoFit/>
-          </a:bodyPr>
-          <a:lstStyle/>
-          <a:p>
-            <a:pPr marL="514350" indent="-514350">
-              <a:buFont typeface="+mj-lt"/>
-              <a:buAutoNum type="arabicPeriod"/>
-            </a:pPr>
-            <a:r>
-              <a:rPr lang="en-US" sz="2800" dirty="0"/>
-              <a:t>Find and right-click the computer block</a:t>
-            </a:r>
-            <a:endParaRPr lang="en-GB" sz="2800" dirty="0"/>
-          </a:p>
-        </p:txBody>
-      </p:sp>
-      <p:sp>
-        <p:nvSpPr>
-          <p:cNvPr id="19" name="Rectangle 18"/>
-          <p:cNvSpPr/>
-          <p:nvPr/>
-        </p:nvSpPr>
-        <p:spPr>
-          <a:xfrm>
-            <a:off x="2242448" y="5188651"/>
-            <a:ext cx="6354549" cy="1384995"/>
-          </a:xfrm>
-          <a:prstGeom prst="rect">
-            <a:avLst/>
-          </a:prstGeom>
-        </p:spPr>
-        <p:txBody>
-          <a:bodyPr wrap="square">
-            <a:spAutoFit/>
-          </a:bodyPr>
-          <a:lstStyle/>
-          <a:p>
-            <a:pPr marL="514350" indent="-514350">
-              <a:buFont typeface="+mj-lt"/>
-              <a:buAutoNum type="arabicPeriod" startAt="2"/>
-            </a:pPr>
-            <a:r>
-              <a:rPr lang="en-US" sz="2800" dirty="0"/>
-              <a:t>Get the yellow and blue </a:t>
-            </a:r>
-            <a:r>
-              <a:rPr lang="en-US" sz="2800" dirty="0" smtClean="0"/>
-              <a:t>item called “</a:t>
-            </a:r>
-            <a:r>
-              <a:rPr lang="en-US" sz="2800" dirty="0" err="1" smtClean="0"/>
-              <a:t>hellominecraft</a:t>
-            </a:r>
-            <a:r>
-              <a:rPr lang="en-US" sz="2800" dirty="0" smtClean="0"/>
-              <a:t>”: this is called a SCRIPT</a:t>
-            </a:r>
-            <a:endParaRPr lang="en-US" sz="2800" dirty="0"/>
+          <a:ln>
+            <a:solidFill>
+              <a:schemeClr val="tx1"/>
+            </a:solidFill>
+          </a:ln>
+        </p:spPr>
+        <p:style>
+          <a:lnRef idx="1">
+            <a:schemeClr val="accent4"/>
+          </a:lnRef>
+          <a:fillRef idx="2">
+            <a:schemeClr val="accent4"/>
+          </a:fillRef>
+          <a:effectRef idx="1">
+            <a:schemeClr val="accent4"/>
+          </a:effectRef>
+          <a:fontRef idx="minor">
+            <a:schemeClr val="dk1"/>
+          </a:fontRef>
+        </p:style>
+        <p:txBody>
+          <a:bodyPr rtlCol="0" anchor="ctr"/>
+          <a:lstStyle/>
+          <a:p>
+            <a:pPr algn="ctr"/>
+            <a:endParaRPr lang="en-US">
+              <a:solidFill>
+                <a:schemeClr val="tx1"/>
+              </a:solidFill>
+            </a:endParaRPr>
           </a:p>
         </p:txBody>
       </p:sp>
@@ -4038,4 +4520,265 @@
     </a:ext>
   </a:extLst>
 </a:theme>
+</file>
+
+<file path=ppt/theme/theme2.xml><?xml version="1.0" encoding="utf-8"?>
+<a:theme xmlns:a="http://schemas.openxmlformats.org/drawingml/2006/main" name="Office Theme">
+  <a:themeElements>
+    <a:clrScheme name="Office">
+      <a:dk1>
+        <a:sysClr val="windowText" lastClr="000000"/>
+      </a:dk1>
+      <a:lt1>
+        <a:sysClr val="window" lastClr="FFFFFF"/>
+      </a:lt1>
+      <a:dk2>
+        <a:srgbClr val="44546A"/>
+      </a:dk2>
+      <a:lt2>
+        <a:srgbClr val="E7E6E6"/>
+      </a:lt2>
+      <a:accent1>
+        <a:srgbClr val="4472C4"/>
+      </a:accent1>
+      <a:accent2>
+        <a:srgbClr val="ED7D31"/>
+      </a:accent2>
+      <a:accent3>
+        <a:srgbClr val="A5A5A5"/>
+      </a:accent3>
+      <a:accent4>
+        <a:srgbClr val="FFC000"/>
+      </a:accent4>
+      <a:accent5>
+        <a:srgbClr val="5B9BD5"/>
+      </a:accent5>
+      <a:accent6>
+        <a:srgbClr val="70AD47"/>
+      </a:accent6>
+      <a:hlink>
+        <a:srgbClr val="0563C1"/>
+      </a:hlink>
+      <a:folHlink>
+        <a:srgbClr val="954F72"/>
+      </a:folHlink>
+    </a:clrScheme>
+    <a:fontScheme name="Office">
+      <a:majorFont>
+        <a:latin typeface="Calibri Light" panose="020F0302020204030204"/>
+        <a:ea typeface=""/>
+        <a:cs typeface=""/>
+        <a:font script="Jpan" typeface="Yu Gothic Light"/>
+        <a:font script="Hang" typeface="맑은 고딕"/>
+        <a:font script="Hans" typeface="DengXian Light"/>
+        <a:font script="Hant" typeface="新細明體"/>
+        <a:font script="Arab" typeface="Times New Roman"/>
+        <a:font script="Hebr" typeface="Times New Roman"/>
+        <a:font script="Thai" typeface="Angsana New"/>
+        <a:font script="Ethi" typeface="Nyala"/>
+        <a:font script="Beng" typeface="Vrinda"/>
+        <a:font script="Gujr" typeface="Shruti"/>
+        <a:font script="Khmr" typeface="MoolBoran"/>
+        <a:font script="Knda" typeface="Tunga"/>
+        <a:font script="Guru" typeface="Raavi"/>
+        <a:font script="Cans" typeface="Euphemia"/>
+        <a:font script="Cher" typeface="Plantagenet Cherokee"/>
+        <a:font script="Yiii" typeface="Microsoft Yi Baiti"/>
+        <a:font script="Tibt" typeface="Microsoft Himalaya"/>
+        <a:font script="Thaa" typeface="MV Boli"/>
+        <a:font script="Deva" typeface="Mangal"/>
+        <a:font script="Telu" typeface="Gautami"/>
+        <a:font script="Taml" typeface="Latha"/>
+        <a:font script="Syrc" typeface="Estrangelo Edessa"/>
+        <a:font script="Orya" typeface="Kalinga"/>
+        <a:font script="Mlym" typeface="Kartika"/>
+        <a:font script="Laoo" typeface="DokChampa"/>
+        <a:font script="Sinh" typeface="Iskoola Pota"/>
+        <a:font script="Mong" typeface="Mongolian Baiti"/>
+        <a:font script="Viet" typeface="Times New Roman"/>
+        <a:font script="Uigh" typeface="Microsoft Uighur"/>
+        <a:font script="Geor" typeface="Sylfaen"/>
+      </a:majorFont>
+      <a:minorFont>
+        <a:latin typeface="Calibri" panose="020F0502020204030204"/>
+        <a:ea typeface=""/>
+        <a:cs typeface=""/>
+        <a:font script="Jpan" typeface="Yu Gothic"/>
+        <a:font script="Hang" typeface="맑은 고딕"/>
+        <a:font script="Hans" typeface="DengXian"/>
+        <a:font script="Hant" typeface="新細明體"/>
+        <a:font script="Arab" typeface="Arial"/>
+        <a:font script="Hebr" typeface="Arial"/>
+        <a:font script="Thai" typeface="Cordia New"/>
+        <a:font script="Ethi" typeface="Nyala"/>
+        <a:font script="Beng" typeface="Vrinda"/>
+        <a:font script="Gujr" typeface="Shruti"/>
+        <a:font script="Khmr" typeface="DaunPenh"/>
+        <a:font script="Knda" typeface="Tunga"/>
+        <a:font script="Guru" typeface="Raavi"/>
+        <a:font script="Cans" typeface="Euphemia"/>
+        <a:font script="Cher" typeface="Plantagenet Cherokee"/>
+        <a:font script="Yiii" typeface="Microsoft Yi Baiti"/>
+        <a:font script="Tibt" typeface="Microsoft Himalaya"/>
+        <a:font script="Thaa" typeface="MV Boli"/>
+        <a:font script="Deva" typeface="Mangal"/>
+        <a:font script="Telu" typeface="Gautami"/>
+        <a:font script="Taml" typeface="Latha"/>
+        <a:font script="Syrc" typeface="Estrangelo Edessa"/>
+        <a:font script="Orya" typeface="Kalinga"/>
+        <a:font script="Mlym" typeface="Kartika"/>
+        <a:font script="Laoo" typeface="DokChampa"/>
+        <a:font script="Sinh" typeface="Iskoola Pota"/>
+        <a:font script="Mong" typeface="Mongolian Baiti"/>
+        <a:font script="Viet" typeface="Arial"/>
+        <a:font script="Uigh" typeface="Microsoft Uighur"/>
+        <a:font script="Geor" typeface="Sylfaen"/>
+      </a:minorFont>
+    </a:fontScheme>
+    <a:fmtScheme name="Office">
+      <a:fillStyleLst>
+        <a:solidFill>
+          <a:schemeClr val="phClr"/>
+        </a:solidFill>
+        <a:gradFill rotWithShape="1">
+          <a:gsLst>
+            <a:gs pos="0">
+              <a:schemeClr val="phClr">
+                <a:lumMod val="110000"/>
+                <a:satMod val="105000"/>
+                <a:tint val="67000"/>
+              </a:schemeClr>
+            </a:gs>
+            <a:gs pos="50000">
+              <a:schemeClr val="phClr">
+                <a:lumMod val="105000"/>
+                <a:satMod val="103000"/>
+                <a:tint val="73000"/>
+              </a:schemeClr>
+            </a:gs>
+            <a:gs pos="100000">
+              <a:schemeClr val="phClr">
+                <a:lumMod val="105000"/>
+                <a:satMod val="109000"/>
+                <a:tint val="81000"/>
+              </a:schemeClr>
+            </a:gs>
+          </a:gsLst>
+          <a:lin ang="5400000" scaled="0"/>
+        </a:gradFill>
+        <a:gradFill rotWithShape="1">
+          <a:gsLst>
+            <a:gs pos="0">
+              <a:schemeClr val="phClr">
+                <a:satMod val="103000"/>
+                <a:lumMod val="102000"/>
+                <a:tint val="94000"/>
+              </a:schemeClr>
+            </a:gs>
+            <a:gs pos="50000">
+              <a:schemeClr val="phClr">
+                <a:satMod val="110000"/>
+                <a:lumMod val="100000"/>
+                <a:shade val="100000"/>
+              </a:schemeClr>
+            </a:gs>
+            <a:gs pos="100000">
+              <a:schemeClr val="phClr">
+                <a:lumMod val="99000"/>
+                <a:satMod val="120000"/>
+                <a:shade val="78000"/>
+              </a:schemeClr>
+            </a:gs>
+          </a:gsLst>
+          <a:lin ang="5400000" scaled="0"/>
+        </a:gradFill>
+      </a:fillStyleLst>
+      <a:lnStyleLst>
+        <a:ln w="6350" cap="flat" cmpd="sng" algn="ctr">
+          <a:solidFill>
+            <a:schemeClr val="phClr"/>
+          </a:solidFill>
+          <a:prstDash val="solid"/>
+          <a:miter lim="800000"/>
+        </a:ln>
+        <a:ln w="12700" cap="flat" cmpd="sng" algn="ctr">
+          <a:solidFill>
+            <a:schemeClr val="phClr"/>
+          </a:solidFill>
+          <a:prstDash val="solid"/>
+          <a:miter lim="800000"/>
+        </a:ln>
+        <a:ln w="19050" cap="flat" cmpd="sng" algn="ctr">
+          <a:solidFill>
+            <a:schemeClr val="phClr"/>
+          </a:solidFill>
+          <a:prstDash val="solid"/>
+          <a:miter lim="800000"/>
+        </a:ln>
+      </a:lnStyleLst>
+      <a:effectStyleLst>
+        <a:effectStyle>
+          <a:effectLst/>
+        </a:effectStyle>
+        <a:effectStyle>
+          <a:effectLst/>
+        </a:effectStyle>
+        <a:effectStyle>
+          <a:effectLst>
+            <a:outerShdw blurRad="57150" dist="19050" dir="5400000" algn="ctr" rotWithShape="0">
+              <a:srgbClr val="000000">
+                <a:alpha val="63000"/>
+              </a:srgbClr>
+            </a:outerShdw>
+          </a:effectLst>
+        </a:effectStyle>
+      </a:effectStyleLst>
+      <a:bgFillStyleLst>
+        <a:solidFill>
+          <a:schemeClr val="phClr"/>
+        </a:solidFill>
+        <a:solidFill>
+          <a:schemeClr val="phClr">
+            <a:tint val="95000"/>
+            <a:satMod val="170000"/>
+          </a:schemeClr>
+        </a:solidFill>
+        <a:gradFill rotWithShape="1">
+          <a:gsLst>
+            <a:gs pos="0">
+              <a:schemeClr val="phClr">
+                <a:tint val="93000"/>
+                <a:satMod val="150000"/>
+                <a:shade val="98000"/>
+                <a:lumMod val="102000"/>
+              </a:schemeClr>
+            </a:gs>
+            <a:gs pos="50000">
+              <a:schemeClr val="phClr">
+                <a:tint val="98000"/>
+                <a:satMod val="130000"/>
+                <a:shade val="90000"/>
+                <a:lumMod val="103000"/>
+              </a:schemeClr>
+            </a:gs>
+            <a:gs pos="100000">
+              <a:schemeClr val="phClr">
+                <a:shade val="63000"/>
+                <a:satMod val="120000"/>
+              </a:schemeClr>
+            </a:gs>
+          </a:gsLst>
+          <a:lin ang="5400000" scaled="0"/>
+        </a:gradFill>
+      </a:bgFillStyleLst>
+    </a:fmtScheme>
+  </a:themeElements>
+  <a:objectDefaults/>
+  <a:extraClrSchemeLst/>
+  <a:extLst>
+    <a:ext uri="{05A4C25C-085E-4340-85A3-A5531E510DB2}">
+      <thm15:themeFamily xmlns:thm15="http://schemas.microsoft.com/office/thememl/2012/main" name="Office Theme" id="{62F939B6-93AF-4DB8-9C6B-D6C7DFDC589F}" vid="{4A3C46E8-61CC-4603-A589-7422A47A8E4A}"/>
+    </a:ext>
+  </a:extLst>
+</a:theme>
 </file>
</xml_diff>

<commit_message>
Added house code, struggling to get module import working same way as text_to_blocks
</commit_message>
<xml_diff>
--- a/programming_challenge/tasks.horizontal.pptx
+++ b/programming_challenge/tasks.horizontal.pptx
@@ -199,7 +199,7 @@
           <a:p>
             <a:fld id="{227BA57D-FEB7-7D40-AB44-A416CA343704}" type="datetimeFigureOut">
               <a:rPr lang="en-US" smtClean="0"/>
-              <a:t>2/13/17</a:t>
+              <a:t>2/15/17</a:t>
             </a:fld>
             <a:endParaRPr lang="en-US"/>
           </a:p>
@@ -598,7 +598,7 @@
           <a:p>
             <a:fld id="{95152C5E-F11D-7D48-B0EF-D154E0F808AA}" type="datetimeFigureOut">
               <a:rPr lang="en-US" smtClean="0"/>
-              <a:t>2/13/17</a:t>
+              <a:t>2/15/17</a:t>
             </a:fld>
             <a:endParaRPr lang="en-US"/>
           </a:p>
@@ -768,7 +768,7 @@
           <a:p>
             <a:fld id="{95152C5E-F11D-7D48-B0EF-D154E0F808AA}" type="datetimeFigureOut">
               <a:rPr lang="en-US" smtClean="0"/>
-              <a:t>2/13/17</a:t>
+              <a:t>2/15/17</a:t>
             </a:fld>
             <a:endParaRPr lang="en-US"/>
           </a:p>
@@ -948,7 +948,7 @@
           <a:p>
             <a:fld id="{95152C5E-F11D-7D48-B0EF-D154E0F808AA}" type="datetimeFigureOut">
               <a:rPr lang="en-US" smtClean="0"/>
-              <a:t>2/13/17</a:t>
+              <a:t>2/15/17</a:t>
             </a:fld>
             <a:endParaRPr lang="en-US"/>
           </a:p>
@@ -1118,7 +1118,7 @@
           <a:p>
             <a:fld id="{95152C5E-F11D-7D48-B0EF-D154E0F808AA}" type="datetimeFigureOut">
               <a:rPr lang="en-US" smtClean="0"/>
-              <a:t>2/13/17</a:t>
+              <a:t>2/15/17</a:t>
             </a:fld>
             <a:endParaRPr lang="en-US"/>
           </a:p>
@@ -1364,7 +1364,7 @@
           <a:p>
             <a:fld id="{95152C5E-F11D-7D48-B0EF-D154E0F808AA}" type="datetimeFigureOut">
               <a:rPr lang="en-US" smtClean="0"/>
-              <a:t>2/13/17</a:t>
+              <a:t>2/15/17</a:t>
             </a:fld>
             <a:endParaRPr lang="en-US"/>
           </a:p>
@@ -1596,7 +1596,7 @@
           <a:p>
             <a:fld id="{95152C5E-F11D-7D48-B0EF-D154E0F808AA}" type="datetimeFigureOut">
               <a:rPr lang="en-US" smtClean="0"/>
-              <a:t>2/13/17</a:t>
+              <a:t>2/15/17</a:t>
             </a:fld>
             <a:endParaRPr lang="en-US"/>
           </a:p>
@@ -1963,7 +1963,7 @@
           <a:p>
             <a:fld id="{95152C5E-F11D-7D48-B0EF-D154E0F808AA}" type="datetimeFigureOut">
               <a:rPr lang="en-US" smtClean="0"/>
-              <a:t>2/13/17</a:t>
+              <a:t>2/15/17</a:t>
             </a:fld>
             <a:endParaRPr lang="en-US"/>
           </a:p>
@@ -2081,7 +2081,7 @@
           <a:p>
             <a:fld id="{95152C5E-F11D-7D48-B0EF-D154E0F808AA}" type="datetimeFigureOut">
               <a:rPr lang="en-US" smtClean="0"/>
-              <a:t>2/13/17</a:t>
+              <a:t>2/15/17</a:t>
             </a:fld>
             <a:endParaRPr lang="en-US"/>
           </a:p>
@@ -2176,7 +2176,7 @@
           <a:p>
             <a:fld id="{95152C5E-F11D-7D48-B0EF-D154E0F808AA}" type="datetimeFigureOut">
               <a:rPr lang="en-US" smtClean="0"/>
-              <a:t>2/13/17</a:t>
+              <a:t>2/15/17</a:t>
             </a:fld>
             <a:endParaRPr lang="en-US"/>
           </a:p>
@@ -2453,7 +2453,7 @@
           <a:p>
             <a:fld id="{95152C5E-F11D-7D48-B0EF-D154E0F808AA}" type="datetimeFigureOut">
               <a:rPr lang="en-US" smtClean="0"/>
-              <a:t>2/13/17</a:t>
+              <a:t>2/15/17</a:t>
             </a:fld>
             <a:endParaRPr lang="en-US"/>
           </a:p>
@@ -2710,7 +2710,7 @@
           <a:p>
             <a:fld id="{95152C5E-F11D-7D48-B0EF-D154E0F808AA}" type="datetimeFigureOut">
               <a:rPr lang="en-US" smtClean="0"/>
-              <a:t>2/13/17</a:t>
+              <a:t>2/15/17</a:t>
             </a:fld>
             <a:endParaRPr lang="en-US"/>
           </a:p>
@@ -2923,7 +2923,7 @@
           <a:p>
             <a:fld id="{95152C5E-F11D-7D48-B0EF-D154E0F808AA}" type="datetimeFigureOut">
               <a:rPr lang="en-US" smtClean="0"/>
-              <a:t>2/13/17</a:t>
+              <a:t>2/15/17</a:t>
             </a:fld>
             <a:endParaRPr lang="en-US"/>
           </a:p>
@@ -3603,47 +3603,6 @@
           </a:p>
         </p:txBody>
       </p:sp>
-      <p:pic>
-        <p:nvPicPr>
-          <p:cNvPr id="1026" name="Picture 2" descr="Image result for borders corner png"/>
-          <p:cNvPicPr>
-            <a:picLocks noChangeAspect="1" noChangeArrowheads="1"/>
-          </p:cNvPicPr>
-          <p:nvPr/>
-        </p:nvPicPr>
-        <p:blipFill>
-          <a:blip r:embed="rId5">
-            <a:extLst>
-              <a:ext uri="{28A0092B-C50C-407E-A947-70E740481C1C}">
-                <a14:useLocalDpi xmlns:a14="http://schemas.microsoft.com/office/drawing/2010/main" val="0"/>
-              </a:ext>
-            </a:extLst>
-          </a:blip>
-          <a:srcRect/>
-          <a:stretch>
-            <a:fillRect/>
-          </a:stretch>
-        </p:blipFill>
-        <p:spPr bwMode="auto">
-          <a:xfrm>
-            <a:off x="983706" y="1506733"/>
-            <a:ext cx="2847975" cy="2686051"/>
-          </a:xfrm>
-          <a:prstGeom prst="rect">
-            <a:avLst/>
-          </a:prstGeom>
-          <a:noFill/>
-          <a:extLst>
-            <a:ext uri="{909E8E84-426E-40DD-AFC4-6F175D3DCCD1}">
-              <a14:hiddenFill xmlns:a14="http://schemas.microsoft.com/office/drawing/2010/main">
-                <a:solidFill>
-                  <a:srgbClr val="FFFFFF"/>
-                </a:solidFill>
-              </a14:hiddenFill>
-            </a:ext>
-          </a:extLst>
-        </p:spPr>
-      </p:pic>
       <p:sp>
         <p:nvSpPr>
           <p:cNvPr id="14" name="TextBox 13"/>
@@ -3659,7 +3618,7 @@
             <a:avLst/>
           </a:prstGeom>
           <a:blipFill>
-            <a:blip r:embed="rId6">
+            <a:blip r:embed="rId5">
               <a:alphaModFix amt="49000"/>
             </a:blip>
             <a:tile tx="0" ty="0" sx="100000" sy="100000" flip="none" algn="tl"/>
@@ -3796,11 +3755,7 @@
             </a:pPr>
             <a:r>
               <a:rPr lang="en-US" sz="2800" dirty="0" smtClean="0"/>
-              <a:t>Now </a:t>
-            </a:r>
-            <a:r>
-              <a:rPr lang="en-US" sz="2800" dirty="0" smtClean="0"/>
-              <a:t>look </a:t>
+              <a:t>Now look </a:t>
             </a:r>
             <a:r>
               <a:rPr lang="en-US" sz="2800" dirty="0"/>
@@ -3808,11 +3763,7 @@
             </a:r>
             <a:r>
               <a:rPr lang="en-US" sz="2800" dirty="0" smtClean="0"/>
-              <a:t>your </a:t>
-            </a:r>
-            <a:r>
-              <a:rPr lang="en-US" sz="2800" dirty="0" smtClean="0"/>
-              <a:t>screen and click the file called </a:t>
+              <a:t>your screen and click the file called </a:t>
             </a:r>
             <a:r>
               <a:rPr lang="en-US" sz="2800" b="1" dirty="0" err="1" smtClean="0"/>
@@ -3955,129 +3906,6 @@
           </a:p>
         </p:txBody>
       </p:sp>
-      <p:pic>
-        <p:nvPicPr>
-          <p:cNvPr id="15" name="Picture 2" descr="Image result for borders corner png"/>
-          <p:cNvPicPr>
-            <a:picLocks noChangeAspect="1" noChangeArrowheads="1"/>
-          </p:cNvPicPr>
-          <p:nvPr/>
-        </p:nvPicPr>
-        <p:blipFill>
-          <a:blip r:embed="rId5">
-            <a:extLst>
-              <a:ext uri="{28A0092B-C50C-407E-A947-70E740481C1C}">
-                <a14:useLocalDpi xmlns:a14="http://schemas.microsoft.com/office/drawing/2010/main" val="0"/>
-              </a:ext>
-            </a:extLst>
-          </a:blip>
-          <a:srcRect/>
-          <a:stretch>
-            <a:fillRect/>
-          </a:stretch>
-        </p:blipFill>
-        <p:spPr bwMode="auto">
-          <a:xfrm rot="5400000">
-            <a:off x="13862243" y="1604721"/>
-            <a:ext cx="2847975" cy="2686051"/>
-          </a:xfrm>
-          <a:prstGeom prst="rect">
-            <a:avLst/>
-          </a:prstGeom>
-          <a:noFill/>
-          <a:extLst>
-            <a:ext uri="{909E8E84-426E-40DD-AFC4-6F175D3DCCD1}">
-              <a14:hiddenFill xmlns:a14="http://schemas.microsoft.com/office/drawing/2010/main">
-                <a:solidFill>
-                  <a:srgbClr val="FFFFFF"/>
-                </a:solidFill>
-              </a14:hiddenFill>
-            </a:ext>
-          </a:extLst>
-        </p:spPr>
-      </p:pic>
-      <p:pic>
-        <p:nvPicPr>
-          <p:cNvPr id="16" name="Picture 2" descr="Image result for borders corner png"/>
-          <p:cNvPicPr>
-            <a:picLocks noChangeAspect="1" noChangeArrowheads="1"/>
-          </p:cNvPicPr>
-          <p:nvPr/>
-        </p:nvPicPr>
-        <p:blipFill>
-          <a:blip r:embed="rId5">
-            <a:extLst>
-              <a:ext uri="{28A0092B-C50C-407E-A947-70E740481C1C}">
-                <a14:useLocalDpi xmlns:a14="http://schemas.microsoft.com/office/drawing/2010/main" val="0"/>
-              </a:ext>
-            </a:extLst>
-          </a:blip>
-          <a:srcRect/>
-          <a:stretch>
-            <a:fillRect/>
-          </a:stretch>
-        </p:blipFill>
-        <p:spPr bwMode="auto">
-          <a:xfrm rot="16200000">
-            <a:off x="902744" y="6658186"/>
-            <a:ext cx="2847975" cy="2686051"/>
-          </a:xfrm>
-          <a:prstGeom prst="rect">
-            <a:avLst/>
-          </a:prstGeom>
-          <a:noFill/>
-          <a:extLst>
-            <a:ext uri="{909E8E84-426E-40DD-AFC4-6F175D3DCCD1}">
-              <a14:hiddenFill xmlns:a14="http://schemas.microsoft.com/office/drawing/2010/main">
-                <a:solidFill>
-                  <a:srgbClr val="FFFFFF"/>
-                </a:solidFill>
-              </a14:hiddenFill>
-            </a:ext>
-          </a:extLst>
-        </p:spPr>
-      </p:pic>
-      <p:pic>
-        <p:nvPicPr>
-          <p:cNvPr id="17" name="Picture 2" descr="Image result for borders corner png"/>
-          <p:cNvPicPr>
-            <a:picLocks noChangeAspect="1" noChangeArrowheads="1"/>
-          </p:cNvPicPr>
-          <p:nvPr/>
-        </p:nvPicPr>
-        <p:blipFill>
-          <a:blip r:embed="rId5">
-            <a:extLst>
-              <a:ext uri="{28A0092B-C50C-407E-A947-70E740481C1C}">
-                <a14:useLocalDpi xmlns:a14="http://schemas.microsoft.com/office/drawing/2010/main" val="0"/>
-              </a:ext>
-            </a:extLst>
-          </a:blip>
-          <a:srcRect/>
-          <a:stretch>
-            <a:fillRect/>
-          </a:stretch>
-        </p:blipFill>
-        <p:spPr bwMode="auto">
-          <a:xfrm rot="10800000">
-            <a:off x="13763230" y="6739850"/>
-            <a:ext cx="2847975" cy="2686051"/>
-          </a:xfrm>
-          <a:prstGeom prst="rect">
-            <a:avLst/>
-          </a:prstGeom>
-          <a:noFill/>
-          <a:extLst>
-            <a:ext uri="{909E8E84-426E-40DD-AFC4-6F175D3DCCD1}">
-              <a14:hiddenFill xmlns:a14="http://schemas.microsoft.com/office/drawing/2010/main">
-                <a:solidFill>
-                  <a:srgbClr val="FFFFFF"/>
-                </a:solidFill>
-              </a14:hiddenFill>
-            </a:ext>
-          </a:extLst>
-        </p:spPr>
-      </p:pic>
       <p:pic>
         <p:nvPicPr>
           <p:cNvPr id="4" name="Picture 3"/>
@@ -4087,7 +3915,7 @@
           <p:nvPr/>
         </p:nvPicPr>
         <p:blipFill>
-          <a:blip r:embed="rId7">
+          <a:blip r:embed="rId6">
             <a:extLst>
               <a:ext uri="{28A0092B-C50C-407E-A947-70E740481C1C}">
                 <a14:useLocalDpi xmlns:a14="http://schemas.microsoft.com/office/drawing/2010/main" val="0"/>
@@ -4192,19 +4020,7 @@
             </a:r>
             <a:r>
               <a:rPr lang="en-US" sz="2800" i="1" dirty="0" smtClean="0"/>
-              <a:t>(</a:t>
-            </a:r>
-            <a:r>
-              <a:rPr lang="en-US" sz="2800" i="1" dirty="0" smtClean="0"/>
-              <a:t>this </a:t>
-            </a:r>
-            <a:r>
-              <a:rPr lang="en-US" sz="2800" i="1" dirty="0" smtClean="0"/>
-              <a:t>is called a </a:t>
-            </a:r>
-            <a:r>
-              <a:rPr lang="en-US" sz="2800" i="1" dirty="0" smtClean="0"/>
-              <a:t>SCRIPT, 		          scripts contain 			            lines of code)</a:t>
+              <a:t>(this is called a SCRIPT, 		          scripts contain 			            lines of code)</a:t>
             </a:r>
             <a:endParaRPr lang="en-US" sz="2800" i="1" dirty="0"/>
           </a:p>
@@ -4219,7 +4035,7 @@
           <p:nvPr/>
         </p:nvPicPr>
         <p:blipFill>
-          <a:blip r:embed="rId8">
+          <a:blip r:embed="rId7">
             <a:extLst>
               <a:ext uri="{28A0092B-C50C-407E-A947-70E740481C1C}">
                 <a14:useLocalDpi xmlns:a14="http://schemas.microsoft.com/office/drawing/2010/main" val="0"/>
@@ -4496,47 +4312,6 @@
           </a:p>
         </p:txBody>
       </p:sp>
-      <p:pic>
-        <p:nvPicPr>
-          <p:cNvPr id="1026" name="Picture 2" descr="Image result for borders corner png"/>
-          <p:cNvPicPr>
-            <a:picLocks noChangeAspect="1" noChangeArrowheads="1"/>
-          </p:cNvPicPr>
-          <p:nvPr/>
-        </p:nvPicPr>
-        <p:blipFill>
-          <a:blip r:embed="rId3">
-            <a:extLst>
-              <a:ext uri="{28A0092B-C50C-407E-A947-70E740481C1C}">
-                <a14:useLocalDpi xmlns:a14="http://schemas.microsoft.com/office/drawing/2010/main" val="0"/>
-              </a:ext>
-            </a:extLst>
-          </a:blip>
-          <a:srcRect/>
-          <a:stretch>
-            <a:fillRect/>
-          </a:stretch>
-        </p:blipFill>
-        <p:spPr bwMode="auto">
-          <a:xfrm>
-            <a:off x="992846" y="243585"/>
-            <a:ext cx="2847975" cy="2686051"/>
-          </a:xfrm>
-          <a:prstGeom prst="rect">
-            <a:avLst/>
-          </a:prstGeom>
-          <a:noFill/>
-          <a:extLst>
-            <a:ext uri="{909E8E84-426E-40DD-AFC4-6F175D3DCCD1}">
-              <a14:hiddenFill xmlns:a14="http://schemas.microsoft.com/office/drawing/2010/main">
-                <a:solidFill>
-                  <a:srgbClr val="FFFFFF"/>
-                </a:solidFill>
-              </a14:hiddenFill>
-            </a:ext>
-          </a:extLst>
-        </p:spPr>
-      </p:pic>
       <p:sp>
         <p:nvSpPr>
           <p:cNvPr id="14" name="TextBox 13"/>
@@ -4552,7 +4327,7 @@
             <a:avLst/>
           </a:prstGeom>
           <a:blipFill>
-            <a:blip r:embed="rId4">
+            <a:blip r:embed="rId3">
               <a:alphaModFix amt="49000"/>
             </a:blip>
             <a:tile tx="0" ty="0" sx="100000" sy="100000" flip="none" algn="tl"/>
@@ -4576,13 +4351,7 @@
               <a:rPr lang="en-GB" sz="4000" dirty="0" smtClean="0">
                 <a:latin typeface="Minecrafter" pitchFamily="2" charset="0"/>
               </a:rPr>
-              <a:t>TASK </a:t>
-            </a:r>
-            <a:r>
-              <a:rPr lang="en-GB" sz="4000" dirty="0" smtClean="0">
-                <a:latin typeface="Minecrafter" pitchFamily="2" charset="0"/>
-              </a:rPr>
-              <a:t>2</a:t>
+              <a:t>TASK 2</a:t>
             </a:r>
             <a:endParaRPr lang="en-GB" sz="4000" dirty="0">
               <a:latin typeface="Minecrafter" pitchFamily="2" charset="0"/>
@@ -4590,129 +4359,6 @@
           </a:p>
         </p:txBody>
       </p:sp>
-      <p:pic>
-        <p:nvPicPr>
-          <p:cNvPr id="15" name="Picture 2" descr="Image result for borders corner png"/>
-          <p:cNvPicPr>
-            <a:picLocks noChangeAspect="1" noChangeArrowheads="1"/>
-          </p:cNvPicPr>
-          <p:nvPr/>
-        </p:nvPicPr>
-        <p:blipFill>
-          <a:blip r:embed="rId3">
-            <a:extLst>
-              <a:ext uri="{28A0092B-C50C-407E-A947-70E740481C1C}">
-                <a14:useLocalDpi xmlns:a14="http://schemas.microsoft.com/office/drawing/2010/main" val="0"/>
-              </a:ext>
-            </a:extLst>
-          </a:blip>
-          <a:srcRect/>
-          <a:stretch>
-            <a:fillRect/>
-          </a:stretch>
-        </p:blipFill>
-        <p:spPr bwMode="auto">
-          <a:xfrm rot="5400000">
-            <a:off x="13861985" y="309982"/>
-            <a:ext cx="2847975" cy="2686051"/>
-          </a:xfrm>
-          <a:prstGeom prst="rect">
-            <a:avLst/>
-          </a:prstGeom>
-          <a:noFill/>
-          <a:extLst>
-            <a:ext uri="{909E8E84-426E-40DD-AFC4-6F175D3DCCD1}">
-              <a14:hiddenFill xmlns:a14="http://schemas.microsoft.com/office/drawing/2010/main">
-                <a:solidFill>
-                  <a:srgbClr val="FFFFFF"/>
-                </a:solidFill>
-              </a14:hiddenFill>
-            </a:ext>
-          </a:extLst>
-        </p:spPr>
-      </p:pic>
-      <p:pic>
-        <p:nvPicPr>
-          <p:cNvPr id="16" name="Picture 2" descr="Image result for borders corner png"/>
-          <p:cNvPicPr>
-            <a:picLocks noChangeAspect="1" noChangeArrowheads="1"/>
-          </p:cNvPicPr>
-          <p:nvPr/>
-        </p:nvPicPr>
-        <p:blipFill>
-          <a:blip r:embed="rId3">
-            <a:extLst>
-              <a:ext uri="{28A0092B-C50C-407E-A947-70E740481C1C}">
-                <a14:useLocalDpi xmlns:a14="http://schemas.microsoft.com/office/drawing/2010/main" val="0"/>
-              </a:ext>
-            </a:extLst>
-          </a:blip>
-          <a:srcRect/>
-          <a:stretch>
-            <a:fillRect/>
-          </a:stretch>
-        </p:blipFill>
-        <p:spPr bwMode="auto">
-          <a:xfrm rot="16200000">
-            <a:off x="836638" y="6875415"/>
-            <a:ext cx="2847975" cy="2686051"/>
-          </a:xfrm>
-          <a:prstGeom prst="rect">
-            <a:avLst/>
-          </a:prstGeom>
-          <a:noFill/>
-          <a:extLst>
-            <a:ext uri="{909E8E84-426E-40DD-AFC4-6F175D3DCCD1}">
-              <a14:hiddenFill xmlns:a14="http://schemas.microsoft.com/office/drawing/2010/main">
-                <a:solidFill>
-                  <a:srgbClr val="FFFFFF"/>
-                </a:solidFill>
-              </a14:hiddenFill>
-            </a:ext>
-          </a:extLst>
-        </p:spPr>
-      </p:pic>
-      <p:pic>
-        <p:nvPicPr>
-          <p:cNvPr id="17" name="Picture 2" descr="Image result for borders corner png"/>
-          <p:cNvPicPr>
-            <a:picLocks noChangeAspect="1" noChangeArrowheads="1"/>
-          </p:cNvPicPr>
-          <p:nvPr/>
-        </p:nvPicPr>
-        <p:blipFill>
-          <a:blip r:embed="rId3">
-            <a:extLst>
-              <a:ext uri="{28A0092B-C50C-407E-A947-70E740481C1C}">
-                <a14:useLocalDpi xmlns:a14="http://schemas.microsoft.com/office/drawing/2010/main" val="0"/>
-              </a:ext>
-            </a:extLst>
-          </a:blip>
-          <a:srcRect/>
-          <a:stretch>
-            <a:fillRect/>
-          </a:stretch>
-        </p:blipFill>
-        <p:spPr bwMode="auto">
-          <a:xfrm rot="10800000">
-            <a:off x="13807231" y="6959261"/>
-            <a:ext cx="2847975" cy="2686051"/>
-          </a:xfrm>
-          <a:prstGeom prst="rect">
-            <a:avLst/>
-          </a:prstGeom>
-          <a:noFill/>
-          <a:extLst>
-            <a:ext uri="{909E8E84-426E-40DD-AFC4-6F175D3DCCD1}">
-              <a14:hiddenFill xmlns:a14="http://schemas.microsoft.com/office/drawing/2010/main">
-                <a:solidFill>
-                  <a:srgbClr val="FFFFFF"/>
-                </a:solidFill>
-              </a14:hiddenFill>
-            </a:ext>
-          </a:extLst>
-        </p:spPr>
-      </p:pic>
       <p:sp>
         <p:nvSpPr>
           <p:cNvPr id="18" name="Rectangle 17"/>
@@ -4856,7 +4502,7 @@
           <p:nvPr/>
         </p:nvPicPr>
         <p:blipFill>
-          <a:blip r:embed="rId5">
+          <a:blip r:embed="rId4">
             <a:extLst>
               <a:ext uri="{28A0092B-C50C-407E-A947-70E740481C1C}">
                 <a14:useLocalDpi xmlns:a14="http://schemas.microsoft.com/office/drawing/2010/main" val="0"/>
@@ -5291,47 +4937,6 @@
           </a:p>
         </p:txBody>
       </p:sp>
-      <p:pic>
-        <p:nvPicPr>
-          <p:cNvPr id="1026" name="Picture 2" descr="Image result for borders corner png"/>
-          <p:cNvPicPr>
-            <a:picLocks noChangeAspect="1" noChangeArrowheads="1"/>
-          </p:cNvPicPr>
-          <p:nvPr/>
-        </p:nvPicPr>
-        <p:blipFill>
-          <a:blip r:embed="rId3">
-            <a:extLst>
-              <a:ext uri="{28A0092B-C50C-407E-A947-70E740481C1C}">
-                <a14:useLocalDpi xmlns:a14="http://schemas.microsoft.com/office/drawing/2010/main" val="0"/>
-              </a:ext>
-            </a:extLst>
-          </a:blip>
-          <a:srcRect/>
-          <a:stretch>
-            <a:fillRect/>
-          </a:stretch>
-        </p:blipFill>
-        <p:spPr bwMode="auto">
-          <a:xfrm>
-            <a:off x="992846" y="243585"/>
-            <a:ext cx="2847975" cy="2686051"/>
-          </a:xfrm>
-          <a:prstGeom prst="rect">
-            <a:avLst/>
-          </a:prstGeom>
-          <a:noFill/>
-          <a:extLst>
-            <a:ext uri="{909E8E84-426E-40DD-AFC4-6F175D3DCCD1}">
-              <a14:hiddenFill xmlns:a14="http://schemas.microsoft.com/office/drawing/2010/main">
-                <a:solidFill>
-                  <a:srgbClr val="FFFFFF"/>
-                </a:solidFill>
-              </a14:hiddenFill>
-            </a:ext>
-          </a:extLst>
-        </p:spPr>
-      </p:pic>
       <p:sp>
         <p:nvSpPr>
           <p:cNvPr id="14" name="TextBox 13"/>
@@ -5347,7 +4952,7 @@
             <a:avLst/>
           </a:prstGeom>
           <a:blipFill>
-            <a:blip r:embed="rId4">
+            <a:blip r:embed="rId3">
               <a:alphaModFix amt="49000"/>
             </a:blip>
             <a:tile tx="0" ty="0" sx="100000" sy="100000" flip="none" algn="tl"/>
@@ -5379,135 +4984,9 @@
               </a:rPr>
               <a:t>3</a:t>
             </a:r>
-            <a:endParaRPr lang="en-GB" sz="4000" dirty="0">
-              <a:latin typeface="Minecrafter" pitchFamily="2" charset="0"/>
-            </a:endParaRPr>
-          </a:p>
-        </p:txBody>
-      </p:sp>
-      <p:pic>
-        <p:nvPicPr>
-          <p:cNvPr id="15" name="Picture 2" descr="Image result for borders corner png"/>
-          <p:cNvPicPr>
-            <a:picLocks noChangeAspect="1" noChangeArrowheads="1"/>
-          </p:cNvPicPr>
-          <p:nvPr/>
-        </p:nvPicPr>
-        <p:blipFill>
-          <a:blip r:embed="rId3">
-            <a:extLst>
-              <a:ext uri="{28A0092B-C50C-407E-A947-70E740481C1C}">
-                <a14:useLocalDpi xmlns:a14="http://schemas.microsoft.com/office/drawing/2010/main" val="0"/>
-              </a:ext>
-            </a:extLst>
-          </a:blip>
-          <a:srcRect/>
-          <a:stretch>
-            <a:fillRect/>
-          </a:stretch>
-        </p:blipFill>
-        <p:spPr bwMode="auto">
-          <a:xfrm rot="5400000">
-            <a:off x="13861985" y="309982"/>
-            <a:ext cx="2847975" cy="2686051"/>
-          </a:xfrm>
-          <a:prstGeom prst="rect">
-            <a:avLst/>
-          </a:prstGeom>
-          <a:noFill/>
-          <a:extLst>
-            <a:ext uri="{909E8E84-426E-40DD-AFC4-6F175D3DCCD1}">
-              <a14:hiddenFill xmlns:a14="http://schemas.microsoft.com/office/drawing/2010/main">
-                <a:solidFill>
-                  <a:srgbClr val="FFFFFF"/>
-                </a:solidFill>
-              </a14:hiddenFill>
-            </a:ext>
-          </a:extLst>
-        </p:spPr>
-      </p:pic>
-      <p:pic>
-        <p:nvPicPr>
-          <p:cNvPr id="16" name="Picture 2" descr="Image result for borders corner png"/>
-          <p:cNvPicPr>
-            <a:picLocks noChangeAspect="1" noChangeArrowheads="1"/>
-          </p:cNvPicPr>
-          <p:nvPr/>
-        </p:nvPicPr>
-        <p:blipFill>
-          <a:blip r:embed="rId3">
-            <a:extLst>
-              <a:ext uri="{28A0092B-C50C-407E-A947-70E740481C1C}">
-                <a14:useLocalDpi xmlns:a14="http://schemas.microsoft.com/office/drawing/2010/main" val="0"/>
-              </a:ext>
-            </a:extLst>
-          </a:blip>
-          <a:srcRect/>
-          <a:stretch>
-            <a:fillRect/>
-          </a:stretch>
-        </p:blipFill>
-        <p:spPr bwMode="auto">
-          <a:xfrm rot="16200000">
-            <a:off x="836638" y="6875415"/>
-            <a:ext cx="2847975" cy="2686051"/>
-          </a:xfrm>
-          <a:prstGeom prst="rect">
-            <a:avLst/>
-          </a:prstGeom>
-          <a:noFill/>
-          <a:extLst>
-            <a:ext uri="{909E8E84-426E-40DD-AFC4-6F175D3DCCD1}">
-              <a14:hiddenFill xmlns:a14="http://schemas.microsoft.com/office/drawing/2010/main">
-                <a:solidFill>
-                  <a:srgbClr val="FFFFFF"/>
-                </a:solidFill>
-              </a14:hiddenFill>
-            </a:ext>
-          </a:extLst>
-        </p:spPr>
-      </p:pic>
-      <p:pic>
-        <p:nvPicPr>
-          <p:cNvPr id="17" name="Picture 2" descr="Image result for borders corner png"/>
-          <p:cNvPicPr>
-            <a:picLocks noChangeAspect="1" noChangeArrowheads="1"/>
-          </p:cNvPicPr>
-          <p:nvPr/>
-        </p:nvPicPr>
-        <p:blipFill>
-          <a:blip r:embed="rId3">
-            <a:extLst>
-              <a:ext uri="{28A0092B-C50C-407E-A947-70E740481C1C}">
-                <a14:useLocalDpi xmlns:a14="http://schemas.microsoft.com/office/drawing/2010/main" val="0"/>
-              </a:ext>
-            </a:extLst>
-          </a:blip>
-          <a:srcRect/>
-          <a:stretch>
-            <a:fillRect/>
-          </a:stretch>
-        </p:blipFill>
-        <p:spPr bwMode="auto">
-          <a:xfrm rot="10800000">
-            <a:off x="13807231" y="6959261"/>
-            <a:ext cx="2847975" cy="2686051"/>
-          </a:xfrm>
-          <a:prstGeom prst="rect">
-            <a:avLst/>
-          </a:prstGeom>
-          <a:noFill/>
-          <a:extLst>
-            <a:ext uri="{909E8E84-426E-40DD-AFC4-6F175D3DCCD1}">
-              <a14:hiddenFill xmlns:a14="http://schemas.microsoft.com/office/drawing/2010/main">
-                <a:solidFill>
-                  <a:srgbClr val="FFFFFF"/>
-                </a:solidFill>
-              </a14:hiddenFill>
-            </a:ext>
-          </a:extLst>
-        </p:spPr>
-      </p:pic>
+          </a:p>
+        </p:txBody>
+      </p:sp>
       <p:sp>
         <p:nvSpPr>
           <p:cNvPr id="5" name="TextBox 4"/>

</xml_diff>

<commit_message>
Added in restrictions on size of house in order to reduce possibility of errors. Ensure these changes are copied to backup folders.
Also started editing and finalizing the tasks.
</commit_message>
<xml_diff>
--- a/programming_challenge/tasks.horizontal.pptx
+++ b/programming_challenge/tasks.horizontal.pptx
@@ -199,7 +199,7 @@
           <a:p>
             <a:fld id="{227BA57D-FEB7-7D40-AB44-A416CA343704}" type="datetimeFigureOut">
               <a:rPr lang="en-US" smtClean="0"/>
-              <a:t>2/15/17</a:t>
+              <a:t>2/20/17</a:t>
             </a:fld>
             <a:endParaRPr lang="en-US"/>
           </a:p>
@@ -598,7 +598,7 @@
           <a:p>
             <a:fld id="{95152C5E-F11D-7D48-B0EF-D154E0F808AA}" type="datetimeFigureOut">
               <a:rPr lang="en-US" smtClean="0"/>
-              <a:t>2/15/17</a:t>
+              <a:t>2/20/17</a:t>
             </a:fld>
             <a:endParaRPr lang="en-US"/>
           </a:p>
@@ -768,7 +768,7 @@
           <a:p>
             <a:fld id="{95152C5E-F11D-7D48-B0EF-D154E0F808AA}" type="datetimeFigureOut">
               <a:rPr lang="en-US" smtClean="0"/>
-              <a:t>2/15/17</a:t>
+              <a:t>2/20/17</a:t>
             </a:fld>
             <a:endParaRPr lang="en-US"/>
           </a:p>
@@ -948,7 +948,7 @@
           <a:p>
             <a:fld id="{95152C5E-F11D-7D48-B0EF-D154E0F808AA}" type="datetimeFigureOut">
               <a:rPr lang="en-US" smtClean="0"/>
-              <a:t>2/15/17</a:t>
+              <a:t>2/20/17</a:t>
             </a:fld>
             <a:endParaRPr lang="en-US"/>
           </a:p>
@@ -1118,7 +1118,7 @@
           <a:p>
             <a:fld id="{95152C5E-F11D-7D48-B0EF-D154E0F808AA}" type="datetimeFigureOut">
               <a:rPr lang="en-US" smtClean="0"/>
-              <a:t>2/15/17</a:t>
+              <a:t>2/20/17</a:t>
             </a:fld>
             <a:endParaRPr lang="en-US"/>
           </a:p>
@@ -1364,7 +1364,7 @@
           <a:p>
             <a:fld id="{95152C5E-F11D-7D48-B0EF-D154E0F808AA}" type="datetimeFigureOut">
               <a:rPr lang="en-US" smtClean="0"/>
-              <a:t>2/15/17</a:t>
+              <a:t>2/20/17</a:t>
             </a:fld>
             <a:endParaRPr lang="en-US"/>
           </a:p>
@@ -1596,7 +1596,7 @@
           <a:p>
             <a:fld id="{95152C5E-F11D-7D48-B0EF-D154E0F808AA}" type="datetimeFigureOut">
               <a:rPr lang="en-US" smtClean="0"/>
-              <a:t>2/15/17</a:t>
+              <a:t>2/20/17</a:t>
             </a:fld>
             <a:endParaRPr lang="en-US"/>
           </a:p>
@@ -1963,7 +1963,7 @@
           <a:p>
             <a:fld id="{95152C5E-F11D-7D48-B0EF-D154E0F808AA}" type="datetimeFigureOut">
               <a:rPr lang="en-US" smtClean="0"/>
-              <a:t>2/15/17</a:t>
+              <a:t>2/20/17</a:t>
             </a:fld>
             <a:endParaRPr lang="en-US"/>
           </a:p>
@@ -2081,7 +2081,7 @@
           <a:p>
             <a:fld id="{95152C5E-F11D-7D48-B0EF-D154E0F808AA}" type="datetimeFigureOut">
               <a:rPr lang="en-US" smtClean="0"/>
-              <a:t>2/15/17</a:t>
+              <a:t>2/20/17</a:t>
             </a:fld>
             <a:endParaRPr lang="en-US"/>
           </a:p>
@@ -2176,7 +2176,7 @@
           <a:p>
             <a:fld id="{95152C5E-F11D-7D48-B0EF-D154E0F808AA}" type="datetimeFigureOut">
               <a:rPr lang="en-US" smtClean="0"/>
-              <a:t>2/15/17</a:t>
+              <a:t>2/20/17</a:t>
             </a:fld>
             <a:endParaRPr lang="en-US"/>
           </a:p>
@@ -2453,7 +2453,7 @@
           <a:p>
             <a:fld id="{95152C5E-F11D-7D48-B0EF-D154E0F808AA}" type="datetimeFigureOut">
               <a:rPr lang="en-US" smtClean="0"/>
-              <a:t>2/15/17</a:t>
+              <a:t>2/20/17</a:t>
             </a:fld>
             <a:endParaRPr lang="en-US"/>
           </a:p>
@@ -2710,7 +2710,7 @@
           <a:p>
             <a:fld id="{95152C5E-F11D-7D48-B0EF-D154E0F808AA}" type="datetimeFigureOut">
               <a:rPr lang="en-US" smtClean="0"/>
-              <a:t>2/15/17</a:t>
+              <a:t>2/20/17</a:t>
             </a:fld>
             <a:endParaRPr lang="en-US"/>
           </a:p>
@@ -2923,7 +2923,7 @@
           <a:p>
             <a:fld id="{95152C5E-F11D-7D48-B0EF-D154E0F808AA}" type="datetimeFigureOut">
               <a:rPr lang="en-US" smtClean="0"/>
-              <a:t>2/15/17</a:t>
+              <a:t>2/20/17</a:t>
             </a:fld>
             <a:endParaRPr lang="en-US"/>
           </a:p>
@@ -3338,7 +3338,7 @@
         </p:nvPicPr>
         <p:blipFill>
           <a:blip r:embed="rId2">
-            <a:alphaModFix amt="70000"/>
+            <a:alphaModFix/>
             <a:extLst>
               <a:ext uri="{28A0092B-C50C-407E-A947-70E740481C1C}">
                 <a14:useLocalDpi xmlns:a14="http://schemas.microsoft.com/office/drawing/2010/main" val="0"/>
@@ -3351,8 +3351,8 @@
         </p:blipFill>
         <p:spPr>
           <a:xfrm>
-            <a:off x="314496" y="179383"/>
-            <a:ext cx="16985714" cy="9549800"/>
+            <a:off x="0" y="0"/>
+            <a:ext cx="17666583" cy="9932602"/>
           </a:xfrm>
           <a:prstGeom prst="rect">
             <a:avLst/>
@@ -3361,22 +3361,22 @@
       </p:pic>
       <p:sp>
         <p:nvSpPr>
-          <p:cNvPr id="33" name="Rounded Rectangle 32"/>
+          <p:cNvPr id="16" name="Rounded Rectangle 15"/>
           <p:cNvSpPr/>
           <p:nvPr/>
         </p:nvSpPr>
         <p:spPr>
           <a:xfrm>
-            <a:off x="1070635" y="1644804"/>
-            <a:ext cx="7735530" cy="7703092"/>
+            <a:off x="276557" y="1157201"/>
+            <a:ext cx="16985714" cy="8619914"/>
           </a:xfrm>
           <a:prstGeom prst="roundRect">
             <a:avLst/>
           </a:prstGeom>
           <a:solidFill>
-            <a:schemeClr val="bg1">
-              <a:alpha val="58000"/>
-            </a:schemeClr>
+            <a:srgbClr val="FEFDFF">
+              <a:alpha val="74902"/>
+            </a:srgbClr>
           </a:solidFill>
           <a:ln>
             <a:noFill/>
@@ -3403,7 +3403,7 @@
           <a:lstStyle/>
           <a:p>
             <a:pPr algn="ctr"/>
-            <a:endParaRPr lang="en-US" sz="800"/>
+            <a:endParaRPr lang="en-US"/>
           </a:p>
         </p:txBody>
       </p:sp>
@@ -3432,7 +3432,6 @@
             <a:pPr algn="ctr"/>
             <a:r>
               <a:rPr lang="en-GB" sz="3600" dirty="0">
-                <a:latin typeface="Minecrafter" pitchFamily="2" charset="0"/>
                 <a:cs typeface="Microsoft Tai Le" panose="020B0502040204020203" pitchFamily="34" charset="0"/>
               </a:rPr>
               <a:t>10 min programming challenge!</a:t>
@@ -3448,7 +3447,7 @@
         </p:nvSpPr>
         <p:spPr>
           <a:xfrm>
-            <a:off x="4182382" y="1116115"/>
+            <a:off x="4051611" y="633981"/>
             <a:ext cx="9669587" cy="523220"/>
           </a:xfrm>
           <a:prstGeom prst="rect">
@@ -3505,7 +3504,7 @@
         </p:blipFill>
         <p:spPr>
           <a:xfrm>
-            <a:off x="11583069" y="417552"/>
+            <a:off x="13721198" y="256288"/>
             <a:ext cx="688605" cy="688605"/>
           </a:xfrm>
           <a:prstGeom prst="rect">
@@ -3515,14 +3514,14 @@
       </p:pic>
       <p:sp>
         <p:nvSpPr>
-          <p:cNvPr id="12" name="TextBox 11"/>
+          <p:cNvPr id="13" name="TextBox 12"/>
           <p:cNvSpPr txBox="1"/>
           <p:nvPr/>
         </p:nvSpPr>
         <p:spPr>
           <a:xfrm>
-            <a:off x="5853079" y="621675"/>
-            <a:ext cx="5408665" cy="584775"/>
+            <a:off x="555255" y="7095263"/>
+            <a:ext cx="6884020" cy="2246769"/>
           </a:xfrm>
           <a:prstGeom prst="rect">
             <a:avLst/>
@@ -3535,54 +3534,22 @@
           </a:bodyPr>
           <a:lstStyle/>
           <a:p>
-            <a:pPr algn="ctr"/>
-            <a:r>
-              <a:rPr lang="en-GB" sz="3200" dirty="0"/>
-              <a:t>Use Python in </a:t>
-            </a:r>
-            <a:r>
-              <a:rPr lang="en-GB" sz="3200" dirty="0" smtClean="0"/>
-              <a:t>Minecraft!</a:t>
-            </a:r>
-            <a:endParaRPr lang="en-GB" sz="3200" dirty="0"/>
-          </a:p>
-        </p:txBody>
-      </p:sp>
-      <p:sp>
-        <p:nvSpPr>
-          <p:cNvPr id="13" name="TextBox 12"/>
-          <p:cNvSpPr txBox="1"/>
-          <p:nvPr/>
-        </p:nvSpPr>
-        <p:spPr>
-          <a:xfrm>
-            <a:off x="1757635" y="7103085"/>
-            <a:ext cx="5735985" cy="1815882"/>
-          </a:xfrm>
-          <a:prstGeom prst="rect">
-            <a:avLst/>
-          </a:prstGeom>
-          <a:noFill/>
-        </p:spPr>
-        <p:txBody>
-          <a:bodyPr wrap="square" rtlCol="0">
-            <a:spAutoFit/>
-          </a:bodyPr>
-          <a:lstStyle/>
-          <a:p>
             <a:pPr marL="514350" indent="-514350">
               <a:buFont typeface="+mj-lt"/>
               <a:buAutoNum type="arabicPeriod" startAt="3"/>
             </a:pPr>
             <a:r>
               <a:rPr lang="en-US" sz="2800" dirty="0" smtClean="0"/>
-              <a:t>Close the computer by pressing </a:t>
-            </a:r>
-            <a:r>
-              <a:rPr lang="en-US" sz="2800" b="1" dirty="0" smtClean="0"/>
+              <a:t>Close the computer by </a:t>
+            </a:r>
+            <a:r>
+              <a:rPr lang="en-US" sz="2800" smtClean="0"/>
+              <a:t>pressing </a:t>
+            </a:r>
+            <a:r>
+              <a:rPr lang="en-US" sz="2800" b="1" smtClean="0"/>
               <a:t>E</a:t>
             </a:r>
-            <a:endParaRPr lang="en-US" sz="2800" b="1" dirty="0"/>
           </a:p>
           <a:p>
             <a:pPr marL="514350" indent="-514350">
@@ -3596,6 +3563,13 @@
               <a:buFont typeface="+mj-lt"/>
               <a:buAutoNum type="arabicPeriod" startAt="3"/>
             </a:pPr>
+            <a:endParaRPr lang="en-US" sz="2800" b="1" dirty="0"/>
+          </a:p>
+          <a:p>
+            <a:pPr marL="514350" indent="-514350">
+              <a:buFont typeface="+mj-lt"/>
+              <a:buAutoNum type="arabicPeriod" startAt="3"/>
+            </a:pPr>
             <a:r>
               <a:rPr lang="en-US" sz="2800" dirty="0" smtClean="0"/>
               <a:t>Right-click with the script in your hand, what happens?</a:t>
@@ -3611,7 +3585,7 @@
         </p:nvSpPr>
         <p:spPr>
           <a:xfrm>
-            <a:off x="1742484" y="1916118"/>
+            <a:off x="1311038" y="1247661"/>
             <a:ext cx="2089197" cy="707886"/>
           </a:xfrm>
           <a:prstGeom prst="rect">
@@ -3652,62 +3626,14 @@
       </p:sp>
       <p:sp>
         <p:nvSpPr>
-          <p:cNvPr id="22" name="Rounded Rectangle 21"/>
-          <p:cNvSpPr/>
-          <p:nvPr/>
-        </p:nvSpPr>
-        <p:spPr>
-          <a:xfrm>
-            <a:off x="8806797" y="1631369"/>
-            <a:ext cx="7735530" cy="7703092"/>
-          </a:xfrm>
-          <a:prstGeom prst="roundRect">
-            <a:avLst/>
-          </a:prstGeom>
-          <a:solidFill>
-            <a:schemeClr val="bg1">
-              <a:alpha val="58000"/>
-            </a:schemeClr>
-          </a:solidFill>
-          <a:ln>
-            <a:noFill/>
-          </a:ln>
-        </p:spPr>
-        <p:style>
-          <a:lnRef idx="2">
-            <a:schemeClr val="accent1">
-              <a:shade val="50000"/>
-            </a:schemeClr>
-          </a:lnRef>
-          <a:fillRef idx="1">
-            <a:schemeClr val="accent1"/>
-          </a:fillRef>
-          <a:effectRef idx="0">
-            <a:schemeClr val="accent1"/>
-          </a:effectRef>
-          <a:fontRef idx="minor">
-            <a:schemeClr val="lt1"/>
-          </a:fontRef>
-        </p:style>
-        <p:txBody>
-          <a:bodyPr rtlCol="0" anchor="ctr"/>
-          <a:lstStyle/>
-          <a:p>
-            <a:pPr algn="ctr"/>
-            <a:endParaRPr lang="en-US" sz="800"/>
-          </a:p>
-        </p:txBody>
-      </p:sp>
-      <p:sp>
-        <p:nvSpPr>
           <p:cNvPr id="3" name="Rectangle 2"/>
           <p:cNvSpPr/>
           <p:nvPr/>
         </p:nvSpPr>
         <p:spPr>
           <a:xfrm>
-            <a:off x="9017175" y="2042623"/>
-            <a:ext cx="7054097" cy="6986528"/>
+            <a:off x="8611092" y="1157201"/>
+            <a:ext cx="8183981" cy="7848302"/>
           </a:xfrm>
           <a:prstGeom prst="rect">
             <a:avLst/>
@@ -3771,13 +3697,32 @@
             </a:r>
             <a:r>
               <a:rPr lang="en-US" sz="2800" b="1" dirty="0" smtClean="0"/>
-              <a:t> </a:t>
+              <a:t> 	                               </a:t>
             </a:r>
             <a:r>
               <a:rPr lang="en-US" sz="2800" i="1" dirty="0" smtClean="0"/>
-              <a:t>(this is the same script as before, except now we can see the code!)</a:t>
+              <a:t>(</a:t>
+            </a:r>
+            <a:r>
+              <a:rPr lang="en-US" sz="2800" i="1" dirty="0" smtClean="0"/>
+              <a:t>this is the same script as before</a:t>
+            </a:r>
+            <a:r>
+              <a:rPr lang="en-US" sz="2800" i="1" dirty="0" smtClean="0"/>
+              <a:t>,                              </a:t>
+            </a:r>
+            <a:r>
+              <a:rPr lang="en-US" sz="2800" i="1" dirty="0" smtClean="0"/>
+              <a:t>except now we can see the code!)</a:t>
             </a:r>
             <a:endParaRPr lang="en-US" sz="2800" b="1" i="1" dirty="0"/>
+          </a:p>
+          <a:p>
+            <a:pPr marL="342900" indent="-342900">
+              <a:buFont typeface="+mj-lt"/>
+              <a:buAutoNum type="arabicPeriod" startAt="5"/>
+            </a:pPr>
+            <a:endParaRPr lang="en-US" sz="2800" dirty="0" smtClean="0"/>
           </a:p>
           <a:p>
             <a:pPr marL="342900" indent="-342900">
@@ -3802,6 +3747,10 @@
             <a:r>
               <a:rPr lang="en-US" sz="2800" dirty="0" smtClean="0"/>
               <a:t>says </a:t>
+            </a:r>
+            <a:r>
+              <a:rPr lang="en-US" sz="2800" dirty="0" smtClean="0"/>
+              <a:t>                    </a:t>
             </a:r>
             <a:r>
               <a:rPr lang="en-US" sz="2800" b="1" dirty="0" err="1" smtClean="0"/>
@@ -3844,8 +3793,16 @@
               <a:t> </a:t>
             </a:r>
             <a:r>
+              <a:rPr lang="en-US" sz="2800" dirty="0" smtClean="0"/>
+              <a:t>                              </a:t>
+            </a:r>
+            <a:r>
               <a:rPr lang="en-US" sz="2800" i="1" dirty="0" smtClean="0"/>
-              <a:t>(this is called a FUNCTION, functions tell the computer what to do)</a:t>
+              <a:t>(</a:t>
+            </a:r>
+            <a:r>
+              <a:rPr lang="en-US" sz="2800" i="1" dirty="0" smtClean="0"/>
+              <a:t>this is called a FUNCTION, functions tell the computer what to do)</a:t>
             </a:r>
             <a:endParaRPr lang="en-US" sz="2800" i="1" dirty="0"/>
           </a:p>
@@ -3928,8 +3885,8 @@
         </p:blipFill>
         <p:spPr>
           <a:xfrm>
-            <a:off x="6171048" y="2191119"/>
-            <a:ext cx="1304222" cy="1304222"/>
+            <a:off x="5729917" y="1969236"/>
+            <a:ext cx="1763704" cy="1763704"/>
           </a:xfrm>
           <a:prstGeom prst="rect">
             <a:avLst/>
@@ -3944,8 +3901,8 @@
         </p:nvSpPr>
         <p:spPr>
           <a:xfrm>
-            <a:off x="1766598" y="2624004"/>
-            <a:ext cx="3887606" cy="954107"/>
+            <a:off x="494031" y="1978550"/>
+            <a:ext cx="5160174" cy="954107"/>
           </a:xfrm>
           <a:prstGeom prst="rect">
             <a:avLst/>
@@ -3977,8 +3934,8 @@
         </p:nvSpPr>
         <p:spPr>
           <a:xfrm>
-            <a:off x="1765868" y="3872470"/>
-            <a:ext cx="6354549" cy="2246769"/>
+            <a:off x="494030" y="3872470"/>
+            <a:ext cx="7626387" cy="1384995"/>
           </a:xfrm>
           <a:prstGeom prst="rect">
             <a:avLst/>
@@ -4076,9 +4033,12 @@
               <a:gd name="adj5" fmla="val 94459"/>
             </a:avLst>
           </a:prstGeom>
+          <a:solidFill>
+            <a:schemeClr val="accent4"/>
+          </a:solidFill>
           <a:ln>
             <a:solidFill>
-              <a:schemeClr val="tx1"/>
+              <a:schemeClr val="accent4"/>
             </a:solidFill>
           </a:ln>
         </p:spPr>
@@ -4117,8 +4077,8 @@
         </p:nvSpPr>
         <p:spPr>
           <a:xfrm>
-            <a:off x="7077455" y="5255416"/>
-            <a:ext cx="738656" cy="203552"/>
+            <a:off x="7077455" y="5222501"/>
+            <a:ext cx="738656" cy="290254"/>
           </a:xfrm>
           <a:prstGeom prst="ellipse">
             <a:avLst/>
@@ -4126,7 +4086,7 @@
           <a:noFill/>
           <a:ln>
             <a:solidFill>
-              <a:srgbClr val="FF0000"/>
+              <a:schemeClr val="accent4"/>
             </a:solidFill>
           </a:ln>
         </p:spPr>
@@ -4155,6 +4115,188 @@
           </a:p>
         </p:txBody>
       </p:sp>
+      <p:cxnSp>
+        <p:nvCxnSpPr>
+          <p:cNvPr id="5" name="Straight Arrow Connector 4"/>
+          <p:cNvCxnSpPr/>
+          <p:nvPr/>
+        </p:nvCxnSpPr>
+        <p:spPr>
+          <a:xfrm>
+            <a:off x="3400235" y="2747530"/>
+            <a:ext cx="2713694" cy="103559"/>
+          </a:xfrm>
+          <a:prstGeom prst="straightConnector1">
+            <a:avLst/>
+          </a:prstGeom>
+          <a:ln w="53975">
+            <a:solidFill>
+              <a:schemeClr val="accent4"/>
+            </a:solidFill>
+            <a:headEnd w="lg" len="med"/>
+            <a:tailEnd type="triangle" w="lg" len="lg"/>
+          </a:ln>
+        </p:spPr>
+        <p:style>
+          <a:lnRef idx="1">
+            <a:schemeClr val="accent1"/>
+          </a:lnRef>
+          <a:fillRef idx="0">
+            <a:schemeClr val="accent1"/>
+          </a:fillRef>
+          <a:effectRef idx="0">
+            <a:schemeClr val="accent1"/>
+          </a:effectRef>
+          <a:fontRef idx="minor">
+            <a:schemeClr val="tx1"/>
+          </a:fontRef>
+        </p:style>
+      </p:cxnSp>
+      <p:pic>
+        <p:nvPicPr>
+          <p:cNvPr id="8" name="Picture 7"/>
+          <p:cNvPicPr>
+            <a:picLocks noChangeAspect="1"/>
+          </p:cNvPicPr>
+          <p:nvPr/>
+        </p:nvPicPr>
+        <p:blipFill>
+          <a:blip r:embed="rId8">
+            <a:extLst>
+              <a:ext uri="{28A0092B-C50C-407E-A947-70E740481C1C}">
+                <a14:useLocalDpi xmlns:a14="http://schemas.microsoft.com/office/drawing/2010/main" val="0"/>
+              </a:ext>
+            </a:extLst>
+          </a:blip>
+          <a:stretch>
+            <a:fillRect/>
+          </a:stretch>
+        </p:blipFill>
+        <p:spPr>
+          <a:xfrm>
+            <a:off x="14242373" y="2932657"/>
+            <a:ext cx="2552700" cy="2882900"/>
+          </a:xfrm>
+          <a:prstGeom prst="rect">
+            <a:avLst/>
+          </a:prstGeom>
+        </p:spPr>
+      </p:pic>
+      <p:sp>
+        <p:nvSpPr>
+          <p:cNvPr id="15" name="Oval 14"/>
+          <p:cNvSpPr/>
+          <p:nvPr/>
+        </p:nvSpPr>
+        <p:spPr>
+          <a:xfrm>
+            <a:off x="14611437" y="4135259"/>
+            <a:ext cx="1452283" cy="453279"/>
+          </a:xfrm>
+          <a:prstGeom prst="ellipse">
+            <a:avLst/>
+          </a:prstGeom>
+          <a:noFill/>
+          <a:ln>
+            <a:solidFill>
+              <a:schemeClr val="accent4"/>
+            </a:solidFill>
+          </a:ln>
+        </p:spPr>
+        <p:style>
+          <a:lnRef idx="2">
+            <a:schemeClr val="accent1">
+              <a:shade val="50000"/>
+            </a:schemeClr>
+          </a:lnRef>
+          <a:fillRef idx="1">
+            <a:schemeClr val="accent1"/>
+          </a:fillRef>
+          <a:effectRef idx="0">
+            <a:schemeClr val="accent1"/>
+          </a:effectRef>
+          <a:fontRef idx="minor">
+            <a:schemeClr val="lt1"/>
+          </a:fontRef>
+        </p:style>
+        <p:txBody>
+          <a:bodyPr rtlCol="0" anchor="ctr"/>
+          <a:lstStyle/>
+          <a:p>
+            <a:pPr algn="ctr"/>
+            <a:endParaRPr lang="en-US"/>
+          </a:p>
+        </p:txBody>
+      </p:sp>
+      <p:cxnSp>
+        <p:nvCxnSpPr>
+          <p:cNvPr id="25" name="Straight Arrow Connector 24"/>
+          <p:cNvCxnSpPr>
+            <a:endCxn id="15" idx="1"/>
+          </p:cNvCxnSpPr>
+          <p:nvPr/>
+        </p:nvCxnSpPr>
+        <p:spPr>
+          <a:xfrm>
+            <a:off x="13980731" y="3260088"/>
+            <a:ext cx="843388" cy="941552"/>
+          </a:xfrm>
+          <a:prstGeom prst="straightConnector1">
+            <a:avLst/>
+          </a:prstGeom>
+          <a:ln w="53975">
+            <a:solidFill>
+              <a:schemeClr val="accent4"/>
+            </a:solidFill>
+            <a:headEnd w="lg" len="med"/>
+            <a:tailEnd type="triangle" w="lg" len="lg"/>
+          </a:ln>
+        </p:spPr>
+        <p:style>
+          <a:lnRef idx="1">
+            <a:schemeClr val="accent1"/>
+          </a:lnRef>
+          <a:fillRef idx="0">
+            <a:schemeClr val="accent1"/>
+          </a:fillRef>
+          <a:effectRef idx="0">
+            <a:schemeClr val="accent1"/>
+          </a:effectRef>
+          <a:fontRef idx="minor">
+            <a:schemeClr val="tx1"/>
+          </a:fontRef>
+        </p:style>
+      </p:cxnSp>
+      <p:pic>
+        <p:nvPicPr>
+          <p:cNvPr id="23" name="Picture 22"/>
+          <p:cNvPicPr>
+            <a:picLocks noChangeAspect="1"/>
+          </p:cNvPicPr>
+          <p:nvPr/>
+        </p:nvPicPr>
+        <p:blipFill>
+          <a:blip r:embed="rId9">
+            <a:extLst>
+              <a:ext uri="{28A0092B-C50C-407E-A947-70E740481C1C}">
+                <a14:useLocalDpi xmlns:a14="http://schemas.microsoft.com/office/drawing/2010/main" val="0"/>
+              </a:ext>
+            </a:extLst>
+          </a:blip>
+          <a:stretch>
+            <a:fillRect/>
+          </a:stretch>
+        </p:blipFill>
+        <p:spPr>
+          <a:xfrm>
+            <a:off x="3257628" y="169920"/>
+            <a:ext cx="782886" cy="782886"/>
+          </a:xfrm>
+          <a:prstGeom prst="rect">
+            <a:avLst/>
+          </a:prstGeom>
+        </p:spPr>
+      </p:pic>
     </p:spTree>
     <p:extLst>
       <p:ext uri="{BB962C8B-B14F-4D97-AF65-F5344CB8AC3E}">
@@ -4368,7 +4510,7 @@
         <p:spPr>
           <a:xfrm>
             <a:off x="1614850" y="2157764"/>
-            <a:ext cx="5727022" cy="6986528"/>
+            <a:ext cx="5727022" cy="7417415"/>
           </a:xfrm>
           <a:prstGeom prst="rect">
             <a:avLst/>
@@ -4431,6 +4573,13 @@
               <a:buAutoNum type="arabicPeriod"/>
             </a:pPr>
             <a:endParaRPr lang="en-US" sz="2800" dirty="0"/>
+          </a:p>
+          <a:p>
+            <a:pPr marL="514350" indent="-514350">
+              <a:buFont typeface="+mj-lt"/>
+              <a:buAutoNum type="arabicPeriod"/>
+            </a:pPr>
+            <a:endParaRPr lang="en-US" sz="2800" dirty="0" smtClean="0"/>
           </a:p>
           <a:p>
             <a:pPr marL="514350" indent="-514350">
@@ -4515,7 +4664,7 @@
         </p:blipFill>
         <p:spPr>
           <a:xfrm>
-            <a:off x="5683402" y="3494056"/>
+            <a:off x="3678711" y="3727138"/>
             <a:ext cx="2859363" cy="2389915"/>
           </a:xfrm>
           <a:prstGeom prst="rect">
@@ -4531,7 +4680,7 @@
         </p:nvSpPr>
         <p:spPr>
           <a:xfrm rot="16200000" flipH="1">
-            <a:off x="4761483" y="4537134"/>
+            <a:off x="2756792" y="4770216"/>
             <a:ext cx="1975099" cy="554551"/>
           </a:xfrm>
           <a:prstGeom prst="uturnArrow">
@@ -4742,7 +4891,7 @@
         </p:nvSpPr>
         <p:spPr>
           <a:xfrm>
-            <a:off x="7361175" y="3929536"/>
+            <a:off x="5356484" y="4162618"/>
             <a:ext cx="1181589" cy="212696"/>
           </a:xfrm>
           <a:prstGeom prst="ellipse">

</xml_diff>

<commit_message>
First complete draft of tasks
</commit_message>
<xml_diff>
--- a/programming_challenge/tasks.horizontal.pptx
+++ b/programming_challenge/tasks.horizontal.pptx
@@ -5,12 +5,13 @@
     <p:sldMasterId id="2147483672" r:id="rId1"/>
   </p:sldMasterIdLst>
   <p:notesMasterIdLst>
-    <p:notesMasterId r:id="rId5"/>
+    <p:notesMasterId r:id="rId6"/>
   </p:notesMasterIdLst>
   <p:sldIdLst>
     <p:sldId id="257" r:id="rId2"/>
     <p:sldId id="258" r:id="rId3"/>
-    <p:sldId id="259" r:id="rId4"/>
+    <p:sldId id="260" r:id="rId4"/>
+    <p:sldId id="261" r:id="rId5"/>
   </p:sldIdLst>
   <p:sldSz cx="17610138" cy="9906000"/>
   <p:notesSz cx="6858000" cy="9144000"/>
@@ -3827,12 +3828,8 @@
               <a:t>“</a:t>
             </a:r>
             <a:r>
-              <a:rPr lang="en-US" sz="2800" b="1" dirty="0"/>
-              <a:t>World</a:t>
-            </a:r>
-            <a:r>
               <a:rPr lang="en-US" sz="2800" dirty="0"/>
-              <a:t>” to </a:t>
+              <a:t>World” to </a:t>
             </a:r>
             <a:r>
               <a:rPr lang="en-US" sz="2800" dirty="0" smtClean="0"/>
@@ -3919,8 +3916,20 @@
               <a:buAutoNum type="arabicPeriod"/>
             </a:pPr>
             <a:r>
+              <a:rPr lang="en-US" sz="2800" dirty="0" smtClean="0"/>
+              <a:t>Load </a:t>
+            </a:r>
+            <a:r>
+              <a:rPr lang="en-US" sz="2800" b="1" dirty="0" smtClean="0"/>
+              <a:t>World1</a:t>
+            </a:r>
+            <a:r>
+              <a:rPr lang="en-US" sz="2800" dirty="0" smtClean="0"/>
+              <a:t> then find </a:t>
+            </a:r>
+            <a:r>
               <a:rPr lang="en-US" sz="2800" dirty="0"/>
-              <a:t>Find and right-click the computer block</a:t>
+              <a:t>and right-click the computer block</a:t>
             </a:r>
             <a:endParaRPr lang="en-GB" sz="2800" dirty="0"/>
           </a:p>
@@ -3977,7 +3986,15 @@
             </a:r>
             <a:r>
               <a:rPr lang="en-US" sz="2800" i="1" dirty="0" smtClean="0"/>
-              <a:t>(this is called a SCRIPT, 		          scripts contain 			            lines of code)</a:t>
+              <a:t>(this is called a SCRIPT, 		          scripts </a:t>
+            </a:r>
+            <a:r>
+              <a:rPr lang="en-US" sz="2800" i="1" dirty="0" smtClean="0"/>
+              <a:t>contain lines </a:t>
+            </a:r>
+            <a:r>
+              <a:rPr lang="en-US" sz="2800" i="1" dirty="0" smtClean="0"/>
+              <a:t>of code)</a:t>
             </a:r>
             <a:endParaRPr lang="en-US" sz="2800" i="1" dirty="0"/>
           </a:p>
@@ -4034,11 +4051,11 @@
             </a:avLst>
           </a:prstGeom>
           <a:solidFill>
-            <a:schemeClr val="accent4"/>
+            <a:srgbClr val="FFC000"/>
           </a:solidFill>
           <a:ln>
             <a:solidFill>
-              <a:schemeClr val="accent4"/>
+              <a:schemeClr val="tx1"/>
             </a:solidFill>
           </a:ln>
         </p:spPr>
@@ -4123,15 +4140,15 @@
         </p:nvCxnSpPr>
         <p:spPr>
           <a:xfrm>
-            <a:off x="3400235" y="2747530"/>
-            <a:ext cx="2713694" cy="103559"/>
+            <a:off x="5486400" y="2707341"/>
+            <a:ext cx="627529" cy="143748"/>
           </a:xfrm>
           <a:prstGeom prst="straightConnector1">
             <a:avLst/>
           </a:prstGeom>
           <a:ln w="53975">
             <a:solidFill>
-              <a:schemeClr val="accent4"/>
+              <a:schemeClr val="tx1"/>
             </a:solidFill>
             <a:headEnd w="lg" len="med"/>
             <a:tailEnd type="triangle" w="lg" len="lg"/>
@@ -4246,7 +4263,7 @@
           </a:prstGeom>
           <a:ln w="53975">
             <a:solidFill>
-              <a:schemeClr val="accent4"/>
+              <a:schemeClr val="tx1"/>
             </a:solidFill>
             <a:headEnd w="lg" len="med"/>
             <a:tailEnd type="triangle" w="lg" len="lg"/>
@@ -4329,7 +4346,7 @@
       </p:grpSpPr>
       <p:pic>
         <p:nvPicPr>
-          <p:cNvPr id="9" name="Picture 8"/>
+          <p:cNvPr id="12" name="Picture 11"/>
           <p:cNvPicPr>
             <a:picLocks noChangeAspect="1"/>
           </p:cNvPicPr>
@@ -4337,7 +4354,7 @@
         </p:nvPicPr>
         <p:blipFill>
           <a:blip r:embed="rId2">
-            <a:alphaModFix amt="70000"/>
+            <a:alphaModFix/>
             <a:extLst>
               <a:ext uri="{28A0092B-C50C-407E-A947-70E740481C1C}">
                 <a14:useLocalDpi xmlns:a14="http://schemas.microsoft.com/office/drawing/2010/main" val="0"/>
@@ -4350,8 +4367,8 @@
         </p:blipFill>
         <p:spPr>
           <a:xfrm>
-            <a:off x="312675" y="202775"/>
-            <a:ext cx="16985714" cy="9549800"/>
+            <a:off x="0" y="-11199"/>
+            <a:ext cx="17666583" cy="9943801"/>
           </a:xfrm>
           <a:prstGeom prst="rect">
             <a:avLst/>
@@ -4360,22 +4377,22 @@
       </p:pic>
       <p:sp>
         <p:nvSpPr>
-          <p:cNvPr id="25" name="Rounded Rectangle 24"/>
+          <p:cNvPr id="13" name="Rounded Rectangle 12"/>
           <p:cNvSpPr/>
           <p:nvPr/>
         </p:nvSpPr>
         <p:spPr>
           <a:xfrm>
-            <a:off x="8805284" y="316155"/>
-            <a:ext cx="7734897" cy="9231199"/>
+            <a:off x="276557" y="197224"/>
+            <a:ext cx="16985714" cy="9579891"/>
           </a:xfrm>
           <a:prstGeom prst="roundRect">
             <a:avLst/>
           </a:prstGeom>
           <a:solidFill>
-            <a:schemeClr val="bg1">
-              <a:alpha val="58000"/>
-            </a:schemeClr>
+            <a:srgbClr val="FEFDFF">
+              <a:alpha val="74902"/>
+            </a:srgbClr>
           </a:solidFill>
           <a:ln>
             <a:noFill/>
@@ -4402,55 +4419,7 @@
           <a:lstStyle/>
           <a:p>
             <a:pPr algn="ctr"/>
-            <a:endParaRPr lang="en-US" sz="800"/>
-          </a:p>
-        </p:txBody>
-      </p:sp>
-      <p:sp>
-        <p:nvSpPr>
-          <p:cNvPr id="23" name="Rounded Rectangle 22"/>
-          <p:cNvSpPr/>
-          <p:nvPr/>
-        </p:nvSpPr>
-        <p:spPr>
-          <a:xfrm>
-            <a:off x="1070635" y="330243"/>
-            <a:ext cx="7734897" cy="9231199"/>
-          </a:xfrm>
-          <a:prstGeom prst="roundRect">
-            <a:avLst/>
-          </a:prstGeom>
-          <a:solidFill>
-            <a:schemeClr val="bg1">
-              <a:alpha val="58000"/>
-            </a:schemeClr>
-          </a:solidFill>
-          <a:ln>
-            <a:noFill/>
-          </a:ln>
-        </p:spPr>
-        <p:style>
-          <a:lnRef idx="2">
-            <a:schemeClr val="accent1">
-              <a:shade val="50000"/>
-            </a:schemeClr>
-          </a:lnRef>
-          <a:fillRef idx="1">
-            <a:schemeClr val="accent1"/>
-          </a:fillRef>
-          <a:effectRef idx="0">
-            <a:schemeClr val="accent1"/>
-          </a:effectRef>
-          <a:fontRef idx="minor">
-            <a:schemeClr val="lt1"/>
-          </a:fontRef>
-        </p:style>
-        <p:txBody>
-          <a:bodyPr rtlCol="0" anchor="ctr"/>
-          <a:lstStyle/>
-          <a:p>
-            <a:pPr algn="ctr"/>
-            <a:endParaRPr lang="en-US" sz="800"/>
+            <a:endParaRPr lang="en-US"/>
           </a:p>
         </p:txBody>
       </p:sp>
@@ -4462,7 +4431,7 @@
         </p:nvSpPr>
         <p:spPr>
           <a:xfrm>
-            <a:off x="1809136" y="813652"/>
+            <a:off x="1693248" y="269012"/>
             <a:ext cx="2089197" cy="707886"/>
           </a:xfrm>
           <a:prstGeom prst="rect">
@@ -4509,7 +4478,7 @@
         </p:nvSpPr>
         <p:spPr>
           <a:xfrm>
-            <a:off x="1614850" y="2157764"/>
+            <a:off x="410888" y="1251993"/>
             <a:ext cx="5727022" cy="7417415"/>
           </a:xfrm>
           <a:prstGeom prst="rect">
@@ -4528,15 +4497,19 @@
             </a:pPr>
             <a:r>
               <a:rPr lang="en-US" sz="2800" dirty="0" smtClean="0"/>
-              <a:t>From the computer block, take the script called “</a:t>
-            </a:r>
-            <a:r>
-              <a:rPr lang="en-US" sz="2800" dirty="0" err="1" smtClean="0"/>
+              <a:t>From the computer block, take the script called </a:t>
+            </a:r>
+            <a:r>
+              <a:rPr lang="en-US" sz="2800" b="1" dirty="0" err="1" smtClean="0"/>
               <a:t>text_to_blocks</a:t>
             </a:r>
             <a:r>
               <a:rPr lang="en-US" sz="2800" dirty="0" smtClean="0"/>
-              <a:t>”, and drag it to your inventory</a:t>
+              <a:t>, </a:t>
+            </a:r>
+            <a:r>
+              <a:rPr lang="en-US" sz="2800" dirty="0" smtClean="0"/>
+              <a:t>and drag it to your inventory</a:t>
             </a:r>
           </a:p>
           <a:p>
@@ -4664,7 +4637,7 @@
         </p:blipFill>
         <p:spPr>
           <a:xfrm>
-            <a:off x="3678711" y="3727138"/>
+            <a:off x="3782445" y="2848597"/>
             <a:ext cx="2859363" cy="2389915"/>
           </a:xfrm>
           <a:prstGeom prst="rect">
@@ -4680,7 +4653,7 @@
         </p:nvSpPr>
         <p:spPr>
           <a:xfrm rot="16200000" flipH="1">
-            <a:off x="2756792" y="4770216"/>
+            <a:off x="2860526" y="3891675"/>
             <a:ext cx="1975099" cy="554551"/>
           </a:xfrm>
           <a:prstGeom prst="uturnArrow">
@@ -4692,6 +4665,9 @@
               <a:gd name="adj5" fmla="val 54333"/>
             </a:avLst>
           </a:prstGeom>
+          <a:solidFill>
+            <a:schemeClr val="accent4"/>
+          </a:solidFill>
           <a:ln>
             <a:solidFill>
               <a:schemeClr val="tx1"/>
@@ -4733,8 +4709,8 @@
         </p:nvSpPr>
         <p:spPr>
           <a:xfrm>
-            <a:off x="4035232" y="709035"/>
-            <a:ext cx="3769387" cy="954107"/>
+            <a:off x="3933409" y="187000"/>
+            <a:ext cx="4600991" cy="1077218"/>
           </a:xfrm>
           <a:prstGeom prst="rect">
             <a:avLst/>
@@ -4748,18 +4724,18 @@
           <a:lstStyle/>
           <a:p>
             <a:r>
-              <a:rPr lang="en-US" sz="2800" dirty="0" smtClean="0"/>
+              <a:rPr lang="en-US" sz="3200" dirty="0" smtClean="0"/>
               <a:t>Now we’ll try something a bit </a:t>
             </a:r>
             <a:r>
-              <a:rPr lang="en-US" sz="2800" b="1" dirty="0" smtClean="0"/>
+              <a:rPr lang="en-US" sz="3200" b="1" dirty="0" smtClean="0"/>
               <a:t>BIGGER</a:t>
             </a:r>
             <a:r>
-              <a:rPr lang="is-IS" sz="2800" dirty="0" smtClean="0"/>
+              <a:rPr lang="is-IS" sz="3200" dirty="0" smtClean="0"/>
               <a:t>…</a:t>
             </a:r>
-            <a:endParaRPr lang="en-US" sz="2800" dirty="0"/>
+            <a:endParaRPr lang="en-US" sz="3200" dirty="0"/>
           </a:p>
         </p:txBody>
       </p:sp>
@@ -4771,7 +4747,7 @@
         </p:nvSpPr>
         <p:spPr>
           <a:xfrm>
-            <a:off x="9377530" y="549038"/>
+            <a:off x="8833291" y="1251993"/>
             <a:ext cx="6750904" cy="5262979"/>
           </a:xfrm>
           <a:prstGeom prst="rect">
@@ -4849,11 +4825,11 @@
             </a:r>
             <a:r>
               <a:rPr lang="en-US" sz="2800" dirty="0" smtClean="0"/>
-              <a:t> (</a:t>
+              <a:t> </a:t>
             </a:r>
             <a:r>
               <a:rPr lang="en-US" sz="2800" i="1" dirty="0" smtClean="0"/>
-              <a:t>these are called variables and give the computer important information)</a:t>
+              <a:t>(these are called variables and give the computer important information)</a:t>
             </a:r>
           </a:p>
           <a:p>
@@ -4891,7 +4867,7 @@
         </p:nvSpPr>
         <p:spPr>
           <a:xfrm>
-            <a:off x="5356484" y="4162618"/>
+            <a:off x="5460218" y="3284077"/>
             <a:ext cx="1181589" cy="212696"/>
           </a:xfrm>
           <a:prstGeom prst="ellipse">
@@ -4900,7 +4876,7 @@
           <a:noFill/>
           <a:ln>
             <a:solidFill>
-              <a:srgbClr val="FF0000"/>
+              <a:schemeClr val="accent4"/>
             </a:solidFill>
           </a:ln>
         </p:spPr>
@@ -4961,7 +4937,7 @@
       </p:grpSpPr>
       <p:pic>
         <p:nvPicPr>
-          <p:cNvPr id="9" name="Picture 8"/>
+          <p:cNvPr id="12" name="Picture 11"/>
           <p:cNvPicPr>
             <a:picLocks noChangeAspect="1"/>
           </p:cNvPicPr>
@@ -4969,7 +4945,7 @@
         </p:nvPicPr>
         <p:blipFill>
           <a:blip r:embed="rId2">
-            <a:alphaModFix amt="70000"/>
+            <a:alphaModFix/>
             <a:extLst>
               <a:ext uri="{28A0092B-C50C-407E-A947-70E740481C1C}">
                 <a14:useLocalDpi xmlns:a14="http://schemas.microsoft.com/office/drawing/2010/main" val="0"/>
@@ -4982,8 +4958,8 @@
         </p:blipFill>
         <p:spPr>
           <a:xfrm>
-            <a:off x="312675" y="202775"/>
-            <a:ext cx="16985714" cy="9549800"/>
+            <a:off x="0" y="-11199"/>
+            <a:ext cx="17666583" cy="9943801"/>
           </a:xfrm>
           <a:prstGeom prst="rect">
             <a:avLst/>
@@ -4992,22 +4968,22 @@
       </p:pic>
       <p:sp>
         <p:nvSpPr>
-          <p:cNvPr id="25" name="Rounded Rectangle 24"/>
+          <p:cNvPr id="13" name="Rounded Rectangle 12"/>
           <p:cNvSpPr/>
           <p:nvPr/>
         </p:nvSpPr>
         <p:spPr>
           <a:xfrm>
-            <a:off x="8805284" y="316155"/>
-            <a:ext cx="7734897" cy="9231199"/>
+            <a:off x="340434" y="187001"/>
+            <a:ext cx="16985714" cy="9566600"/>
           </a:xfrm>
           <a:prstGeom prst="roundRect">
             <a:avLst/>
           </a:prstGeom>
           <a:solidFill>
-            <a:schemeClr val="bg1">
-              <a:alpha val="58000"/>
-            </a:schemeClr>
+            <a:srgbClr val="FEFDFF">
+              <a:alpha val="74902"/>
+            </a:srgbClr>
           </a:solidFill>
           <a:ln>
             <a:noFill/>
@@ -5034,28 +5010,390 @@
           <a:lstStyle/>
           <a:p>
             <a:pPr algn="ctr"/>
-            <a:endParaRPr lang="en-US" sz="800"/>
-          </a:p>
-        </p:txBody>
-      </p:sp>
-      <p:sp>
-        <p:nvSpPr>
-          <p:cNvPr id="23" name="Rounded Rectangle 22"/>
+            <a:endParaRPr lang="en-US"/>
+          </a:p>
+        </p:txBody>
+      </p:sp>
+      <p:sp>
+        <p:nvSpPr>
+          <p:cNvPr id="14" name="TextBox 13"/>
+          <p:cNvSpPr txBox="1"/>
+          <p:nvPr/>
+        </p:nvSpPr>
+        <p:spPr>
+          <a:xfrm>
+            <a:off x="1693248" y="269012"/>
+            <a:ext cx="2089197" cy="707886"/>
+          </a:xfrm>
+          <a:prstGeom prst="rect">
+            <a:avLst/>
+          </a:prstGeom>
+          <a:blipFill>
+            <a:blip r:embed="rId3">
+              <a:alphaModFix amt="49000"/>
+            </a:blip>
+            <a:tile tx="0" ty="0" sx="100000" sy="100000" flip="none" algn="tl"/>
+          </a:blipFill>
+          <a:ln>
+            <a:solidFill>
+              <a:schemeClr val="accent1">
+                <a:shade val="50000"/>
+              </a:schemeClr>
+            </a:solidFill>
+          </a:ln>
+        </p:spPr>
+        <p:txBody>
+          <a:bodyPr wrap="square" rtlCol="0">
+            <a:spAutoFit/>
+          </a:bodyPr>
+          <a:lstStyle/>
+          <a:p>
+            <a:pPr algn="ctr"/>
+            <a:r>
+              <a:rPr lang="en-GB" sz="4000" dirty="0" smtClean="0">
+                <a:latin typeface="Minecrafter" pitchFamily="2" charset="0"/>
+              </a:rPr>
+              <a:t>TASK </a:t>
+            </a:r>
+            <a:r>
+              <a:rPr lang="en-GB" sz="4000" dirty="0" smtClean="0">
+                <a:latin typeface="Minecrafter" pitchFamily="2" charset="0"/>
+              </a:rPr>
+              <a:t>3</a:t>
+            </a:r>
+            <a:endParaRPr lang="en-GB" sz="4000" dirty="0">
+              <a:latin typeface="Minecrafter" pitchFamily="2" charset="0"/>
+            </a:endParaRPr>
+          </a:p>
+        </p:txBody>
+      </p:sp>
+      <p:sp>
+        <p:nvSpPr>
+          <p:cNvPr id="18" name="Rectangle 17"/>
           <p:cNvSpPr/>
           <p:nvPr/>
         </p:nvSpPr>
         <p:spPr>
           <a:xfrm>
-            <a:off x="1070635" y="330243"/>
-            <a:ext cx="7734897" cy="9231199"/>
+            <a:off x="410887" y="1251993"/>
+            <a:ext cx="7832805" cy="6555641"/>
+          </a:xfrm>
+          <a:prstGeom prst="rect">
+            <a:avLst/>
+          </a:prstGeom>
+        </p:spPr>
+        <p:txBody>
+          <a:bodyPr wrap="square">
+            <a:spAutoFit/>
+          </a:bodyPr>
+          <a:lstStyle/>
+          <a:p>
+            <a:r>
+              <a:rPr lang="en-US" sz="2800" dirty="0" smtClean="0"/>
+              <a:t>In Minecraft, one of the first things to do is to build a house, but what if you could build one with a single click?</a:t>
+            </a:r>
+            <a:endParaRPr lang="en-US" sz="2800" dirty="0"/>
+          </a:p>
+          <a:p>
+            <a:pPr marL="514350" indent="-514350">
+              <a:buFont typeface="+mj-lt"/>
+              <a:buAutoNum type="arabicPeriod"/>
+            </a:pPr>
+            <a:endParaRPr lang="en-US" sz="2800" dirty="0" smtClean="0"/>
+          </a:p>
+          <a:p>
+            <a:pPr marL="514350" indent="-514350">
+              <a:buFont typeface="+mj-lt"/>
+              <a:buAutoNum type="arabicPeriod"/>
+            </a:pPr>
+            <a:r>
+              <a:rPr lang="en-US" sz="2800" dirty="0" smtClean="0"/>
+              <a:t>This time we’ll look at the code first, open the file </a:t>
+            </a:r>
+            <a:r>
+              <a:rPr lang="en-US" sz="2800" b="1" dirty="0" err="1" smtClean="0"/>
+              <a:t>house.py</a:t>
+            </a:r>
+            <a:r>
+              <a:rPr lang="en-US" sz="2800" dirty="0"/>
+              <a:t> </a:t>
+            </a:r>
+            <a:r>
+              <a:rPr lang="en-US" sz="2800" dirty="0" smtClean="0"/>
+              <a:t>on the right hand side of your screen</a:t>
+            </a:r>
+          </a:p>
+          <a:p>
+            <a:pPr marL="514350" indent="-514350">
+              <a:buFont typeface="+mj-lt"/>
+              <a:buAutoNum type="arabicPeriod"/>
+            </a:pPr>
+            <a:endParaRPr lang="en-US" sz="2800" dirty="0"/>
+          </a:p>
+          <a:p>
+            <a:pPr marL="514350" indent="-514350">
+              <a:buFont typeface="+mj-lt"/>
+              <a:buAutoNum type="arabicPeriod"/>
+            </a:pPr>
+            <a:r>
+              <a:rPr lang="en-US" sz="2800" dirty="0" smtClean="0"/>
+              <a:t>This time you’ll notice</a:t>
+            </a:r>
+            <a:r>
+              <a:rPr lang="en-US" sz="2800" dirty="0" smtClean="0"/>
+              <a:t> the variables are whole numbers </a:t>
+            </a:r>
+            <a:r>
+              <a:rPr lang="en-US" sz="2800" i="1" dirty="0" smtClean="0"/>
+              <a:t>(we call these integers, and are a type of data in programming)</a:t>
+            </a:r>
+            <a:endParaRPr lang="en-US" sz="2800" i="1" dirty="0"/>
+          </a:p>
+          <a:p>
+            <a:pPr marL="514350" indent="-514350">
+              <a:buFont typeface="+mj-lt"/>
+              <a:buAutoNum type="arabicPeriod"/>
+            </a:pPr>
+            <a:endParaRPr lang="en-US" sz="2800" dirty="0" smtClean="0"/>
+          </a:p>
+          <a:p>
+            <a:pPr marL="514350" indent="-514350">
+              <a:buFont typeface="+mj-lt"/>
+              <a:buAutoNum type="arabicPeriod"/>
+            </a:pPr>
+            <a:r>
+              <a:rPr lang="en-US" sz="2800" dirty="0" smtClean="0"/>
+              <a:t>Change the length and height variables to how many blocks long, and how many blocks tall you want your house</a:t>
+            </a:r>
+            <a:endParaRPr lang="en-US" sz="2800" dirty="0"/>
+          </a:p>
+          <a:p>
+            <a:pPr marL="514350" indent="-514350">
+              <a:buFont typeface="+mj-lt"/>
+              <a:buAutoNum type="arabicPeriod"/>
+            </a:pPr>
+            <a:endParaRPr lang="en-US" sz="2800" dirty="0" smtClean="0"/>
+          </a:p>
+        </p:txBody>
+      </p:sp>
+      <p:sp>
+        <p:nvSpPr>
+          <p:cNvPr id="5" name="TextBox 4"/>
+          <p:cNvSpPr txBox="1"/>
+          <p:nvPr/>
+        </p:nvSpPr>
+        <p:spPr>
+          <a:xfrm>
+            <a:off x="3933409" y="187000"/>
+            <a:ext cx="3769387" cy="1077218"/>
+          </a:xfrm>
+          <a:prstGeom prst="rect">
+            <a:avLst/>
+          </a:prstGeom>
+          <a:noFill/>
+        </p:spPr>
+        <p:txBody>
+          <a:bodyPr wrap="square" rtlCol="0">
+            <a:spAutoFit/>
+          </a:bodyPr>
+          <a:lstStyle/>
+          <a:p>
+            <a:r>
+              <a:rPr lang="en-GB" sz="3200" dirty="0" smtClean="0"/>
+              <a:t>How about building a shelter?</a:t>
+            </a:r>
+            <a:endParaRPr lang="en-US" sz="3200" dirty="0"/>
+          </a:p>
+        </p:txBody>
+      </p:sp>
+      <p:sp>
+        <p:nvSpPr>
+          <p:cNvPr id="26" name="Rectangle 25"/>
+          <p:cNvSpPr/>
+          <p:nvPr/>
+        </p:nvSpPr>
+        <p:spPr>
+          <a:xfrm>
+            <a:off x="9343363" y="2951579"/>
+            <a:ext cx="6750904" cy="5693866"/>
+          </a:xfrm>
+          <a:prstGeom prst="rect">
+            <a:avLst/>
+          </a:prstGeom>
+        </p:spPr>
+        <p:txBody>
+          <a:bodyPr wrap="square">
+            <a:spAutoFit/>
+          </a:bodyPr>
+          <a:lstStyle/>
+          <a:p>
+            <a:pPr marL="514350" indent="-514350">
+              <a:buFont typeface="+mj-lt"/>
+              <a:buAutoNum type="arabicPeriod" startAt="4"/>
+            </a:pPr>
+            <a:r>
+              <a:rPr lang="en-US" sz="2800" dirty="0"/>
+              <a:t>Use the script </a:t>
+            </a:r>
+            <a:r>
+              <a:rPr lang="en-US" sz="2800" b="1" dirty="0"/>
+              <a:t>house</a:t>
+            </a:r>
+            <a:r>
+              <a:rPr lang="en-US" sz="2800" dirty="0"/>
+              <a:t> in the Minecraft world and see what happens</a:t>
+            </a:r>
+            <a:r>
+              <a:rPr lang="is-IS" sz="2800" dirty="0"/>
+              <a:t>…</a:t>
+            </a:r>
+            <a:endParaRPr lang="en-US" sz="2800" dirty="0"/>
+          </a:p>
+          <a:p>
+            <a:pPr marL="514350" indent="-514350">
+              <a:buFont typeface="+mj-lt"/>
+              <a:buAutoNum type="arabicPeriod" startAt="4"/>
+            </a:pPr>
+            <a:endParaRPr lang="en-US" sz="2800" dirty="0" smtClean="0"/>
+          </a:p>
+          <a:p>
+            <a:pPr marL="514350" indent="-514350">
+              <a:buFont typeface="+mj-lt"/>
+              <a:buAutoNum type="arabicPeriod" startAt="4"/>
+            </a:pPr>
+            <a:r>
+              <a:rPr lang="en-US" sz="2800" dirty="0" smtClean="0"/>
+              <a:t>Now change the numbers in the script to be bigger than 30</a:t>
+            </a:r>
+          </a:p>
+          <a:p>
+            <a:pPr marL="514350" indent="-514350">
+              <a:buFont typeface="+mj-lt"/>
+              <a:buAutoNum type="arabicPeriod" startAt="4"/>
+            </a:pPr>
+            <a:endParaRPr lang="en-US" sz="2800" dirty="0"/>
+          </a:p>
+          <a:p>
+            <a:pPr marL="514350" indent="-514350">
+              <a:buFont typeface="+mj-lt"/>
+              <a:buAutoNum type="arabicPeriod" startAt="4"/>
+            </a:pPr>
+            <a:r>
+              <a:rPr lang="en-US" sz="2800" dirty="0" smtClean="0"/>
+              <a:t>When you use the script this time, what happens?</a:t>
+            </a:r>
+            <a:endParaRPr lang="en-US" sz="2800" dirty="0"/>
+          </a:p>
+          <a:p>
+            <a:pPr marL="514350" indent="-514350">
+              <a:buFont typeface="+mj-lt"/>
+              <a:buAutoNum type="arabicPeriod" startAt="4"/>
+            </a:pPr>
+            <a:endParaRPr lang="en-US" sz="2800" dirty="0" smtClean="0"/>
+          </a:p>
+          <a:p>
+            <a:pPr marL="514350" indent="-514350">
+              <a:buFont typeface="+mj-lt"/>
+              <a:buAutoNum type="arabicPeriod" startAt="4"/>
+            </a:pPr>
+            <a:endParaRPr lang="en-US" sz="2800" dirty="0"/>
+          </a:p>
+          <a:p>
+            <a:pPr marL="514350" indent="-514350">
+              <a:buFont typeface="+mj-lt"/>
+              <a:buAutoNum type="arabicPeriod" startAt="4"/>
+            </a:pPr>
+            <a:endParaRPr lang="en-US" sz="2800" dirty="0" smtClean="0"/>
+          </a:p>
+          <a:p>
+            <a:pPr lvl="1"/>
+            <a:endParaRPr lang="en-US" sz="2800" dirty="0"/>
+          </a:p>
+          <a:p>
+            <a:pPr lvl="1"/>
+            <a:endParaRPr lang="en-US" sz="2800" dirty="0"/>
+          </a:p>
+        </p:txBody>
+      </p:sp>
+    </p:spTree>
+    <p:extLst>
+      <p:ext uri="{BB962C8B-B14F-4D97-AF65-F5344CB8AC3E}">
+        <p14:creationId xmlns:p14="http://schemas.microsoft.com/office/powerpoint/2010/main" val="360014932"/>
+      </p:ext>
+    </p:extLst>
+  </p:cSld>
+  <p:clrMapOvr>
+    <a:masterClrMapping/>
+  </p:clrMapOvr>
+</p:sld>
+</file>
+
+<file path=ppt/slides/slide4.xml><?xml version="1.0" encoding="utf-8"?>
+<p:sld xmlns:a="http://schemas.openxmlformats.org/drawingml/2006/main" xmlns:r="http://schemas.openxmlformats.org/officeDocument/2006/relationships" xmlns:p="http://schemas.openxmlformats.org/presentationml/2006/main">
+  <p:cSld>
+    <p:spTree>
+      <p:nvGrpSpPr>
+        <p:cNvPr id="1" name=""/>
+        <p:cNvGrpSpPr/>
+        <p:nvPr/>
+      </p:nvGrpSpPr>
+      <p:grpSpPr>
+        <a:xfrm>
+          <a:off x="0" y="0"/>
+          <a:ext cx="0" cy="0"/>
+          <a:chOff x="0" y="0"/>
+          <a:chExt cx="0" cy="0"/>
+        </a:xfrm>
+      </p:grpSpPr>
+      <p:pic>
+        <p:nvPicPr>
+          <p:cNvPr id="12" name="Picture 11"/>
+          <p:cNvPicPr>
+            <a:picLocks noChangeAspect="1"/>
+          </p:cNvPicPr>
+          <p:nvPr/>
+        </p:nvPicPr>
+        <p:blipFill>
+          <a:blip r:embed="rId2">
+            <a:alphaModFix/>
+            <a:extLst>
+              <a:ext uri="{28A0092B-C50C-407E-A947-70E740481C1C}">
+                <a14:useLocalDpi xmlns:a14="http://schemas.microsoft.com/office/drawing/2010/main" val="0"/>
+              </a:ext>
+            </a:extLst>
+          </a:blip>
+          <a:stretch>
+            <a:fillRect/>
+          </a:stretch>
+        </p:blipFill>
+        <p:spPr>
+          <a:xfrm>
+            <a:off x="0" y="-11199"/>
+            <a:ext cx="17666583" cy="9943801"/>
+          </a:xfrm>
+          <a:prstGeom prst="rect">
+            <a:avLst/>
+          </a:prstGeom>
+        </p:spPr>
+      </p:pic>
+      <p:sp>
+        <p:nvSpPr>
+          <p:cNvPr id="13" name="Rounded Rectangle 12"/>
+          <p:cNvSpPr/>
+          <p:nvPr/>
+        </p:nvSpPr>
+        <p:spPr>
+          <a:xfrm>
+            <a:off x="340434" y="187001"/>
+            <a:ext cx="16985714" cy="9566600"/>
           </a:xfrm>
           <a:prstGeom prst="roundRect">
             <a:avLst/>
           </a:prstGeom>
           <a:solidFill>
-            <a:schemeClr val="bg1">
-              <a:alpha val="58000"/>
-            </a:schemeClr>
+            <a:srgbClr val="FEFDFF">
+              <a:alpha val="74902"/>
+            </a:srgbClr>
           </a:solidFill>
           <a:ln>
             <a:noFill/>
@@ -5082,7 +5420,7 @@
           <a:lstStyle/>
           <a:p>
             <a:pPr algn="ctr"/>
-            <a:endParaRPr lang="en-US" sz="800"/>
+            <a:endParaRPr lang="en-US"/>
           </a:p>
         </p:txBody>
       </p:sp>
@@ -5094,7 +5432,7 @@
         </p:nvSpPr>
         <p:spPr>
           <a:xfrm>
-            <a:off x="1809136" y="813652"/>
+            <a:off x="1693248" y="269012"/>
             <a:ext cx="2089197" cy="707886"/>
           </a:xfrm>
           <a:prstGeom prst="rect">
@@ -5131,8 +5469,149 @@
               <a:rPr lang="en-GB" sz="4000" dirty="0">
                 <a:latin typeface="Minecrafter" pitchFamily="2" charset="0"/>
               </a:rPr>
-              <a:t>3</a:t>
-            </a:r>
+              <a:t>4</a:t>
+            </a:r>
+            <a:endParaRPr lang="en-GB" sz="4000" dirty="0">
+              <a:latin typeface="Minecrafter" pitchFamily="2" charset="0"/>
+            </a:endParaRPr>
+          </a:p>
+        </p:txBody>
+      </p:sp>
+      <p:sp>
+        <p:nvSpPr>
+          <p:cNvPr id="18" name="Rectangle 17"/>
+          <p:cNvSpPr/>
+          <p:nvPr/>
+        </p:nvSpPr>
+        <p:spPr>
+          <a:xfrm>
+            <a:off x="410887" y="1771944"/>
+            <a:ext cx="7832805" cy="6986528"/>
+          </a:xfrm>
+          <a:prstGeom prst="rect">
+            <a:avLst/>
+          </a:prstGeom>
+        </p:spPr>
+        <p:txBody>
+          <a:bodyPr wrap="square">
+            <a:spAutoFit/>
+          </a:bodyPr>
+          <a:lstStyle/>
+          <a:p>
+            <a:pPr marL="514350" indent="-514350">
+              <a:buFont typeface="+mj-lt"/>
+              <a:buAutoNum type="arabicPeriod"/>
+            </a:pPr>
+            <a:endParaRPr lang="en-US" sz="2800" dirty="0" smtClean="0"/>
+          </a:p>
+          <a:p>
+            <a:pPr marL="514350" indent="-514350">
+              <a:buFont typeface="+mj-lt"/>
+              <a:buAutoNum type="arabicPeriod"/>
+            </a:pPr>
+            <a:r>
+              <a:rPr lang="en-US" sz="2800" dirty="0" smtClean="0"/>
+              <a:t>From the computer block, take and use the </a:t>
+            </a:r>
+            <a:r>
+              <a:rPr lang="en-US" sz="2800" b="1" dirty="0" err="1" smtClean="0"/>
+              <a:t>SpawnTarget</a:t>
+            </a:r>
+            <a:r>
+              <a:rPr lang="en-US" sz="2800" dirty="0"/>
+              <a:t> </a:t>
+            </a:r>
+            <a:r>
+              <a:rPr lang="en-US" sz="2800" dirty="0" smtClean="0"/>
+              <a:t>script</a:t>
+            </a:r>
+            <a:endParaRPr lang="en-US" sz="2800" b="1" dirty="0" smtClean="0"/>
+          </a:p>
+          <a:p>
+            <a:pPr marL="514350" indent="-514350">
+              <a:buFont typeface="+mj-lt"/>
+              <a:buAutoNum type="arabicPeriod"/>
+            </a:pPr>
+            <a:endParaRPr lang="en-US" sz="2800" dirty="0"/>
+          </a:p>
+          <a:p>
+            <a:pPr marL="514350" indent="-514350">
+              <a:buFont typeface="+mj-lt"/>
+              <a:buAutoNum type="arabicPeriod"/>
+            </a:pPr>
+            <a:r>
+              <a:rPr lang="en-US" sz="2800" dirty="0" smtClean="0"/>
+              <a:t>Now take the </a:t>
+            </a:r>
+            <a:r>
+              <a:rPr lang="en-US" sz="2800" b="1" dirty="0" err="1" smtClean="0"/>
+              <a:t>FireProjectile</a:t>
+            </a:r>
+            <a:r>
+              <a:rPr lang="en-US" sz="2800" dirty="0" smtClean="0"/>
+              <a:t> script, and aiming at the target, use the script</a:t>
+            </a:r>
+            <a:r>
+              <a:rPr lang="is-IS" sz="2800" dirty="0" smtClean="0"/>
+              <a:t>…</a:t>
+            </a:r>
+          </a:p>
+          <a:p>
+            <a:pPr marL="514350" indent="-514350">
+              <a:buFont typeface="+mj-lt"/>
+              <a:buAutoNum type="arabicPeriod"/>
+            </a:pPr>
+            <a:endParaRPr lang="is-IS" sz="2800" i="1" dirty="0"/>
+          </a:p>
+          <a:p>
+            <a:pPr marL="514350" indent="-514350">
+              <a:buFont typeface="+mj-lt"/>
+              <a:buAutoNum type="arabicPeriod"/>
+            </a:pPr>
+            <a:r>
+              <a:rPr lang="is-IS" sz="2800" dirty="0" smtClean="0"/>
+              <a:t>In this piece of code, we can change how fast we want the TNT to go, and how much gravity (the force pulling the TNT down) we want...</a:t>
+            </a:r>
+          </a:p>
+          <a:p>
+            <a:pPr marL="514350" indent="-514350">
+              <a:buFont typeface="+mj-lt"/>
+              <a:buAutoNum type="arabicPeriod"/>
+            </a:pPr>
+            <a:endParaRPr lang="is-IS" sz="2800" dirty="0"/>
+          </a:p>
+          <a:p>
+            <a:pPr marL="514350" indent="-514350">
+              <a:buFont typeface="+mj-lt"/>
+              <a:buAutoNum type="arabicPeriod"/>
+            </a:pPr>
+            <a:r>
+              <a:rPr lang="is-IS" sz="2800" dirty="0" smtClean="0"/>
+              <a:t>Open the </a:t>
+            </a:r>
+            <a:r>
+              <a:rPr lang="is-IS" sz="2800" b="1" dirty="0" smtClean="0"/>
+              <a:t>FireProjectile.py</a:t>
+            </a:r>
+            <a:r>
+              <a:rPr lang="is-IS" sz="2800" dirty="0" smtClean="0"/>
+              <a:t> script on the right, and notice now how we can change the variables within the brackets</a:t>
+            </a:r>
+            <a:endParaRPr lang="en-US" sz="2800" dirty="0"/>
+          </a:p>
+          <a:p>
+            <a:pPr marL="514350" indent="-514350">
+              <a:buFont typeface="+mj-lt"/>
+              <a:buAutoNum type="arabicPeriod"/>
+            </a:pPr>
+            <a:endParaRPr lang="en-US" sz="2800" dirty="0" smtClean="0"/>
+          </a:p>
+          <a:p>
+            <a:pPr marL="514350" indent="-514350">
+              <a:buFont typeface="+mj-lt"/>
+              <a:buAutoNum type="arabicPeriod"/>
+            </a:pPr>
+            <a:endParaRPr lang="en-US" sz="2800" dirty="0" smtClean="0"/>
           </a:p>
         </p:txBody>
       </p:sp>
@@ -5144,8 +5623,8 @@
         </p:nvSpPr>
         <p:spPr>
           <a:xfrm>
-            <a:off x="4035232" y="709035"/>
-            <a:ext cx="3769387" cy="954107"/>
+            <a:off x="3933409" y="187000"/>
+            <a:ext cx="5103686" cy="1569660"/>
           </a:xfrm>
           <a:prstGeom prst="rect">
             <a:avLst/>
@@ -5159,14 +5638,14 @@
           <a:lstStyle/>
           <a:p>
             <a:r>
-              <a:rPr lang="en-GB" sz="2800" dirty="0" smtClean="0"/>
-              <a:t>Now let’s try building a shelter</a:t>
-            </a:r>
-            <a:r>
-              <a:rPr lang="is-IS" sz="2800" dirty="0" smtClean="0"/>
+              <a:rPr lang="en-GB" sz="3200" dirty="0" smtClean="0"/>
+              <a:t>Now that we’ve built something, let’s blow something up</a:t>
+            </a:r>
+            <a:r>
+              <a:rPr lang="is-IS" sz="3200" dirty="0" smtClean="0"/>
               <a:t>…</a:t>
             </a:r>
-            <a:endParaRPr lang="en-US" sz="2800" dirty="0"/>
+            <a:endParaRPr lang="en-US" sz="3200" dirty="0"/>
           </a:p>
         </p:txBody>
       </p:sp>
@@ -5179,7 +5658,7 @@
         <p:spPr>
           <a:xfrm>
             <a:off x="9377530" y="549038"/>
-            <a:ext cx="6750904" cy="954107"/>
+            <a:ext cx="6750904" cy="10002738"/>
           </a:xfrm>
           <a:prstGeom prst="rect">
             <a:avLst/>
@@ -5191,6 +5670,267 @@
           </a:bodyPr>
           <a:lstStyle/>
           <a:p>
+            <a:pPr marL="514350" indent="-514350">
+              <a:buFont typeface="+mj-lt"/>
+              <a:buAutoNum type="arabicPeriod" startAt="5"/>
+            </a:pPr>
+            <a:r>
+              <a:rPr lang="en-US" sz="2800" dirty="0" smtClean="0"/>
+              <a:t>Change the first number to anything between 1 – 100, and then pick a body from the list below to replace </a:t>
+            </a:r>
+            <a:r>
+              <a:rPr lang="en-US" sz="2800" b="1" dirty="0" smtClean="0">
+                <a:solidFill>
+                  <a:srgbClr val="00B050"/>
+                </a:solidFill>
+              </a:rPr>
+              <a:t>“earth”</a:t>
+            </a:r>
+            <a:r>
+              <a:rPr lang="en-US" sz="2800" dirty="0" smtClean="0"/>
+              <a:t>:</a:t>
+            </a:r>
+          </a:p>
+          <a:p>
+            <a:pPr marL="514350" indent="-514350">
+              <a:buFont typeface="+mj-lt"/>
+              <a:buAutoNum type="arabicPeriod" startAt="5"/>
+            </a:pPr>
+            <a:endParaRPr lang="en-US" sz="2800" dirty="0" smtClean="0"/>
+          </a:p>
+          <a:p>
+            <a:r>
+              <a:rPr lang="en-US" sz="2800" b="1" dirty="0" smtClean="0">
+                <a:solidFill>
+                  <a:srgbClr val="00B050"/>
+                </a:solidFill>
+              </a:rPr>
+              <a:t>“sun”</a:t>
+            </a:r>
+          </a:p>
+          <a:p>
+            <a:r>
+              <a:rPr lang="en-US" sz="2800" b="1" dirty="0" smtClean="0">
+                <a:solidFill>
+                  <a:srgbClr val="00B050"/>
+                </a:solidFill>
+              </a:rPr>
+              <a:t>“mercury”</a:t>
+            </a:r>
+          </a:p>
+          <a:p>
+            <a:r>
+              <a:rPr lang="en-US" sz="2800" b="1" dirty="0" smtClean="0">
+                <a:solidFill>
+                  <a:srgbClr val="00B050"/>
+                </a:solidFill>
+              </a:rPr>
+              <a:t>“</a:t>
+            </a:r>
+            <a:r>
+              <a:rPr lang="en-US" sz="2800" b="1" dirty="0" err="1" smtClean="0">
+                <a:solidFill>
+                  <a:srgbClr val="00B050"/>
+                </a:solidFill>
+              </a:rPr>
+              <a:t>venus</a:t>
+            </a:r>
+            <a:r>
+              <a:rPr lang="en-US" sz="2800" b="1" dirty="0" smtClean="0">
+                <a:solidFill>
+                  <a:srgbClr val="00B050"/>
+                </a:solidFill>
+              </a:rPr>
+              <a:t>”</a:t>
+            </a:r>
+          </a:p>
+          <a:p>
+            <a:r>
+              <a:rPr lang="en-US" sz="2800" b="1" dirty="0" smtClean="0">
+                <a:solidFill>
+                  <a:srgbClr val="00B050"/>
+                </a:solidFill>
+              </a:rPr>
+              <a:t>“moon”</a:t>
+            </a:r>
+          </a:p>
+          <a:p>
+            <a:r>
+              <a:rPr lang="en-US" sz="2800" b="1" dirty="0" smtClean="0">
+                <a:solidFill>
+                  <a:srgbClr val="00B050"/>
+                </a:solidFill>
+              </a:rPr>
+              <a:t>“mars”</a:t>
+            </a:r>
+          </a:p>
+          <a:p>
+            <a:r>
+              <a:rPr lang="en-US" sz="2800" b="1" dirty="0" smtClean="0">
+                <a:solidFill>
+                  <a:srgbClr val="00B050"/>
+                </a:solidFill>
+              </a:rPr>
+              <a:t>“</a:t>
+            </a:r>
+            <a:r>
+              <a:rPr lang="en-US" sz="2800" b="1" dirty="0" err="1" smtClean="0">
+                <a:solidFill>
+                  <a:srgbClr val="00B050"/>
+                </a:solidFill>
+              </a:rPr>
+              <a:t>jupiter</a:t>
+            </a:r>
+            <a:r>
+              <a:rPr lang="en-US" sz="2800" b="1" dirty="0" smtClean="0">
+                <a:solidFill>
+                  <a:srgbClr val="00B050"/>
+                </a:solidFill>
+              </a:rPr>
+              <a:t>”</a:t>
+            </a:r>
+          </a:p>
+          <a:p>
+            <a:r>
+              <a:rPr lang="en-US" sz="2800" b="1" dirty="0" smtClean="0">
+                <a:solidFill>
+                  <a:srgbClr val="00B050"/>
+                </a:solidFill>
+              </a:rPr>
+              <a:t>“</a:t>
+            </a:r>
+            <a:r>
+              <a:rPr lang="en-US" sz="2800" b="1" dirty="0" err="1" smtClean="0">
+                <a:solidFill>
+                  <a:srgbClr val="00B050"/>
+                </a:solidFill>
+              </a:rPr>
+              <a:t>saturn</a:t>
+            </a:r>
+            <a:r>
+              <a:rPr lang="en-US" sz="2800" b="1" dirty="0" smtClean="0">
+                <a:solidFill>
+                  <a:srgbClr val="00B050"/>
+                </a:solidFill>
+              </a:rPr>
+              <a:t>”</a:t>
+            </a:r>
+          </a:p>
+          <a:p>
+            <a:r>
+              <a:rPr lang="en-US" sz="2800" b="1" dirty="0" smtClean="0">
+                <a:solidFill>
+                  <a:srgbClr val="00B050"/>
+                </a:solidFill>
+              </a:rPr>
+              <a:t>“</a:t>
+            </a:r>
+            <a:r>
+              <a:rPr lang="en-US" sz="2800" b="1" dirty="0" err="1" smtClean="0">
+                <a:solidFill>
+                  <a:srgbClr val="00B050"/>
+                </a:solidFill>
+              </a:rPr>
+              <a:t>uranus</a:t>
+            </a:r>
+            <a:r>
+              <a:rPr lang="en-US" sz="2800" b="1" dirty="0" smtClean="0">
+                <a:solidFill>
+                  <a:srgbClr val="00B050"/>
+                </a:solidFill>
+              </a:rPr>
+              <a:t>”</a:t>
+            </a:r>
+          </a:p>
+          <a:p>
+            <a:r>
+              <a:rPr lang="en-US" sz="2800" b="1" dirty="0" smtClean="0">
+                <a:solidFill>
+                  <a:srgbClr val="00B050"/>
+                </a:solidFill>
+              </a:rPr>
+              <a:t>“</a:t>
+            </a:r>
+            <a:r>
+              <a:rPr lang="en-US" sz="2800" b="1" dirty="0" err="1" smtClean="0">
+                <a:solidFill>
+                  <a:srgbClr val="00B050"/>
+                </a:solidFill>
+              </a:rPr>
+              <a:t>neptune</a:t>
+            </a:r>
+            <a:r>
+              <a:rPr lang="en-US" sz="2800" b="1" dirty="0" smtClean="0">
+                <a:solidFill>
+                  <a:srgbClr val="00B050"/>
+                </a:solidFill>
+              </a:rPr>
+              <a:t>”</a:t>
+            </a:r>
+          </a:p>
+          <a:p>
+            <a:r>
+              <a:rPr lang="en-US" sz="2800" b="1" dirty="0" smtClean="0">
+                <a:solidFill>
+                  <a:srgbClr val="00B050"/>
+                </a:solidFill>
+              </a:rPr>
+              <a:t>“</a:t>
+            </a:r>
+            <a:r>
+              <a:rPr lang="en-US" sz="2800" b="1" dirty="0" err="1" smtClean="0">
+                <a:solidFill>
+                  <a:srgbClr val="00B050"/>
+                </a:solidFill>
+              </a:rPr>
+              <a:t>pluto</a:t>
+            </a:r>
+            <a:r>
+              <a:rPr lang="en-US" sz="2800" b="1" dirty="0" smtClean="0">
+                <a:solidFill>
+                  <a:srgbClr val="00B050"/>
+                </a:solidFill>
+              </a:rPr>
+              <a:t>”</a:t>
+            </a:r>
+          </a:p>
+          <a:p>
+            <a:endParaRPr lang="en-US" sz="2800" b="1" dirty="0">
+              <a:solidFill>
+                <a:srgbClr val="00B050"/>
+              </a:solidFill>
+            </a:endParaRPr>
+          </a:p>
+          <a:p>
+            <a:pPr marL="514350" indent="-514350">
+              <a:buFont typeface="+mj-lt"/>
+              <a:buAutoNum type="arabicPeriod" startAt="6"/>
+            </a:pPr>
+            <a:r>
+              <a:rPr lang="en-US" sz="2800" dirty="0" smtClean="0"/>
+              <a:t>Once you’ve done these, if you haven’t run out of time, feel free to have a play with any of the scripts in the computer block</a:t>
+            </a:r>
+            <a:r>
+              <a:rPr lang="is-IS" sz="2800" dirty="0" smtClean="0"/>
+              <a:t>…</a:t>
+            </a:r>
+            <a:endParaRPr lang="en-US" sz="2800" dirty="0" smtClean="0"/>
+          </a:p>
+          <a:p>
+            <a:pPr marL="514350" indent="-514350">
+              <a:buFont typeface="+mj-lt"/>
+              <a:buAutoNum type="arabicPeriod" startAt="5"/>
+            </a:pPr>
+            <a:endParaRPr lang="en-US" sz="2800" dirty="0"/>
+          </a:p>
+          <a:p>
+            <a:pPr marL="514350" indent="-514350">
+              <a:buFont typeface="+mj-lt"/>
+              <a:buAutoNum type="arabicPeriod" startAt="5"/>
+            </a:pPr>
+            <a:endParaRPr lang="en-US" sz="2800" dirty="0" smtClean="0"/>
+          </a:p>
+          <a:p>
             <a:pPr lvl="1"/>
             <a:endParaRPr lang="en-US" sz="2800" dirty="0"/>
           </a:p>
@@ -5203,7 +5943,7 @@
     </p:spTree>
     <p:extLst>
       <p:ext uri="{BB962C8B-B14F-4D97-AF65-F5344CB8AC3E}">
-        <p14:creationId xmlns:p14="http://schemas.microsoft.com/office/powerpoint/2010/main" val="432301315"/>
+        <p14:creationId xmlns:p14="http://schemas.microsoft.com/office/powerpoint/2010/main" val="244134463"/>
       </p:ext>
     </p:extLst>
   </p:cSld>

</xml_diff>

<commit_message>
2nd draft of tasks:
Changed format to A4 (didn't realise this before...oops)

Added in list of colours for text_to_blocks code

Maybe should add in profanity filter and if statements to catch options
not supported?
</commit_message>
<xml_diff>
--- a/programming_challenge/tasks.horizontal.pptx
+++ b/programming_challenge/tasks.horizontal.pptx
@@ -2,7 +2,7 @@
 <file path=ppt/presentation.xml><?xml version="1.0" encoding="utf-8"?>
 <p:presentation xmlns:a="http://schemas.openxmlformats.org/drawingml/2006/main" xmlns:r="http://schemas.openxmlformats.org/officeDocument/2006/relationships" xmlns:p="http://schemas.openxmlformats.org/presentationml/2006/main" saveSubsetFonts="1" autoCompressPictures="0">
   <p:sldMasterIdLst>
-    <p:sldMasterId id="2147483672" r:id="rId1"/>
+    <p:sldMasterId id="2147483684" r:id="rId1"/>
   </p:sldMasterIdLst>
   <p:notesMasterIdLst>
     <p:notesMasterId r:id="rId6"/>
@@ -13,14 +13,14 @@
     <p:sldId id="260" r:id="rId4"/>
     <p:sldId id="261" r:id="rId5"/>
   </p:sldIdLst>
-  <p:sldSz cx="17610138" cy="9906000"/>
+  <p:sldSz cx="9906000" cy="6858000" type="A4"/>
   <p:notesSz cx="6858000" cy="9144000"/>
   <p:defaultTextStyle>
     <a:defPPr>
       <a:defRPr lang="en-US"/>
     </a:defPPr>
-    <a:lvl1pPr marL="0" algn="l" defTabSz="914400" rtl="0" eaLnBrk="1" latinLnBrk="0" hangingPunct="1">
-      <a:defRPr sz="1800" kern="1200">
+    <a:lvl1pPr marL="0" algn="l" defTabSz="556985" rtl="0" eaLnBrk="1" latinLnBrk="0" hangingPunct="1">
+      <a:defRPr sz="1097" kern="1200">
         <a:solidFill>
           <a:schemeClr val="tx1"/>
         </a:solidFill>
@@ -29,8 +29,8 @@
         <a:cs typeface="+mn-cs"/>
       </a:defRPr>
     </a:lvl1pPr>
-    <a:lvl2pPr marL="457200" algn="l" defTabSz="914400" rtl="0" eaLnBrk="1" latinLnBrk="0" hangingPunct="1">
-      <a:defRPr sz="1800" kern="1200">
+    <a:lvl2pPr marL="278493" algn="l" defTabSz="556985" rtl="0" eaLnBrk="1" latinLnBrk="0" hangingPunct="1">
+      <a:defRPr sz="1097" kern="1200">
         <a:solidFill>
           <a:schemeClr val="tx1"/>
         </a:solidFill>
@@ -39,8 +39,8 @@
         <a:cs typeface="+mn-cs"/>
       </a:defRPr>
     </a:lvl2pPr>
-    <a:lvl3pPr marL="914400" algn="l" defTabSz="914400" rtl="0" eaLnBrk="1" latinLnBrk="0" hangingPunct="1">
-      <a:defRPr sz="1800" kern="1200">
+    <a:lvl3pPr marL="556985" algn="l" defTabSz="556985" rtl="0" eaLnBrk="1" latinLnBrk="0" hangingPunct="1">
+      <a:defRPr sz="1097" kern="1200">
         <a:solidFill>
           <a:schemeClr val="tx1"/>
         </a:solidFill>
@@ -49,8 +49,8 @@
         <a:cs typeface="+mn-cs"/>
       </a:defRPr>
     </a:lvl3pPr>
-    <a:lvl4pPr marL="1371600" algn="l" defTabSz="914400" rtl="0" eaLnBrk="1" latinLnBrk="0" hangingPunct="1">
-      <a:defRPr sz="1800" kern="1200">
+    <a:lvl4pPr marL="835479" algn="l" defTabSz="556985" rtl="0" eaLnBrk="1" latinLnBrk="0" hangingPunct="1">
+      <a:defRPr sz="1097" kern="1200">
         <a:solidFill>
           <a:schemeClr val="tx1"/>
         </a:solidFill>
@@ -59,8 +59,8 @@
         <a:cs typeface="+mn-cs"/>
       </a:defRPr>
     </a:lvl4pPr>
-    <a:lvl5pPr marL="1828800" algn="l" defTabSz="914400" rtl="0" eaLnBrk="1" latinLnBrk="0" hangingPunct="1">
-      <a:defRPr sz="1800" kern="1200">
+    <a:lvl5pPr marL="1113972" algn="l" defTabSz="556985" rtl="0" eaLnBrk="1" latinLnBrk="0" hangingPunct="1">
+      <a:defRPr sz="1097" kern="1200">
         <a:solidFill>
           <a:schemeClr val="tx1"/>
         </a:solidFill>
@@ -69,8 +69,8 @@
         <a:cs typeface="+mn-cs"/>
       </a:defRPr>
     </a:lvl5pPr>
-    <a:lvl6pPr marL="2286000" algn="l" defTabSz="914400" rtl="0" eaLnBrk="1" latinLnBrk="0" hangingPunct="1">
-      <a:defRPr sz="1800" kern="1200">
+    <a:lvl6pPr marL="1392464" algn="l" defTabSz="556985" rtl="0" eaLnBrk="1" latinLnBrk="0" hangingPunct="1">
+      <a:defRPr sz="1097" kern="1200">
         <a:solidFill>
           <a:schemeClr val="tx1"/>
         </a:solidFill>
@@ -79,8 +79,8 @@
         <a:cs typeface="+mn-cs"/>
       </a:defRPr>
     </a:lvl6pPr>
-    <a:lvl7pPr marL="2743200" algn="l" defTabSz="914400" rtl="0" eaLnBrk="1" latinLnBrk="0" hangingPunct="1">
-      <a:defRPr sz="1800" kern="1200">
+    <a:lvl7pPr marL="1670956" algn="l" defTabSz="556985" rtl="0" eaLnBrk="1" latinLnBrk="0" hangingPunct="1">
+      <a:defRPr sz="1097" kern="1200">
         <a:solidFill>
           <a:schemeClr val="tx1"/>
         </a:solidFill>
@@ -89,8 +89,8 @@
         <a:cs typeface="+mn-cs"/>
       </a:defRPr>
     </a:lvl7pPr>
-    <a:lvl8pPr marL="3200400" algn="l" defTabSz="914400" rtl="0" eaLnBrk="1" latinLnBrk="0" hangingPunct="1">
-      <a:defRPr sz="1800" kern="1200">
+    <a:lvl8pPr marL="1949450" algn="l" defTabSz="556985" rtl="0" eaLnBrk="1" latinLnBrk="0" hangingPunct="1">
+      <a:defRPr sz="1097" kern="1200">
         <a:solidFill>
           <a:schemeClr val="tx1"/>
         </a:solidFill>
@@ -99,8 +99,8 @@
         <a:cs typeface="+mn-cs"/>
       </a:defRPr>
     </a:lvl8pPr>
-    <a:lvl9pPr marL="3657600" algn="l" defTabSz="914400" rtl="0" eaLnBrk="1" latinLnBrk="0" hangingPunct="1">
-      <a:defRPr sz="1800" kern="1200">
+    <a:lvl9pPr marL="2227942" algn="l" defTabSz="556985" rtl="0" eaLnBrk="1" latinLnBrk="0" hangingPunct="1">
+      <a:defRPr sz="1097" kern="1200">
         <a:solidFill>
           <a:schemeClr val="tx1"/>
         </a:solidFill>
@@ -218,8 +218,8 @@
         </p:nvSpPr>
         <p:spPr>
           <a:xfrm>
-            <a:off x="685800" y="1143000"/>
-            <a:ext cx="5486400" cy="3086100"/>
+            <a:off x="1200150" y="1143000"/>
+            <a:ext cx="4457700" cy="3086100"/>
           </a:xfrm>
           <a:prstGeom prst="rect">
             <a:avLst/>
@@ -374,8 +374,8 @@
   </p:cSld>
   <p:clrMap bg1="lt1" tx1="dk1" bg2="lt2" tx2="dk2" accent1="accent1" accent2="accent2" accent3="accent3" accent4="accent4" accent5="accent5" accent6="accent6" hlink="hlink" folHlink="folHlink"/>
   <p:notesStyle>
-    <a:lvl1pPr marL="0" algn="l" defTabSz="914400" rtl="0" eaLnBrk="1" latinLnBrk="0" hangingPunct="1">
-      <a:defRPr sz="1200" kern="1200">
+    <a:lvl1pPr marL="0" algn="l" defTabSz="556985" rtl="0" eaLnBrk="1" latinLnBrk="0" hangingPunct="1">
+      <a:defRPr sz="731" kern="1200">
         <a:solidFill>
           <a:schemeClr val="tx1"/>
         </a:solidFill>
@@ -384,8 +384,8 @@
         <a:cs typeface="+mn-cs"/>
       </a:defRPr>
     </a:lvl1pPr>
-    <a:lvl2pPr marL="457200" algn="l" defTabSz="914400" rtl="0" eaLnBrk="1" latinLnBrk="0" hangingPunct="1">
-      <a:defRPr sz="1200" kern="1200">
+    <a:lvl2pPr marL="278493" algn="l" defTabSz="556985" rtl="0" eaLnBrk="1" latinLnBrk="0" hangingPunct="1">
+      <a:defRPr sz="731" kern="1200">
         <a:solidFill>
           <a:schemeClr val="tx1"/>
         </a:solidFill>
@@ -394,8 +394,8 @@
         <a:cs typeface="+mn-cs"/>
       </a:defRPr>
     </a:lvl2pPr>
-    <a:lvl3pPr marL="914400" algn="l" defTabSz="914400" rtl="0" eaLnBrk="1" latinLnBrk="0" hangingPunct="1">
-      <a:defRPr sz="1200" kern="1200">
+    <a:lvl3pPr marL="556985" algn="l" defTabSz="556985" rtl="0" eaLnBrk="1" latinLnBrk="0" hangingPunct="1">
+      <a:defRPr sz="731" kern="1200">
         <a:solidFill>
           <a:schemeClr val="tx1"/>
         </a:solidFill>
@@ -404,8 +404,8 @@
         <a:cs typeface="+mn-cs"/>
       </a:defRPr>
     </a:lvl3pPr>
-    <a:lvl4pPr marL="1371600" algn="l" defTabSz="914400" rtl="0" eaLnBrk="1" latinLnBrk="0" hangingPunct="1">
-      <a:defRPr sz="1200" kern="1200">
+    <a:lvl4pPr marL="835479" algn="l" defTabSz="556985" rtl="0" eaLnBrk="1" latinLnBrk="0" hangingPunct="1">
+      <a:defRPr sz="731" kern="1200">
         <a:solidFill>
           <a:schemeClr val="tx1"/>
         </a:solidFill>
@@ -414,8 +414,8 @@
         <a:cs typeface="+mn-cs"/>
       </a:defRPr>
     </a:lvl4pPr>
-    <a:lvl5pPr marL="1828800" algn="l" defTabSz="914400" rtl="0" eaLnBrk="1" latinLnBrk="0" hangingPunct="1">
-      <a:defRPr sz="1200" kern="1200">
+    <a:lvl5pPr marL="1113972" algn="l" defTabSz="556985" rtl="0" eaLnBrk="1" latinLnBrk="0" hangingPunct="1">
+      <a:defRPr sz="731" kern="1200">
         <a:solidFill>
           <a:schemeClr val="tx1"/>
         </a:solidFill>
@@ -424,8 +424,8 @@
         <a:cs typeface="+mn-cs"/>
       </a:defRPr>
     </a:lvl5pPr>
-    <a:lvl6pPr marL="2286000" algn="l" defTabSz="914400" rtl="0" eaLnBrk="1" latinLnBrk="0" hangingPunct="1">
-      <a:defRPr sz="1200" kern="1200">
+    <a:lvl6pPr marL="1392464" algn="l" defTabSz="556985" rtl="0" eaLnBrk="1" latinLnBrk="0" hangingPunct="1">
+      <a:defRPr sz="731" kern="1200">
         <a:solidFill>
           <a:schemeClr val="tx1"/>
         </a:solidFill>
@@ -434,8 +434,8 @@
         <a:cs typeface="+mn-cs"/>
       </a:defRPr>
     </a:lvl6pPr>
-    <a:lvl7pPr marL="2743200" algn="l" defTabSz="914400" rtl="0" eaLnBrk="1" latinLnBrk="0" hangingPunct="1">
-      <a:defRPr sz="1200" kern="1200">
+    <a:lvl7pPr marL="1670956" algn="l" defTabSz="556985" rtl="0" eaLnBrk="1" latinLnBrk="0" hangingPunct="1">
+      <a:defRPr sz="731" kern="1200">
         <a:solidFill>
           <a:schemeClr val="tx1"/>
         </a:solidFill>
@@ -444,8 +444,8 @@
         <a:cs typeface="+mn-cs"/>
       </a:defRPr>
     </a:lvl7pPr>
-    <a:lvl8pPr marL="3200400" algn="l" defTabSz="914400" rtl="0" eaLnBrk="1" latinLnBrk="0" hangingPunct="1">
-      <a:defRPr sz="1200" kern="1200">
+    <a:lvl8pPr marL="1949450" algn="l" defTabSz="556985" rtl="0" eaLnBrk="1" latinLnBrk="0" hangingPunct="1">
+      <a:defRPr sz="731" kern="1200">
         <a:solidFill>
           <a:schemeClr val="tx1"/>
         </a:solidFill>
@@ -454,8 +454,8 @@
         <a:cs typeface="+mn-cs"/>
       </a:defRPr>
     </a:lvl8pPr>
-    <a:lvl9pPr marL="3657600" algn="l" defTabSz="914400" rtl="0" eaLnBrk="1" latinLnBrk="0" hangingPunct="1">
-      <a:defRPr sz="1200" kern="1200">
+    <a:lvl9pPr marL="2227942" algn="l" defTabSz="556985" rtl="0" eaLnBrk="1" latinLnBrk="0" hangingPunct="1">
+      <a:defRPr sz="731" kern="1200">
         <a:solidFill>
           <a:schemeClr val="tx1"/>
         </a:solidFill>
@@ -497,15 +497,15 @@
         </p:nvSpPr>
         <p:spPr>
           <a:xfrm>
-            <a:off x="2201267" y="1621191"/>
-            <a:ext cx="13207604" cy="3448756"/>
+            <a:off x="742950" y="1122363"/>
+            <a:ext cx="8420100" cy="2387600"/>
           </a:xfrm>
         </p:spPr>
         <p:txBody>
           <a:bodyPr anchor="b"/>
           <a:lstStyle>
             <a:lvl1pPr algn="ctr">
-              <a:defRPr sz="8666"/>
+              <a:defRPr sz="6000"/>
             </a:lvl1pPr>
           </a:lstStyle>
           <a:p>
@@ -529,8 +529,8 @@
         </p:nvSpPr>
         <p:spPr>
           <a:xfrm>
-            <a:off x="2201267" y="5202944"/>
-            <a:ext cx="13207604" cy="2391656"/>
+            <a:off x="1238250" y="3602038"/>
+            <a:ext cx="7429500" cy="1655762"/>
           </a:xfrm>
         </p:spPr>
         <p:txBody>
@@ -538,39 +538,39 @@
           <a:lstStyle>
             <a:lvl1pPr marL="0" indent="0" algn="ctr">
               <a:buNone/>
-              <a:defRPr sz="3467"/>
+              <a:defRPr sz="2400"/>
             </a:lvl1pPr>
-            <a:lvl2pPr marL="660380" indent="0" algn="ctr">
+            <a:lvl2pPr marL="457200" indent="0" algn="ctr">
               <a:buNone/>
-              <a:defRPr sz="2889"/>
+              <a:defRPr sz="2000"/>
             </a:lvl2pPr>
-            <a:lvl3pPr marL="1320759" indent="0" algn="ctr">
+            <a:lvl3pPr marL="914400" indent="0" algn="ctr">
               <a:buNone/>
-              <a:defRPr sz="2600"/>
+              <a:defRPr sz="1800"/>
             </a:lvl3pPr>
-            <a:lvl4pPr marL="1981139" indent="0" algn="ctr">
+            <a:lvl4pPr marL="1371600" indent="0" algn="ctr">
               <a:buNone/>
-              <a:defRPr sz="2311"/>
+              <a:defRPr sz="1600"/>
             </a:lvl4pPr>
-            <a:lvl5pPr marL="2641519" indent="0" algn="ctr">
+            <a:lvl5pPr marL="1828800" indent="0" algn="ctr">
               <a:buNone/>
-              <a:defRPr sz="2311"/>
+              <a:defRPr sz="1600"/>
             </a:lvl5pPr>
-            <a:lvl6pPr marL="3301898" indent="0" algn="ctr">
+            <a:lvl6pPr marL="2286000" indent="0" algn="ctr">
               <a:buNone/>
-              <a:defRPr sz="2311"/>
+              <a:defRPr sz="1600"/>
             </a:lvl6pPr>
-            <a:lvl7pPr marL="3962278" indent="0" algn="ctr">
+            <a:lvl7pPr marL="2743200" indent="0" algn="ctr">
               <a:buNone/>
-              <a:defRPr sz="2311"/>
+              <a:defRPr sz="1600"/>
             </a:lvl7pPr>
-            <a:lvl8pPr marL="4622658" indent="0" algn="ctr">
+            <a:lvl8pPr marL="3200400" indent="0" algn="ctr">
               <a:buNone/>
-              <a:defRPr sz="2311"/>
+              <a:defRPr sz="1600"/>
             </a:lvl8pPr>
-            <a:lvl9pPr marL="5283037" indent="0" algn="ctr">
+            <a:lvl9pPr marL="3657600" indent="0" algn="ctr">
               <a:buNone/>
-              <a:defRPr sz="2311"/>
+              <a:defRPr sz="1600"/>
             </a:lvl9pPr>
           </a:lstStyle>
           <a:p>
@@ -648,11 +648,6 @@
         </p:txBody>
       </p:sp>
     </p:spTree>
-    <p:extLst>
-      <p:ext uri="{BB962C8B-B14F-4D97-AF65-F5344CB8AC3E}">
-        <p14:creationId xmlns:p14="http://schemas.microsoft.com/office/powerpoint/2010/main" val="1752927578"/>
-      </p:ext>
-    </p:extLst>
   </p:cSld>
   <p:clrMapOvr>
     <a:masterClrMapping/>
@@ -718,7 +713,7 @@
             <a:pPr lvl="0"/>
             <a:r>
               <a:rPr lang="en-US" smtClean="0"/>
-              <a:t>Edit Master text styles</a:t>
+              <a:t>Click to edit Master text styles</a:t>
             </a:r>
           </a:p>
           <a:p>
@@ -818,11 +813,6 @@
         </p:txBody>
       </p:sp>
     </p:spTree>
-    <p:extLst>
-      <p:ext uri="{BB962C8B-B14F-4D97-AF65-F5344CB8AC3E}">
-        <p14:creationId xmlns:p14="http://schemas.microsoft.com/office/powerpoint/2010/main" val="203999641"/>
-      </p:ext>
-    </p:extLst>
   </p:cSld>
   <p:clrMapOvr>
     <a:masterClrMapping/>
@@ -859,8 +849,8 @@
         </p:nvSpPr>
         <p:spPr>
           <a:xfrm>
-            <a:off x="12602255" y="527403"/>
-            <a:ext cx="3797186" cy="8394877"/>
+            <a:off x="7088982" y="365125"/>
+            <a:ext cx="2135981" cy="5811838"/>
           </a:xfrm>
         </p:spPr>
         <p:txBody>
@@ -887,8 +877,8 @@
         </p:nvSpPr>
         <p:spPr>
           <a:xfrm>
-            <a:off x="1210697" y="527403"/>
-            <a:ext cx="11171431" cy="8394877"/>
+            <a:off x="681038" y="365125"/>
+            <a:ext cx="6284119" cy="5811838"/>
           </a:xfrm>
         </p:spPr>
         <p:txBody>
@@ -898,7 +888,7 @@
             <a:pPr lvl="0"/>
             <a:r>
               <a:rPr lang="en-US" smtClean="0"/>
-              <a:t>Edit Master text styles</a:t>
+              <a:t>Click to edit Master text styles</a:t>
             </a:r>
           </a:p>
           <a:p>
@@ -998,11 +988,6 @@
         </p:txBody>
       </p:sp>
     </p:spTree>
-    <p:extLst>
-      <p:ext uri="{BB962C8B-B14F-4D97-AF65-F5344CB8AC3E}">
-        <p14:creationId xmlns:p14="http://schemas.microsoft.com/office/powerpoint/2010/main" val="4183826480"/>
-      </p:ext>
-    </p:extLst>
   </p:cSld>
   <p:clrMapOvr>
     <a:masterClrMapping/>
@@ -1068,7 +1053,7 @@
             <a:pPr lvl="0"/>
             <a:r>
               <a:rPr lang="en-US" smtClean="0"/>
-              <a:t>Edit Master text styles</a:t>
+              <a:t>Click to edit Master text styles</a:t>
             </a:r>
           </a:p>
           <a:p>
@@ -1168,11 +1153,6 @@
         </p:txBody>
       </p:sp>
     </p:spTree>
-    <p:extLst>
-      <p:ext uri="{BB962C8B-B14F-4D97-AF65-F5344CB8AC3E}">
-        <p14:creationId xmlns:p14="http://schemas.microsoft.com/office/powerpoint/2010/main" val="4213315307"/>
-      </p:ext>
-    </p:extLst>
   </p:cSld>
   <p:clrMapOvr>
     <a:masterClrMapping/>
@@ -1209,15 +1189,15 @@
         </p:nvSpPr>
         <p:spPr>
           <a:xfrm>
-            <a:off x="1201525" y="2469622"/>
-            <a:ext cx="15188744" cy="4120620"/>
+            <a:off x="675879" y="1709740"/>
+            <a:ext cx="8543925" cy="2852737"/>
           </a:xfrm>
         </p:spPr>
         <p:txBody>
           <a:bodyPr anchor="b"/>
           <a:lstStyle>
             <a:lvl1pPr>
-              <a:defRPr sz="8666"/>
+              <a:defRPr sz="6000"/>
             </a:lvl1pPr>
           </a:lstStyle>
           <a:p>
@@ -1241,8 +1221,8 @@
         </p:nvSpPr>
         <p:spPr>
           <a:xfrm>
-            <a:off x="1201525" y="6629225"/>
-            <a:ext cx="15188744" cy="2166937"/>
+            <a:off x="675879" y="4589465"/>
+            <a:ext cx="8543925" cy="1500187"/>
           </a:xfrm>
         </p:spPr>
         <p:txBody>
@@ -1250,17 +1230,15 @@
           <a:lstStyle>
             <a:lvl1pPr marL="0" indent="0">
               <a:buNone/>
-              <a:defRPr sz="3467">
+              <a:defRPr sz="2400">
                 <a:solidFill>
-                  <a:schemeClr val="tx1">
-                    <a:tint val="75000"/>
-                  </a:schemeClr>
+                  <a:schemeClr val="tx1"/>
                 </a:solidFill>
               </a:defRPr>
             </a:lvl1pPr>
-            <a:lvl2pPr marL="660380" indent="0">
+            <a:lvl2pPr marL="457200" indent="0">
               <a:buNone/>
-              <a:defRPr sz="2889">
+              <a:defRPr sz="2000">
                 <a:solidFill>
                   <a:schemeClr val="tx1">
                     <a:tint val="75000"/>
@@ -1268,9 +1246,9 @@
                 </a:solidFill>
               </a:defRPr>
             </a:lvl2pPr>
-            <a:lvl3pPr marL="1320759" indent="0">
+            <a:lvl3pPr marL="914400" indent="0">
               <a:buNone/>
-              <a:defRPr sz="2600">
+              <a:defRPr sz="1800">
                 <a:solidFill>
                   <a:schemeClr val="tx1">
                     <a:tint val="75000"/>
@@ -1278,9 +1256,9 @@
                 </a:solidFill>
               </a:defRPr>
             </a:lvl3pPr>
-            <a:lvl4pPr marL="1981139" indent="0">
+            <a:lvl4pPr marL="1371600" indent="0">
               <a:buNone/>
-              <a:defRPr sz="2311">
+              <a:defRPr sz="1600">
                 <a:solidFill>
                   <a:schemeClr val="tx1">
                     <a:tint val="75000"/>
@@ -1288,9 +1266,9 @@
                 </a:solidFill>
               </a:defRPr>
             </a:lvl4pPr>
-            <a:lvl5pPr marL="2641519" indent="0">
+            <a:lvl5pPr marL="1828800" indent="0">
               <a:buNone/>
-              <a:defRPr sz="2311">
+              <a:defRPr sz="1600">
                 <a:solidFill>
                   <a:schemeClr val="tx1">
                     <a:tint val="75000"/>
@@ -1298,9 +1276,9 @@
                 </a:solidFill>
               </a:defRPr>
             </a:lvl5pPr>
-            <a:lvl6pPr marL="3301898" indent="0">
+            <a:lvl6pPr marL="2286000" indent="0">
               <a:buNone/>
-              <a:defRPr sz="2311">
+              <a:defRPr sz="1600">
                 <a:solidFill>
                   <a:schemeClr val="tx1">
                     <a:tint val="75000"/>
@@ -1308,9 +1286,9 @@
                 </a:solidFill>
               </a:defRPr>
             </a:lvl6pPr>
-            <a:lvl7pPr marL="3962278" indent="0">
+            <a:lvl7pPr marL="2743200" indent="0">
               <a:buNone/>
-              <a:defRPr sz="2311">
+              <a:defRPr sz="1600">
                 <a:solidFill>
                   <a:schemeClr val="tx1">
                     <a:tint val="75000"/>
@@ -1318,9 +1296,9 @@
                 </a:solidFill>
               </a:defRPr>
             </a:lvl7pPr>
-            <a:lvl8pPr marL="4622658" indent="0">
+            <a:lvl8pPr marL="3200400" indent="0">
               <a:buNone/>
-              <a:defRPr sz="2311">
+              <a:defRPr sz="1600">
                 <a:solidFill>
                   <a:schemeClr val="tx1">
                     <a:tint val="75000"/>
@@ -1328,9 +1306,9 @@
                 </a:solidFill>
               </a:defRPr>
             </a:lvl8pPr>
-            <a:lvl9pPr marL="5283037" indent="0">
+            <a:lvl9pPr marL="3657600" indent="0">
               <a:buNone/>
-              <a:defRPr sz="2311">
+              <a:defRPr sz="1600">
                 <a:solidFill>
                   <a:schemeClr val="tx1">
                     <a:tint val="75000"/>
@@ -1343,7 +1321,7 @@
             <a:pPr lvl="0"/>
             <a:r>
               <a:rPr lang="en-US" smtClean="0"/>
-              <a:t>Edit Master text styles</a:t>
+              <a:t>Click to edit Master text styles</a:t>
             </a:r>
           </a:p>
         </p:txBody>
@@ -1414,11 +1392,6 @@
         </p:txBody>
       </p:sp>
     </p:spTree>
-    <p:extLst>
-      <p:ext uri="{BB962C8B-B14F-4D97-AF65-F5344CB8AC3E}">
-        <p14:creationId xmlns:p14="http://schemas.microsoft.com/office/powerpoint/2010/main" val="1038013132"/>
-      </p:ext>
-    </p:extLst>
   </p:cSld>
   <p:clrMapOvr>
     <a:masterClrMapping/>
@@ -1478,8 +1451,8 @@
         </p:nvSpPr>
         <p:spPr>
           <a:xfrm>
-            <a:off x="1210697" y="2637014"/>
-            <a:ext cx="7484309" cy="6285266"/>
+            <a:off x="681038" y="1825625"/>
+            <a:ext cx="4210050" cy="4351338"/>
           </a:xfrm>
         </p:spPr>
         <p:txBody>
@@ -1489,7 +1462,7 @@
             <a:pPr lvl="0"/>
             <a:r>
               <a:rPr lang="en-US" smtClean="0"/>
-              <a:t>Edit Master text styles</a:t>
+              <a:t>Click to edit Master text styles</a:t>
             </a:r>
           </a:p>
           <a:p>
@@ -1535,8 +1508,8 @@
         </p:nvSpPr>
         <p:spPr>
           <a:xfrm>
-            <a:off x="8915132" y="2637014"/>
-            <a:ext cx="7484309" cy="6285266"/>
+            <a:off x="5014913" y="1825625"/>
+            <a:ext cx="4210050" cy="4351338"/>
           </a:xfrm>
         </p:spPr>
         <p:txBody>
@@ -1546,7 +1519,7 @@
             <a:pPr lvl="0"/>
             <a:r>
               <a:rPr lang="en-US" smtClean="0"/>
-              <a:t>Edit Master text styles</a:t>
+              <a:t>Click to edit Master text styles</a:t>
             </a:r>
           </a:p>
           <a:p>
@@ -1646,11 +1619,6 @@
         </p:txBody>
       </p:sp>
     </p:spTree>
-    <p:extLst>
-      <p:ext uri="{BB962C8B-B14F-4D97-AF65-F5344CB8AC3E}">
-        <p14:creationId xmlns:p14="http://schemas.microsoft.com/office/powerpoint/2010/main" val="2123552177"/>
-      </p:ext>
-    </p:extLst>
   </p:cSld>
   <p:clrMapOvr>
     <a:masterClrMapping/>
@@ -1687,8 +1655,8 @@
         </p:nvSpPr>
         <p:spPr>
           <a:xfrm>
-            <a:off x="1212991" y="527404"/>
-            <a:ext cx="15188744" cy="1914702"/>
+            <a:off x="682328" y="365127"/>
+            <a:ext cx="8543925" cy="1325563"/>
           </a:xfrm>
         </p:spPr>
         <p:txBody>
@@ -1715,8 +1683,8 @@
         </p:nvSpPr>
         <p:spPr>
           <a:xfrm>
-            <a:off x="1212991" y="2428347"/>
-            <a:ext cx="7449913" cy="1190095"/>
+            <a:off x="682329" y="1681163"/>
+            <a:ext cx="4190702" cy="823912"/>
           </a:xfrm>
         </p:spPr>
         <p:txBody>
@@ -1724,46 +1692,46 @@
           <a:lstStyle>
             <a:lvl1pPr marL="0" indent="0">
               <a:buNone/>
-              <a:defRPr sz="3467" b="1"/>
+              <a:defRPr sz="2400" b="1"/>
             </a:lvl1pPr>
-            <a:lvl2pPr marL="660380" indent="0">
+            <a:lvl2pPr marL="457200" indent="0">
               <a:buNone/>
-              <a:defRPr sz="2889" b="1"/>
+              <a:defRPr sz="2000" b="1"/>
             </a:lvl2pPr>
-            <a:lvl3pPr marL="1320759" indent="0">
+            <a:lvl3pPr marL="914400" indent="0">
               <a:buNone/>
-              <a:defRPr sz="2600" b="1"/>
+              <a:defRPr sz="1800" b="1"/>
             </a:lvl3pPr>
-            <a:lvl4pPr marL="1981139" indent="0">
+            <a:lvl4pPr marL="1371600" indent="0">
               <a:buNone/>
-              <a:defRPr sz="2311" b="1"/>
+              <a:defRPr sz="1600" b="1"/>
             </a:lvl4pPr>
-            <a:lvl5pPr marL="2641519" indent="0">
+            <a:lvl5pPr marL="1828800" indent="0">
               <a:buNone/>
-              <a:defRPr sz="2311" b="1"/>
+              <a:defRPr sz="1600" b="1"/>
             </a:lvl5pPr>
-            <a:lvl6pPr marL="3301898" indent="0">
+            <a:lvl6pPr marL="2286000" indent="0">
               <a:buNone/>
-              <a:defRPr sz="2311" b="1"/>
+              <a:defRPr sz="1600" b="1"/>
             </a:lvl6pPr>
-            <a:lvl7pPr marL="3962278" indent="0">
+            <a:lvl7pPr marL="2743200" indent="0">
               <a:buNone/>
-              <a:defRPr sz="2311" b="1"/>
+              <a:defRPr sz="1600" b="1"/>
             </a:lvl7pPr>
-            <a:lvl8pPr marL="4622658" indent="0">
+            <a:lvl8pPr marL="3200400" indent="0">
               <a:buNone/>
-              <a:defRPr sz="2311" b="1"/>
+              <a:defRPr sz="1600" b="1"/>
             </a:lvl8pPr>
-            <a:lvl9pPr marL="5283037" indent="0">
+            <a:lvl9pPr marL="3657600" indent="0">
               <a:buNone/>
-              <a:defRPr sz="2311" b="1"/>
+              <a:defRPr sz="1600" b="1"/>
             </a:lvl9pPr>
           </a:lstStyle>
           <a:p>
             <a:pPr lvl="0"/>
             <a:r>
               <a:rPr lang="en-US" smtClean="0"/>
-              <a:t>Edit Master text styles</a:t>
+              <a:t>Click to edit Master text styles</a:t>
             </a:r>
           </a:p>
         </p:txBody>
@@ -1780,8 +1748,8 @@
         </p:nvSpPr>
         <p:spPr>
           <a:xfrm>
-            <a:off x="1212991" y="3618442"/>
-            <a:ext cx="7449913" cy="5322183"/>
+            <a:off x="682329" y="2505075"/>
+            <a:ext cx="4190702" cy="3684588"/>
           </a:xfrm>
         </p:spPr>
         <p:txBody>
@@ -1791,7 +1759,7 @@
             <a:pPr lvl="0"/>
             <a:r>
               <a:rPr lang="en-US" smtClean="0"/>
-              <a:t>Edit Master text styles</a:t>
+              <a:t>Click to edit Master text styles</a:t>
             </a:r>
           </a:p>
           <a:p>
@@ -1837,8 +1805,8 @@
         </p:nvSpPr>
         <p:spPr>
           <a:xfrm>
-            <a:off x="8915133" y="2428347"/>
-            <a:ext cx="7486602" cy="1190095"/>
+            <a:off x="5014913" y="1681163"/>
+            <a:ext cx="4211340" cy="823912"/>
           </a:xfrm>
         </p:spPr>
         <p:txBody>
@@ -1846,46 +1814,46 @@
           <a:lstStyle>
             <a:lvl1pPr marL="0" indent="0">
               <a:buNone/>
-              <a:defRPr sz="3467" b="1"/>
+              <a:defRPr sz="2400" b="1"/>
             </a:lvl1pPr>
-            <a:lvl2pPr marL="660380" indent="0">
+            <a:lvl2pPr marL="457200" indent="0">
               <a:buNone/>
-              <a:defRPr sz="2889" b="1"/>
+              <a:defRPr sz="2000" b="1"/>
             </a:lvl2pPr>
-            <a:lvl3pPr marL="1320759" indent="0">
+            <a:lvl3pPr marL="914400" indent="0">
               <a:buNone/>
-              <a:defRPr sz="2600" b="1"/>
+              <a:defRPr sz="1800" b="1"/>
             </a:lvl3pPr>
-            <a:lvl4pPr marL="1981139" indent="0">
+            <a:lvl4pPr marL="1371600" indent="0">
               <a:buNone/>
-              <a:defRPr sz="2311" b="1"/>
+              <a:defRPr sz="1600" b="1"/>
             </a:lvl4pPr>
-            <a:lvl5pPr marL="2641519" indent="0">
+            <a:lvl5pPr marL="1828800" indent="0">
               <a:buNone/>
-              <a:defRPr sz="2311" b="1"/>
+              <a:defRPr sz="1600" b="1"/>
             </a:lvl5pPr>
-            <a:lvl6pPr marL="3301898" indent="0">
+            <a:lvl6pPr marL="2286000" indent="0">
               <a:buNone/>
-              <a:defRPr sz="2311" b="1"/>
+              <a:defRPr sz="1600" b="1"/>
             </a:lvl6pPr>
-            <a:lvl7pPr marL="3962278" indent="0">
+            <a:lvl7pPr marL="2743200" indent="0">
               <a:buNone/>
-              <a:defRPr sz="2311" b="1"/>
+              <a:defRPr sz="1600" b="1"/>
             </a:lvl7pPr>
-            <a:lvl8pPr marL="4622658" indent="0">
+            <a:lvl8pPr marL="3200400" indent="0">
               <a:buNone/>
-              <a:defRPr sz="2311" b="1"/>
+              <a:defRPr sz="1600" b="1"/>
             </a:lvl8pPr>
-            <a:lvl9pPr marL="5283037" indent="0">
+            <a:lvl9pPr marL="3657600" indent="0">
               <a:buNone/>
-              <a:defRPr sz="2311" b="1"/>
+              <a:defRPr sz="1600" b="1"/>
             </a:lvl9pPr>
           </a:lstStyle>
           <a:p>
             <a:pPr lvl="0"/>
             <a:r>
               <a:rPr lang="en-US" smtClean="0"/>
-              <a:t>Edit Master text styles</a:t>
+              <a:t>Click to edit Master text styles</a:t>
             </a:r>
           </a:p>
         </p:txBody>
@@ -1902,8 +1870,8 @@
         </p:nvSpPr>
         <p:spPr>
           <a:xfrm>
-            <a:off x="8915133" y="3618442"/>
-            <a:ext cx="7486602" cy="5322183"/>
+            <a:off x="5014913" y="2505075"/>
+            <a:ext cx="4211340" cy="3684588"/>
           </a:xfrm>
         </p:spPr>
         <p:txBody>
@@ -1913,7 +1881,7 @@
             <a:pPr lvl="0"/>
             <a:r>
               <a:rPr lang="en-US" smtClean="0"/>
-              <a:t>Edit Master text styles</a:t>
+              <a:t>Click to edit Master text styles</a:t>
             </a:r>
           </a:p>
           <a:p>
@@ -2013,11 +1981,6 @@
         </p:txBody>
       </p:sp>
     </p:spTree>
-    <p:extLst>
-      <p:ext uri="{BB962C8B-B14F-4D97-AF65-F5344CB8AC3E}">
-        <p14:creationId xmlns:p14="http://schemas.microsoft.com/office/powerpoint/2010/main" val="1291697977"/>
-      </p:ext>
-    </p:extLst>
   </p:cSld>
   <p:clrMapOvr>
     <a:masterClrMapping/>
@@ -2131,11 +2094,6 @@
         </p:txBody>
       </p:sp>
     </p:spTree>
-    <p:extLst>
-      <p:ext uri="{BB962C8B-B14F-4D97-AF65-F5344CB8AC3E}">
-        <p14:creationId xmlns:p14="http://schemas.microsoft.com/office/powerpoint/2010/main" val="1197381530"/>
-      </p:ext>
-    </p:extLst>
   </p:cSld>
   <p:clrMapOvr>
     <a:masterClrMapping/>
@@ -2226,11 +2184,6 @@
         </p:txBody>
       </p:sp>
     </p:spTree>
-    <p:extLst>
-      <p:ext uri="{BB962C8B-B14F-4D97-AF65-F5344CB8AC3E}">
-        <p14:creationId xmlns:p14="http://schemas.microsoft.com/office/powerpoint/2010/main" val="4134553099"/>
-      </p:ext>
-    </p:extLst>
   </p:cSld>
   <p:clrMapOvr>
     <a:masterClrMapping/>
@@ -2267,15 +2220,15 @@
         </p:nvSpPr>
         <p:spPr>
           <a:xfrm>
-            <a:off x="1212992" y="660400"/>
-            <a:ext cx="5679727" cy="2311400"/>
+            <a:off x="682328" y="457200"/>
+            <a:ext cx="3194943" cy="1600200"/>
           </a:xfrm>
         </p:spPr>
         <p:txBody>
           <a:bodyPr anchor="b"/>
           <a:lstStyle>
             <a:lvl1pPr>
-              <a:defRPr sz="4622"/>
+              <a:defRPr sz="3200"/>
             </a:lvl1pPr>
           </a:lstStyle>
           <a:p>
@@ -2299,46 +2252,46 @@
         </p:nvSpPr>
         <p:spPr>
           <a:xfrm>
-            <a:off x="7486603" y="1426281"/>
-            <a:ext cx="8915132" cy="7039681"/>
+            <a:off x="4211340" y="987427"/>
+            <a:ext cx="5014913" cy="4873625"/>
           </a:xfrm>
         </p:spPr>
         <p:txBody>
           <a:bodyPr/>
           <a:lstStyle>
             <a:lvl1pPr>
-              <a:defRPr sz="4622"/>
+              <a:defRPr sz="3200"/>
             </a:lvl1pPr>
             <a:lvl2pPr>
-              <a:defRPr sz="4044"/>
+              <a:defRPr sz="2800"/>
             </a:lvl2pPr>
             <a:lvl3pPr>
-              <a:defRPr sz="3467"/>
+              <a:defRPr sz="2400"/>
             </a:lvl3pPr>
             <a:lvl4pPr>
-              <a:defRPr sz="2889"/>
+              <a:defRPr sz="2000"/>
             </a:lvl4pPr>
             <a:lvl5pPr>
-              <a:defRPr sz="2889"/>
+              <a:defRPr sz="2000"/>
             </a:lvl5pPr>
             <a:lvl6pPr>
-              <a:defRPr sz="2889"/>
+              <a:defRPr sz="2000"/>
             </a:lvl6pPr>
             <a:lvl7pPr>
-              <a:defRPr sz="2889"/>
+              <a:defRPr sz="2000"/>
             </a:lvl7pPr>
             <a:lvl8pPr>
-              <a:defRPr sz="2889"/>
+              <a:defRPr sz="2000"/>
             </a:lvl8pPr>
             <a:lvl9pPr>
-              <a:defRPr sz="2889"/>
+              <a:defRPr sz="2000"/>
             </a:lvl9pPr>
           </a:lstStyle>
           <a:p>
             <a:pPr lvl="0"/>
             <a:r>
               <a:rPr lang="en-US" smtClean="0"/>
-              <a:t>Edit Master text styles</a:t>
+              <a:t>Click to edit Master text styles</a:t>
             </a:r>
           </a:p>
           <a:p>
@@ -2384,8 +2337,8 @@
         </p:nvSpPr>
         <p:spPr>
           <a:xfrm>
-            <a:off x="1212992" y="2971800"/>
-            <a:ext cx="5679727" cy="5505627"/>
+            <a:off x="682328" y="2057400"/>
+            <a:ext cx="3194943" cy="3811588"/>
           </a:xfrm>
         </p:spPr>
         <p:txBody>
@@ -2393,46 +2346,46 @@
           <a:lstStyle>
             <a:lvl1pPr marL="0" indent="0">
               <a:buNone/>
-              <a:defRPr sz="2311"/>
+              <a:defRPr sz="1600"/>
             </a:lvl1pPr>
-            <a:lvl2pPr marL="660380" indent="0">
+            <a:lvl2pPr marL="457200" indent="0">
               <a:buNone/>
-              <a:defRPr sz="2022"/>
+              <a:defRPr sz="1400"/>
             </a:lvl2pPr>
-            <a:lvl3pPr marL="1320759" indent="0">
+            <a:lvl3pPr marL="914400" indent="0">
               <a:buNone/>
-              <a:defRPr sz="1733"/>
+              <a:defRPr sz="1200"/>
             </a:lvl3pPr>
-            <a:lvl4pPr marL="1981139" indent="0">
+            <a:lvl4pPr marL="1371600" indent="0">
               <a:buNone/>
-              <a:defRPr sz="1444"/>
+              <a:defRPr sz="1000"/>
             </a:lvl4pPr>
-            <a:lvl5pPr marL="2641519" indent="0">
+            <a:lvl5pPr marL="1828800" indent="0">
               <a:buNone/>
-              <a:defRPr sz="1444"/>
+              <a:defRPr sz="1000"/>
             </a:lvl5pPr>
-            <a:lvl6pPr marL="3301898" indent="0">
+            <a:lvl6pPr marL="2286000" indent="0">
               <a:buNone/>
-              <a:defRPr sz="1444"/>
+              <a:defRPr sz="1000"/>
             </a:lvl6pPr>
-            <a:lvl7pPr marL="3962278" indent="0">
+            <a:lvl7pPr marL="2743200" indent="0">
               <a:buNone/>
-              <a:defRPr sz="1444"/>
+              <a:defRPr sz="1000"/>
             </a:lvl7pPr>
-            <a:lvl8pPr marL="4622658" indent="0">
+            <a:lvl8pPr marL="3200400" indent="0">
               <a:buNone/>
-              <a:defRPr sz="1444"/>
+              <a:defRPr sz="1000"/>
             </a:lvl8pPr>
-            <a:lvl9pPr marL="5283037" indent="0">
+            <a:lvl9pPr marL="3657600" indent="0">
               <a:buNone/>
-              <a:defRPr sz="1444"/>
+              <a:defRPr sz="1000"/>
             </a:lvl9pPr>
           </a:lstStyle>
           <a:p>
             <a:pPr lvl="0"/>
             <a:r>
               <a:rPr lang="en-US" smtClean="0"/>
-              <a:t>Edit Master text styles</a:t>
+              <a:t>Click to edit Master text styles</a:t>
             </a:r>
           </a:p>
         </p:txBody>
@@ -2503,11 +2456,6 @@
         </p:txBody>
       </p:sp>
     </p:spTree>
-    <p:extLst>
-      <p:ext uri="{BB962C8B-B14F-4D97-AF65-F5344CB8AC3E}">
-        <p14:creationId xmlns:p14="http://schemas.microsoft.com/office/powerpoint/2010/main" val="2667538082"/>
-      </p:ext>
-    </p:extLst>
   </p:cSld>
   <p:clrMapOvr>
     <a:masterClrMapping/>
@@ -2544,15 +2492,15 @@
         </p:nvSpPr>
         <p:spPr>
           <a:xfrm>
-            <a:off x="1212992" y="660400"/>
-            <a:ext cx="5679727" cy="2311400"/>
+            <a:off x="682328" y="457200"/>
+            <a:ext cx="3194943" cy="1600200"/>
           </a:xfrm>
         </p:spPr>
         <p:txBody>
           <a:bodyPr anchor="b"/>
           <a:lstStyle>
             <a:lvl1pPr>
-              <a:defRPr sz="4622"/>
+              <a:defRPr sz="3200"/>
             </a:lvl1pPr>
           </a:lstStyle>
           <a:p>
@@ -2576,8 +2524,8 @@
         </p:nvSpPr>
         <p:spPr>
           <a:xfrm>
-            <a:off x="7486603" y="1426281"/>
-            <a:ext cx="8915132" cy="7039681"/>
+            <a:off x="4211340" y="987427"/>
+            <a:ext cx="5014913" cy="4873625"/>
           </a:xfrm>
         </p:spPr>
         <p:txBody>
@@ -2585,45 +2533,45 @@
           <a:lstStyle>
             <a:lvl1pPr marL="0" indent="0">
               <a:buNone/>
-              <a:defRPr sz="4622"/>
+              <a:defRPr sz="3200"/>
             </a:lvl1pPr>
-            <a:lvl2pPr marL="660380" indent="0">
+            <a:lvl2pPr marL="457200" indent="0">
               <a:buNone/>
-              <a:defRPr sz="4044"/>
+              <a:defRPr sz="2800"/>
             </a:lvl2pPr>
-            <a:lvl3pPr marL="1320759" indent="0">
+            <a:lvl3pPr marL="914400" indent="0">
               <a:buNone/>
-              <a:defRPr sz="3467"/>
+              <a:defRPr sz="2400"/>
             </a:lvl3pPr>
-            <a:lvl4pPr marL="1981139" indent="0">
+            <a:lvl4pPr marL="1371600" indent="0">
               <a:buNone/>
-              <a:defRPr sz="2889"/>
+              <a:defRPr sz="2000"/>
             </a:lvl4pPr>
-            <a:lvl5pPr marL="2641519" indent="0">
+            <a:lvl5pPr marL="1828800" indent="0">
               <a:buNone/>
-              <a:defRPr sz="2889"/>
+              <a:defRPr sz="2000"/>
             </a:lvl5pPr>
-            <a:lvl6pPr marL="3301898" indent="0">
+            <a:lvl6pPr marL="2286000" indent="0">
               <a:buNone/>
-              <a:defRPr sz="2889"/>
+              <a:defRPr sz="2000"/>
             </a:lvl6pPr>
-            <a:lvl7pPr marL="3962278" indent="0">
+            <a:lvl7pPr marL="2743200" indent="0">
               <a:buNone/>
-              <a:defRPr sz="2889"/>
+              <a:defRPr sz="2000"/>
             </a:lvl7pPr>
-            <a:lvl8pPr marL="4622658" indent="0">
+            <a:lvl8pPr marL="3200400" indent="0">
               <a:buNone/>
-              <a:defRPr sz="2889"/>
+              <a:defRPr sz="2000"/>
             </a:lvl8pPr>
-            <a:lvl9pPr marL="5283037" indent="0">
+            <a:lvl9pPr marL="3657600" indent="0">
               <a:buNone/>
-              <a:defRPr sz="2889"/>
+              <a:defRPr sz="2000"/>
             </a:lvl9pPr>
           </a:lstStyle>
           <a:p>
             <a:r>
               <a:rPr lang="en-US" smtClean="0"/>
-              <a:t>Click icon to add picture</a:t>
+              <a:t>Drag picture to placeholder or click icon to add</a:t>
             </a:r>
             <a:endParaRPr lang="en-US" dirty="0"/>
           </a:p>
@@ -2641,8 +2589,8 @@
         </p:nvSpPr>
         <p:spPr>
           <a:xfrm>
-            <a:off x="1212992" y="2971800"/>
-            <a:ext cx="5679727" cy="5505627"/>
+            <a:off x="682328" y="2057400"/>
+            <a:ext cx="3194943" cy="3811588"/>
           </a:xfrm>
         </p:spPr>
         <p:txBody>
@@ -2650,46 +2598,46 @@
           <a:lstStyle>
             <a:lvl1pPr marL="0" indent="0">
               <a:buNone/>
-              <a:defRPr sz="2311"/>
+              <a:defRPr sz="1600"/>
             </a:lvl1pPr>
-            <a:lvl2pPr marL="660380" indent="0">
+            <a:lvl2pPr marL="457200" indent="0">
               <a:buNone/>
-              <a:defRPr sz="2022"/>
+              <a:defRPr sz="1400"/>
             </a:lvl2pPr>
-            <a:lvl3pPr marL="1320759" indent="0">
+            <a:lvl3pPr marL="914400" indent="0">
               <a:buNone/>
-              <a:defRPr sz="1733"/>
+              <a:defRPr sz="1200"/>
             </a:lvl3pPr>
-            <a:lvl4pPr marL="1981139" indent="0">
+            <a:lvl4pPr marL="1371600" indent="0">
               <a:buNone/>
-              <a:defRPr sz="1444"/>
+              <a:defRPr sz="1000"/>
             </a:lvl4pPr>
-            <a:lvl5pPr marL="2641519" indent="0">
+            <a:lvl5pPr marL="1828800" indent="0">
               <a:buNone/>
-              <a:defRPr sz="1444"/>
+              <a:defRPr sz="1000"/>
             </a:lvl5pPr>
-            <a:lvl6pPr marL="3301898" indent="0">
+            <a:lvl6pPr marL="2286000" indent="0">
               <a:buNone/>
-              <a:defRPr sz="1444"/>
+              <a:defRPr sz="1000"/>
             </a:lvl6pPr>
-            <a:lvl7pPr marL="3962278" indent="0">
+            <a:lvl7pPr marL="2743200" indent="0">
               <a:buNone/>
-              <a:defRPr sz="1444"/>
+              <a:defRPr sz="1000"/>
             </a:lvl7pPr>
-            <a:lvl8pPr marL="4622658" indent="0">
+            <a:lvl8pPr marL="3200400" indent="0">
               <a:buNone/>
-              <a:defRPr sz="1444"/>
+              <a:defRPr sz="1000"/>
             </a:lvl8pPr>
-            <a:lvl9pPr marL="5283037" indent="0">
+            <a:lvl9pPr marL="3657600" indent="0">
               <a:buNone/>
-              <a:defRPr sz="1444"/>
+              <a:defRPr sz="1000"/>
             </a:lvl9pPr>
           </a:lstStyle>
           <a:p>
             <a:pPr lvl="0"/>
             <a:r>
               <a:rPr lang="en-US" smtClean="0"/>
-              <a:t>Edit Master text styles</a:t>
+              <a:t>Click to edit Master text styles</a:t>
             </a:r>
           </a:p>
         </p:txBody>
@@ -2760,11 +2708,6 @@
         </p:txBody>
       </p:sp>
     </p:spTree>
-    <p:extLst>
-      <p:ext uri="{BB962C8B-B14F-4D97-AF65-F5344CB8AC3E}">
-        <p14:creationId xmlns:p14="http://schemas.microsoft.com/office/powerpoint/2010/main" val="2556546145"/>
-      </p:ext>
-    </p:extLst>
   </p:cSld>
   <p:clrMapOvr>
     <a:masterClrMapping/>
@@ -2806,8 +2749,8 @@
         </p:nvSpPr>
         <p:spPr>
           <a:xfrm>
-            <a:off x="1210697" y="527404"/>
-            <a:ext cx="15188744" cy="1914702"/>
+            <a:off x="681038" y="365127"/>
+            <a:ext cx="8543925" cy="1325563"/>
           </a:xfrm>
           <a:prstGeom prst="rect">
             <a:avLst/>
@@ -2839,8 +2782,8 @@
         </p:nvSpPr>
         <p:spPr>
           <a:xfrm>
-            <a:off x="1210697" y="2637014"/>
-            <a:ext cx="15188744" cy="6285266"/>
+            <a:off x="681038" y="1825625"/>
+            <a:ext cx="8543925" cy="4351338"/>
           </a:xfrm>
           <a:prstGeom prst="rect">
             <a:avLst/>
@@ -2855,7 +2798,7 @@
             <a:pPr lvl="0"/>
             <a:r>
               <a:rPr lang="en-US" smtClean="0"/>
-              <a:t>Edit Master text styles</a:t>
+              <a:t>Click to edit Master text styles</a:t>
             </a:r>
           </a:p>
           <a:p>
@@ -2901,8 +2844,8 @@
         </p:nvSpPr>
         <p:spPr>
           <a:xfrm>
-            <a:off x="1210697" y="9181395"/>
-            <a:ext cx="3962281" cy="527403"/>
+            <a:off x="681038" y="6356352"/>
+            <a:ext cx="2228850" cy="365125"/>
           </a:xfrm>
           <a:prstGeom prst="rect">
             <a:avLst/>
@@ -2912,7 +2855,7 @@
           <a:bodyPr vert="horz" lIns="91440" tIns="45720" rIns="91440" bIns="45720" rtlCol="0" anchor="ctr"/>
           <a:lstStyle>
             <a:lvl1pPr algn="l">
-              <a:defRPr sz="1733">
+              <a:defRPr sz="1200">
                 <a:solidFill>
                   <a:schemeClr val="tx1">
                     <a:tint val="75000"/>
@@ -2942,8 +2885,8 @@
         </p:nvSpPr>
         <p:spPr>
           <a:xfrm>
-            <a:off x="5833358" y="9181395"/>
-            <a:ext cx="5943422" cy="527403"/>
+            <a:off x="3281363" y="6356352"/>
+            <a:ext cx="3343275" cy="365125"/>
           </a:xfrm>
           <a:prstGeom prst="rect">
             <a:avLst/>
@@ -2953,7 +2896,7 @@
           <a:bodyPr vert="horz" lIns="91440" tIns="45720" rIns="91440" bIns="45720" rtlCol="0" anchor="ctr"/>
           <a:lstStyle>
             <a:lvl1pPr algn="ctr">
-              <a:defRPr sz="1733">
+              <a:defRPr sz="1200">
                 <a:solidFill>
                   <a:schemeClr val="tx1">
                     <a:tint val="75000"/>
@@ -2979,8 +2922,8 @@
         </p:nvSpPr>
         <p:spPr>
           <a:xfrm>
-            <a:off x="12437160" y="9181395"/>
-            <a:ext cx="3962281" cy="527403"/>
+            <a:off x="6996113" y="6356352"/>
+            <a:ext cx="2228850" cy="365125"/>
           </a:xfrm>
           <a:prstGeom prst="rect">
             <a:avLst/>
@@ -2990,7 +2933,7 @@
           <a:bodyPr vert="horz" lIns="91440" tIns="45720" rIns="91440" bIns="45720" rtlCol="0" anchor="ctr"/>
           <a:lstStyle>
             <a:lvl1pPr algn="r">
-              <a:defRPr sz="1733">
+              <a:defRPr sz="1200">
                 <a:solidFill>
                   <a:schemeClr val="tx1">
                     <a:tint val="75000"/>
@@ -3011,27 +2954,27 @@
     </p:spTree>
     <p:extLst>
       <p:ext uri="{BB962C8B-B14F-4D97-AF65-F5344CB8AC3E}">
-        <p14:creationId xmlns:p14="http://schemas.microsoft.com/office/powerpoint/2010/main" val="3627752488"/>
+        <p14:creationId xmlns:p14="http://schemas.microsoft.com/office/powerpoint/2010/main" val="1286468825"/>
       </p:ext>
     </p:extLst>
   </p:cSld>
   <p:clrMap bg1="lt1" tx1="dk1" bg2="lt2" tx2="dk2" accent1="accent1" accent2="accent2" accent3="accent3" accent4="accent4" accent5="accent5" accent6="accent6" hlink="hlink" folHlink="folHlink"/>
   <p:sldLayoutIdLst>
-    <p:sldLayoutId id="2147483673" r:id="rId1"/>
-    <p:sldLayoutId id="2147483674" r:id="rId2"/>
-    <p:sldLayoutId id="2147483675" r:id="rId3"/>
-    <p:sldLayoutId id="2147483676" r:id="rId4"/>
-    <p:sldLayoutId id="2147483677" r:id="rId5"/>
-    <p:sldLayoutId id="2147483678" r:id="rId6"/>
-    <p:sldLayoutId id="2147483679" r:id="rId7"/>
-    <p:sldLayoutId id="2147483680" r:id="rId8"/>
-    <p:sldLayoutId id="2147483681" r:id="rId9"/>
-    <p:sldLayoutId id="2147483682" r:id="rId10"/>
-    <p:sldLayoutId id="2147483683" r:id="rId11"/>
+    <p:sldLayoutId id="2147483685" r:id="rId1"/>
+    <p:sldLayoutId id="2147483686" r:id="rId2"/>
+    <p:sldLayoutId id="2147483687" r:id="rId3"/>
+    <p:sldLayoutId id="2147483688" r:id="rId4"/>
+    <p:sldLayoutId id="2147483689" r:id="rId5"/>
+    <p:sldLayoutId id="2147483690" r:id="rId6"/>
+    <p:sldLayoutId id="2147483691" r:id="rId7"/>
+    <p:sldLayoutId id="2147483692" r:id="rId8"/>
+    <p:sldLayoutId id="2147483693" r:id="rId9"/>
+    <p:sldLayoutId id="2147483694" r:id="rId10"/>
+    <p:sldLayoutId id="2147483695" r:id="rId11"/>
   </p:sldLayoutIdLst>
   <p:txStyles>
     <p:titleStyle>
-      <a:lvl1pPr algn="l" defTabSz="1320759" rtl="0" eaLnBrk="1" latinLnBrk="0" hangingPunct="1">
+      <a:lvl1pPr algn="l" defTabSz="914400" rtl="0" eaLnBrk="1" latinLnBrk="0" hangingPunct="1">
         <a:lnSpc>
           <a:spcPct val="90000"/>
         </a:lnSpc>
@@ -3039,7 +2982,7 @@
           <a:spcPct val="0"/>
         </a:spcBef>
         <a:buNone/>
-        <a:defRPr sz="6355" kern="1200">
+        <a:defRPr sz="4400" kern="1200">
           <a:solidFill>
             <a:schemeClr val="tx1"/>
           </a:solidFill>
@@ -3050,16 +2993,16 @@
       </a:lvl1pPr>
     </p:titleStyle>
     <p:bodyStyle>
-      <a:lvl1pPr marL="330190" indent="-330190" algn="l" defTabSz="1320759" rtl="0" eaLnBrk="1" latinLnBrk="0" hangingPunct="1">
+      <a:lvl1pPr marL="228600" indent="-228600" algn="l" defTabSz="914400" rtl="0" eaLnBrk="1" latinLnBrk="0" hangingPunct="1">
         <a:lnSpc>
           <a:spcPct val="90000"/>
         </a:lnSpc>
         <a:spcBef>
-          <a:spcPts val="1444"/>
+          <a:spcPts val="1000"/>
         </a:spcBef>
         <a:buFont typeface="Arial" panose="020B0604020202020204" pitchFamily="34" charset="0"/>
         <a:buChar char="•"/>
-        <a:defRPr sz="4044" kern="1200">
+        <a:defRPr sz="2800" kern="1200">
           <a:solidFill>
             <a:schemeClr val="tx1"/>
           </a:solidFill>
@@ -3068,16 +3011,16 @@
           <a:cs typeface="+mn-cs"/>
         </a:defRPr>
       </a:lvl1pPr>
-      <a:lvl2pPr marL="990570" indent="-330190" algn="l" defTabSz="1320759" rtl="0" eaLnBrk="1" latinLnBrk="0" hangingPunct="1">
+      <a:lvl2pPr marL="685800" indent="-228600" algn="l" defTabSz="914400" rtl="0" eaLnBrk="1" latinLnBrk="0" hangingPunct="1">
         <a:lnSpc>
           <a:spcPct val="90000"/>
         </a:lnSpc>
         <a:spcBef>
-          <a:spcPts val="722"/>
+          <a:spcPts val="500"/>
         </a:spcBef>
         <a:buFont typeface="Arial" panose="020B0604020202020204" pitchFamily="34" charset="0"/>
         <a:buChar char="•"/>
-        <a:defRPr sz="3467" kern="1200">
+        <a:defRPr sz="2400" kern="1200">
           <a:solidFill>
             <a:schemeClr val="tx1"/>
           </a:solidFill>
@@ -3086,16 +3029,16 @@
           <a:cs typeface="+mn-cs"/>
         </a:defRPr>
       </a:lvl2pPr>
-      <a:lvl3pPr marL="1650949" indent="-330190" algn="l" defTabSz="1320759" rtl="0" eaLnBrk="1" latinLnBrk="0" hangingPunct="1">
+      <a:lvl3pPr marL="1143000" indent="-228600" algn="l" defTabSz="914400" rtl="0" eaLnBrk="1" latinLnBrk="0" hangingPunct="1">
         <a:lnSpc>
           <a:spcPct val="90000"/>
         </a:lnSpc>
         <a:spcBef>
-          <a:spcPts val="722"/>
+          <a:spcPts val="500"/>
         </a:spcBef>
         <a:buFont typeface="Arial" panose="020B0604020202020204" pitchFamily="34" charset="0"/>
         <a:buChar char="•"/>
-        <a:defRPr sz="2889" kern="1200">
+        <a:defRPr sz="2000" kern="1200">
           <a:solidFill>
             <a:schemeClr val="tx1"/>
           </a:solidFill>
@@ -3104,16 +3047,16 @@
           <a:cs typeface="+mn-cs"/>
         </a:defRPr>
       </a:lvl3pPr>
-      <a:lvl4pPr marL="2311329" indent="-330190" algn="l" defTabSz="1320759" rtl="0" eaLnBrk="1" latinLnBrk="0" hangingPunct="1">
+      <a:lvl4pPr marL="1600200" indent="-228600" algn="l" defTabSz="914400" rtl="0" eaLnBrk="1" latinLnBrk="0" hangingPunct="1">
         <a:lnSpc>
           <a:spcPct val="90000"/>
         </a:lnSpc>
         <a:spcBef>
-          <a:spcPts val="722"/>
+          <a:spcPts val="500"/>
         </a:spcBef>
         <a:buFont typeface="Arial" panose="020B0604020202020204" pitchFamily="34" charset="0"/>
         <a:buChar char="•"/>
-        <a:defRPr sz="2600" kern="1200">
+        <a:defRPr sz="1800" kern="1200">
           <a:solidFill>
             <a:schemeClr val="tx1"/>
           </a:solidFill>
@@ -3122,16 +3065,16 @@
           <a:cs typeface="+mn-cs"/>
         </a:defRPr>
       </a:lvl4pPr>
-      <a:lvl5pPr marL="2971709" indent="-330190" algn="l" defTabSz="1320759" rtl="0" eaLnBrk="1" latinLnBrk="0" hangingPunct="1">
+      <a:lvl5pPr marL="2057400" indent="-228600" algn="l" defTabSz="914400" rtl="0" eaLnBrk="1" latinLnBrk="0" hangingPunct="1">
         <a:lnSpc>
           <a:spcPct val="90000"/>
         </a:lnSpc>
         <a:spcBef>
-          <a:spcPts val="722"/>
+          <a:spcPts val="500"/>
         </a:spcBef>
         <a:buFont typeface="Arial" panose="020B0604020202020204" pitchFamily="34" charset="0"/>
         <a:buChar char="•"/>
-        <a:defRPr sz="2600" kern="1200">
+        <a:defRPr sz="1800" kern="1200">
           <a:solidFill>
             <a:schemeClr val="tx1"/>
           </a:solidFill>
@@ -3140,16 +3083,16 @@
           <a:cs typeface="+mn-cs"/>
         </a:defRPr>
       </a:lvl5pPr>
-      <a:lvl6pPr marL="3632088" indent="-330190" algn="l" defTabSz="1320759" rtl="0" eaLnBrk="1" latinLnBrk="0" hangingPunct="1">
+      <a:lvl6pPr marL="2514600" indent="-228600" algn="l" defTabSz="914400" rtl="0" eaLnBrk="1" latinLnBrk="0" hangingPunct="1">
         <a:lnSpc>
           <a:spcPct val="90000"/>
         </a:lnSpc>
         <a:spcBef>
-          <a:spcPts val="722"/>
+          <a:spcPts val="500"/>
         </a:spcBef>
         <a:buFont typeface="Arial" panose="020B0604020202020204" pitchFamily="34" charset="0"/>
         <a:buChar char="•"/>
-        <a:defRPr sz="2600" kern="1200">
+        <a:defRPr sz="1800" kern="1200">
           <a:solidFill>
             <a:schemeClr val="tx1"/>
           </a:solidFill>
@@ -3158,16 +3101,16 @@
           <a:cs typeface="+mn-cs"/>
         </a:defRPr>
       </a:lvl6pPr>
-      <a:lvl7pPr marL="4292468" indent="-330190" algn="l" defTabSz="1320759" rtl="0" eaLnBrk="1" latinLnBrk="0" hangingPunct="1">
+      <a:lvl7pPr marL="2971800" indent="-228600" algn="l" defTabSz="914400" rtl="0" eaLnBrk="1" latinLnBrk="0" hangingPunct="1">
         <a:lnSpc>
           <a:spcPct val="90000"/>
         </a:lnSpc>
         <a:spcBef>
-          <a:spcPts val="722"/>
+          <a:spcPts val="500"/>
         </a:spcBef>
         <a:buFont typeface="Arial" panose="020B0604020202020204" pitchFamily="34" charset="0"/>
         <a:buChar char="•"/>
-        <a:defRPr sz="2600" kern="1200">
+        <a:defRPr sz="1800" kern="1200">
           <a:solidFill>
             <a:schemeClr val="tx1"/>
           </a:solidFill>
@@ -3176,16 +3119,16 @@
           <a:cs typeface="+mn-cs"/>
         </a:defRPr>
       </a:lvl7pPr>
-      <a:lvl8pPr marL="4952848" indent="-330190" algn="l" defTabSz="1320759" rtl="0" eaLnBrk="1" latinLnBrk="0" hangingPunct="1">
+      <a:lvl8pPr marL="3429000" indent="-228600" algn="l" defTabSz="914400" rtl="0" eaLnBrk="1" latinLnBrk="0" hangingPunct="1">
         <a:lnSpc>
           <a:spcPct val="90000"/>
         </a:lnSpc>
         <a:spcBef>
-          <a:spcPts val="722"/>
+          <a:spcPts val="500"/>
         </a:spcBef>
         <a:buFont typeface="Arial" panose="020B0604020202020204" pitchFamily="34" charset="0"/>
         <a:buChar char="•"/>
-        <a:defRPr sz="2600" kern="1200">
+        <a:defRPr sz="1800" kern="1200">
           <a:solidFill>
             <a:schemeClr val="tx1"/>
           </a:solidFill>
@@ -3194,16 +3137,16 @@
           <a:cs typeface="+mn-cs"/>
         </a:defRPr>
       </a:lvl8pPr>
-      <a:lvl9pPr marL="5613227" indent="-330190" algn="l" defTabSz="1320759" rtl="0" eaLnBrk="1" latinLnBrk="0" hangingPunct="1">
+      <a:lvl9pPr marL="3886200" indent="-228600" algn="l" defTabSz="914400" rtl="0" eaLnBrk="1" latinLnBrk="0" hangingPunct="1">
         <a:lnSpc>
           <a:spcPct val="90000"/>
         </a:lnSpc>
         <a:spcBef>
-          <a:spcPts val="722"/>
+          <a:spcPts val="500"/>
         </a:spcBef>
         <a:buFont typeface="Arial" panose="020B0604020202020204" pitchFamily="34" charset="0"/>
         <a:buChar char="•"/>
-        <a:defRPr sz="2600" kern="1200">
+        <a:defRPr sz="1800" kern="1200">
           <a:solidFill>
             <a:schemeClr val="tx1"/>
           </a:solidFill>
@@ -3217,8 +3160,8 @@
       <a:defPPr>
         <a:defRPr lang="en-US"/>
       </a:defPPr>
-      <a:lvl1pPr marL="0" algn="l" defTabSz="1320759" rtl="0" eaLnBrk="1" latinLnBrk="0" hangingPunct="1">
-        <a:defRPr sz="2600" kern="1200">
+      <a:lvl1pPr marL="0" algn="l" defTabSz="914400" rtl="0" eaLnBrk="1" latinLnBrk="0" hangingPunct="1">
+        <a:defRPr sz="1800" kern="1200">
           <a:solidFill>
             <a:schemeClr val="tx1"/>
           </a:solidFill>
@@ -3227,8 +3170,8 @@
           <a:cs typeface="+mn-cs"/>
         </a:defRPr>
       </a:lvl1pPr>
-      <a:lvl2pPr marL="660380" algn="l" defTabSz="1320759" rtl="0" eaLnBrk="1" latinLnBrk="0" hangingPunct="1">
-        <a:defRPr sz="2600" kern="1200">
+      <a:lvl2pPr marL="457200" algn="l" defTabSz="914400" rtl="0" eaLnBrk="1" latinLnBrk="0" hangingPunct="1">
+        <a:defRPr sz="1800" kern="1200">
           <a:solidFill>
             <a:schemeClr val="tx1"/>
           </a:solidFill>
@@ -3237,8 +3180,8 @@
           <a:cs typeface="+mn-cs"/>
         </a:defRPr>
       </a:lvl2pPr>
-      <a:lvl3pPr marL="1320759" algn="l" defTabSz="1320759" rtl="0" eaLnBrk="1" latinLnBrk="0" hangingPunct="1">
-        <a:defRPr sz="2600" kern="1200">
+      <a:lvl3pPr marL="914400" algn="l" defTabSz="914400" rtl="0" eaLnBrk="1" latinLnBrk="0" hangingPunct="1">
+        <a:defRPr sz="1800" kern="1200">
           <a:solidFill>
             <a:schemeClr val="tx1"/>
           </a:solidFill>
@@ -3247,8 +3190,8 @@
           <a:cs typeface="+mn-cs"/>
         </a:defRPr>
       </a:lvl3pPr>
-      <a:lvl4pPr marL="1981139" algn="l" defTabSz="1320759" rtl="0" eaLnBrk="1" latinLnBrk="0" hangingPunct="1">
-        <a:defRPr sz="2600" kern="1200">
+      <a:lvl4pPr marL="1371600" algn="l" defTabSz="914400" rtl="0" eaLnBrk="1" latinLnBrk="0" hangingPunct="1">
+        <a:defRPr sz="1800" kern="1200">
           <a:solidFill>
             <a:schemeClr val="tx1"/>
           </a:solidFill>
@@ -3257,8 +3200,8 @@
           <a:cs typeface="+mn-cs"/>
         </a:defRPr>
       </a:lvl4pPr>
-      <a:lvl5pPr marL="2641519" algn="l" defTabSz="1320759" rtl="0" eaLnBrk="1" latinLnBrk="0" hangingPunct="1">
-        <a:defRPr sz="2600" kern="1200">
+      <a:lvl5pPr marL="1828800" algn="l" defTabSz="914400" rtl="0" eaLnBrk="1" latinLnBrk="0" hangingPunct="1">
+        <a:defRPr sz="1800" kern="1200">
           <a:solidFill>
             <a:schemeClr val="tx1"/>
           </a:solidFill>
@@ -3267,8 +3210,8 @@
           <a:cs typeface="+mn-cs"/>
         </a:defRPr>
       </a:lvl5pPr>
-      <a:lvl6pPr marL="3301898" algn="l" defTabSz="1320759" rtl="0" eaLnBrk="1" latinLnBrk="0" hangingPunct="1">
-        <a:defRPr sz="2600" kern="1200">
+      <a:lvl6pPr marL="2286000" algn="l" defTabSz="914400" rtl="0" eaLnBrk="1" latinLnBrk="0" hangingPunct="1">
+        <a:defRPr sz="1800" kern="1200">
           <a:solidFill>
             <a:schemeClr val="tx1"/>
           </a:solidFill>
@@ -3277,8 +3220,8 @@
           <a:cs typeface="+mn-cs"/>
         </a:defRPr>
       </a:lvl6pPr>
-      <a:lvl7pPr marL="3962278" algn="l" defTabSz="1320759" rtl="0" eaLnBrk="1" latinLnBrk="0" hangingPunct="1">
-        <a:defRPr sz="2600" kern="1200">
+      <a:lvl7pPr marL="2743200" algn="l" defTabSz="914400" rtl="0" eaLnBrk="1" latinLnBrk="0" hangingPunct="1">
+        <a:defRPr sz="1800" kern="1200">
           <a:solidFill>
             <a:schemeClr val="tx1"/>
           </a:solidFill>
@@ -3287,8 +3230,8 @@
           <a:cs typeface="+mn-cs"/>
         </a:defRPr>
       </a:lvl7pPr>
-      <a:lvl8pPr marL="4622658" algn="l" defTabSz="1320759" rtl="0" eaLnBrk="1" latinLnBrk="0" hangingPunct="1">
-        <a:defRPr sz="2600" kern="1200">
+      <a:lvl8pPr marL="3200400" algn="l" defTabSz="914400" rtl="0" eaLnBrk="1" latinLnBrk="0" hangingPunct="1">
+        <a:defRPr sz="1800" kern="1200">
           <a:solidFill>
             <a:schemeClr val="tx1"/>
           </a:solidFill>
@@ -3297,8 +3240,8 @@
           <a:cs typeface="+mn-cs"/>
         </a:defRPr>
       </a:lvl8pPr>
-      <a:lvl9pPr marL="5283037" algn="l" defTabSz="1320759" rtl="0" eaLnBrk="1" latinLnBrk="0" hangingPunct="1">
-        <a:defRPr sz="2600" kern="1200">
+      <a:lvl9pPr marL="3657600" algn="l" defTabSz="914400" rtl="0" eaLnBrk="1" latinLnBrk="0" hangingPunct="1">
+        <a:defRPr sz="1800" kern="1200">
           <a:solidFill>
             <a:schemeClr val="tx1"/>
           </a:solidFill>
@@ -3337,27 +3280,29 @@
           </p:cNvPicPr>
           <p:nvPr/>
         </p:nvPicPr>
-        <p:blipFill>
+        <p:blipFill rotWithShape="1">
           <a:blip r:embed="rId2">
-            <a:alphaModFix/>
             <a:extLst>
               <a:ext uri="{28A0092B-C50C-407E-A947-70E740481C1C}">
                 <a14:useLocalDpi xmlns:a14="http://schemas.microsoft.com/office/drawing/2010/main" val="0"/>
               </a:ext>
             </a:extLst>
           </a:blip>
-          <a:stretch>
-            <a:fillRect/>
-          </a:stretch>
+          <a:srcRect l="12087" r="11779" b="6250"/>
+          <a:stretch/>
         </p:blipFill>
         <p:spPr>
           <a:xfrm>
             <a:off x="0" y="0"/>
-            <a:ext cx="17666583" cy="9932602"/>
+            <a:ext cx="9906000" cy="6858000"/>
           </a:xfrm>
           <a:prstGeom prst="rect">
             <a:avLst/>
           </a:prstGeom>
+          <a:noFill/>
+          <a:ln>
+            <a:noFill/>
+          </a:ln>
         </p:spPr>
       </p:pic>
       <p:sp>
@@ -3368,8 +3313,8 @@
         </p:nvSpPr>
         <p:spPr>
           <a:xfrm>
-            <a:off x="276557" y="1157201"/>
-            <a:ext cx="16985714" cy="8619914"/>
+            <a:off x="155569" y="687767"/>
+            <a:ext cx="9554751" cy="5998783"/>
           </a:xfrm>
           <a:prstGeom prst="roundRect">
             <a:avLst/>
@@ -3400,11 +3345,16 @@
           </a:fontRef>
         </p:style>
         <p:txBody>
-          <a:bodyPr rtlCol="0" anchor="ctr"/>
+          <a:bodyPr rot="0" spcFirstLastPara="0" vertOverflow="overflow" horzOverflow="overflow" vert="horz" wrap="square" lIns="51437" tIns="25718" rIns="51437" bIns="25718" numCol="1" spcCol="0" rtlCol="0" fromWordArt="0" anchor="ctr" anchorCtr="0" forceAA="0" compatLnSpc="1">
+            <a:prstTxWarp prst="textNoShape">
+              <a:avLst/>
+            </a:prstTxWarp>
+            <a:noAutofit/>
+          </a:bodyPr>
           <a:lstStyle/>
           <a:p>
             <a:pPr algn="ctr"/>
-            <a:endParaRPr lang="en-US"/>
+            <a:endParaRPr lang="en-US" sz="617"/>
           </a:p>
         </p:txBody>
       </p:sp>
@@ -3416,8 +3366,8 @@
         </p:nvSpPr>
         <p:spPr>
           <a:xfrm>
-            <a:off x="4040514" y="102080"/>
-            <a:ext cx="9033797" cy="646331"/>
+            <a:off x="2272857" y="43041"/>
+            <a:ext cx="5081664" cy="403957"/>
           </a:xfrm>
           <a:prstGeom prst="rect">
             <a:avLst/>
@@ -3432,7 +3382,7 @@
           <a:p>
             <a:pPr algn="ctr"/>
             <a:r>
-              <a:rPr lang="en-GB" sz="3600" dirty="0">
+              <a:rPr lang="en-GB" sz="2025" dirty="0">
                 <a:cs typeface="Microsoft Tai Le" panose="020B0502040204020203" pitchFamily="34" charset="0"/>
               </a:rPr>
               <a:t>10 min programming challenge!</a:t>
@@ -3448,8 +3398,8 @@
         </p:nvSpPr>
         <p:spPr>
           <a:xfrm>
-            <a:off x="4051611" y="633981"/>
-            <a:ext cx="9669587" cy="523220"/>
+            <a:off x="2279100" y="342244"/>
+            <a:ext cx="5439306" cy="334707"/>
           </a:xfrm>
           <a:prstGeom prst="rect">
             <a:avLst/>
@@ -3464,10 +3414,10 @@
           <a:p>
             <a:pPr algn="ctr"/>
             <a:r>
-              <a:rPr lang="en-GB" sz="2800" dirty="0"/>
+              <a:rPr lang="en-GB" sz="1575" dirty="0"/>
               <a:t>How many programming tasks can you complete in 10 minutes? </a:t>
             </a:r>
-            <a:endParaRPr lang="en-US" sz="2800" dirty="0"/>
+            <a:endParaRPr lang="en-US" sz="1575" dirty="0"/>
           </a:p>
         </p:txBody>
       </p:sp>
@@ -3505,8 +3455,8 @@
         </p:blipFill>
         <p:spPr>
           <a:xfrm>
-            <a:off x="13721198" y="256288"/>
-            <a:ext cx="688605" cy="688605"/>
+            <a:off x="7718406" y="144218"/>
+            <a:ext cx="387352" cy="416367"/>
           </a:xfrm>
           <a:prstGeom prst="rect">
             <a:avLst/>
@@ -3521,8 +3471,8 @@
         </p:nvSpPr>
         <p:spPr>
           <a:xfrm>
-            <a:off x="555255" y="7095263"/>
-            <a:ext cx="6884020" cy="2246769"/>
+            <a:off x="312341" y="4634059"/>
+            <a:ext cx="3872378" cy="1304203"/>
           </a:xfrm>
           <a:prstGeom prst="rect">
             <a:avLst/>
@@ -3535,44 +3485,44 @@
           </a:bodyPr>
           <a:lstStyle/>
           <a:p>
-            <a:pPr marL="514350" indent="-514350">
+            <a:pPr marL="289310" indent="-289310">
               <a:buFont typeface="+mj-lt"/>
               <a:buAutoNum type="arabicPeriod" startAt="3"/>
             </a:pPr>
             <a:r>
-              <a:rPr lang="en-US" sz="2800" dirty="0" smtClean="0"/>
+              <a:rPr lang="en-US" sz="1575" dirty="0"/>
               <a:t>Close the computer by </a:t>
             </a:r>
             <a:r>
-              <a:rPr lang="en-US" sz="2800" smtClean="0"/>
+              <a:rPr lang="en-US" sz="1575"/>
               <a:t>pressing </a:t>
             </a:r>
             <a:r>
-              <a:rPr lang="en-US" sz="2800" b="1" smtClean="0"/>
+              <a:rPr lang="en-US" sz="1575" b="1"/>
               <a:t>E</a:t>
             </a:r>
           </a:p>
           <a:p>
-            <a:pPr marL="514350" indent="-514350">
+            <a:pPr marL="289310" indent="-289310">
               <a:buFont typeface="+mj-lt"/>
               <a:buAutoNum type="arabicPeriod" startAt="3"/>
             </a:pPr>
-            <a:endParaRPr lang="en-US" sz="2800" b="1" dirty="0"/>
-          </a:p>
-          <a:p>
-            <a:pPr marL="514350" indent="-514350">
+            <a:endParaRPr lang="en-US" sz="1575" b="1" dirty="0"/>
+          </a:p>
+          <a:p>
+            <a:pPr marL="289310" indent="-289310">
               <a:buFont typeface="+mj-lt"/>
               <a:buAutoNum type="arabicPeriod" startAt="3"/>
             </a:pPr>
-            <a:endParaRPr lang="en-US" sz="2800" b="1" dirty="0"/>
-          </a:p>
-          <a:p>
-            <a:pPr marL="514350" indent="-514350">
+            <a:endParaRPr lang="en-US" sz="1575" b="1" dirty="0"/>
+          </a:p>
+          <a:p>
+            <a:pPr marL="289310" indent="-289310">
               <a:buFont typeface="+mj-lt"/>
               <a:buAutoNum type="arabicPeriod" startAt="3"/>
             </a:pPr>
             <a:r>
-              <a:rPr lang="en-US" sz="2800" dirty="0" smtClean="0"/>
+              <a:rPr lang="en-US" sz="1575" dirty="0"/>
               <a:t>Right-click with the script in your hand, what happens?</a:t>
             </a:r>
           </a:p>
@@ -3586,8 +3536,8 @@
         </p:nvSpPr>
         <p:spPr>
           <a:xfrm>
-            <a:off x="1311038" y="1247661"/>
-            <a:ext cx="2089197" cy="707886"/>
+            <a:off x="1141638" y="772441"/>
+            <a:ext cx="1175209" cy="438582"/>
           </a:xfrm>
           <a:prstGeom prst="rect">
             <a:avLst/>
@@ -3614,12 +3564,12 @@
           <a:p>
             <a:pPr algn="ctr"/>
             <a:r>
-              <a:rPr lang="en-GB" sz="4000" dirty="0" smtClean="0">
+              <a:rPr lang="en-GB" sz="2250" dirty="0">
                 <a:latin typeface="Minecrafter" pitchFamily="2" charset="0"/>
               </a:rPr>
               <a:t>TASK 1</a:t>
             </a:r>
-            <a:endParaRPr lang="en-GB" sz="4000" dirty="0">
+            <a:endParaRPr lang="en-GB" sz="2250" dirty="0">
               <a:latin typeface="Minecrafter" pitchFamily="2" charset="0"/>
             </a:endParaRPr>
           </a:p>
@@ -3633,8 +3583,8 @@
         </p:nvSpPr>
         <p:spPr>
           <a:xfrm>
-            <a:off x="8611092" y="1157201"/>
-            <a:ext cx="8183981" cy="7848302"/>
+            <a:off x="4826888" y="1134764"/>
+            <a:ext cx="4603628" cy="5424562"/>
           </a:xfrm>
           <a:prstGeom prst="rect">
             <a:avLst/>
@@ -3647,122 +3597,113 @@
           </a:bodyPr>
           <a:lstStyle/>
           <a:p>
-            <a:pPr marL="457200" indent="-457200">
+            <a:pPr marL="257164" indent="-257164">
               <a:buFont typeface="+mj-lt"/>
               <a:buAutoNum type="arabicPeriod" startAt="5"/>
             </a:pPr>
             <a:r>
-              <a:rPr lang="en-US" sz="2800" dirty="0"/>
+              <a:rPr lang="en-US" sz="1575" dirty="0"/>
               <a:t>Next, we’ll look at the script </a:t>
             </a:r>
             <a:r>
-              <a:rPr lang="en-US" sz="2800" dirty="0" smtClean="0"/>
+              <a:rPr lang="en-US" sz="1575" dirty="0"/>
               <a:t>itself, first pause the game by pressing </a:t>
             </a:r>
             <a:r>
-              <a:rPr lang="en-US" sz="2800" b="1" dirty="0" smtClean="0"/>
+              <a:rPr lang="en-US" sz="1575" b="1" dirty="0"/>
               <a:t>Esc</a:t>
             </a:r>
             <a:r>
-              <a:rPr lang="en-US" sz="2800" dirty="0" smtClean="0"/>
+              <a:rPr lang="en-US" sz="1575" dirty="0"/>
               <a:t> </a:t>
             </a:r>
           </a:p>
           <a:p>
-            <a:pPr marL="457200" indent="-457200">
+            <a:pPr marL="257164" indent="-257164">
               <a:buFont typeface="+mj-lt"/>
               <a:buAutoNum type="arabicPeriod" startAt="5"/>
             </a:pPr>
-            <a:endParaRPr lang="en-US" sz="2800" dirty="0" smtClean="0"/>
-          </a:p>
-          <a:p>
-            <a:pPr marL="457200" indent="-457200">
+            <a:endParaRPr lang="en-US" sz="1575" dirty="0" smtClean="0"/>
+          </a:p>
+          <a:p>
+            <a:pPr marL="257164" indent="-257164">
               <a:buFont typeface="+mj-lt"/>
               <a:buAutoNum type="arabicPeriod" startAt="5"/>
             </a:pPr>
-            <a:r>
-              <a:rPr lang="en-US" sz="2800" dirty="0" smtClean="0"/>
-              <a:t>Now look </a:t>
-            </a:r>
-            <a:r>
-              <a:rPr lang="en-US" sz="2800" dirty="0"/>
-              <a:t>on the right hand side of </a:t>
-            </a:r>
-            <a:r>
-              <a:rPr lang="en-US" sz="2800" dirty="0" smtClean="0"/>
-              <a:t>your screen and click the file called </a:t>
-            </a:r>
-            <a:r>
-              <a:rPr lang="en-US" sz="2800" b="1" dirty="0" err="1" smtClean="0"/>
-              <a:t>helloworld.py</a:t>
-            </a:r>
-            <a:r>
-              <a:rPr lang="en-US" sz="2800" b="1" dirty="0" smtClean="0"/>
-              <a:t> 	                               </a:t>
-            </a:r>
-            <a:r>
-              <a:rPr lang="en-US" sz="2800" i="1" dirty="0" smtClean="0"/>
-              <a:t>(</a:t>
-            </a:r>
-            <a:r>
-              <a:rPr lang="en-US" sz="2800" i="1" dirty="0" smtClean="0"/>
-              <a:t>this is the same script as before</a:t>
-            </a:r>
-            <a:r>
-              <a:rPr lang="en-US" sz="2800" i="1" dirty="0" smtClean="0"/>
-              <a:t>,                              </a:t>
-            </a:r>
-            <a:r>
-              <a:rPr lang="en-US" sz="2800" i="1" dirty="0" smtClean="0"/>
-              <a:t>except now we can see the code!)</a:t>
-            </a:r>
-            <a:endParaRPr lang="en-US" sz="2800" b="1" i="1" dirty="0"/>
-          </a:p>
-          <a:p>
-            <a:pPr marL="342900" indent="-342900">
+            <a:endParaRPr lang="en-US" sz="1575" dirty="0"/>
+          </a:p>
+          <a:p>
+            <a:pPr marL="257164" indent="-257164">
               <a:buFont typeface="+mj-lt"/>
               <a:buAutoNum type="arabicPeriod" startAt="5"/>
             </a:pPr>
-            <a:endParaRPr lang="en-US" sz="2800" dirty="0" smtClean="0"/>
-          </a:p>
-          <a:p>
-            <a:pPr marL="342900" indent="-342900">
+            <a:r>
+              <a:rPr lang="en-US" sz="1575" dirty="0"/>
+              <a:t>Now look </a:t>
+            </a:r>
+            <a:r>
+              <a:rPr lang="en-US" sz="1575" dirty="0"/>
+              <a:t>on the right hand side of </a:t>
+            </a:r>
+            <a:r>
+              <a:rPr lang="en-US" sz="1575" dirty="0"/>
+              <a:t>your screen and click the file called </a:t>
+            </a:r>
+            <a:r>
+              <a:rPr lang="en-US" sz="1575" b="1" dirty="0" err="1"/>
+              <a:t>helloworld.py</a:t>
+            </a:r>
+            <a:r>
+              <a:rPr lang="en-US" sz="1575" b="1" dirty="0"/>
+              <a:t> 	                               </a:t>
+            </a:r>
+            <a:r>
+              <a:rPr lang="en-US" sz="1575" i="1" dirty="0"/>
+              <a:t>(this is the same script as before,                              except now we can see the code!)</a:t>
+            </a:r>
+            <a:endParaRPr lang="en-US" sz="1575" b="1" i="1" dirty="0"/>
+          </a:p>
+          <a:p>
+            <a:pPr marL="192873" indent="-192873">
               <a:buFont typeface="+mj-lt"/>
               <a:buAutoNum type="arabicPeriod" startAt="5"/>
             </a:pPr>
-            <a:endParaRPr lang="en-US" sz="2800" dirty="0"/>
-          </a:p>
-          <a:p>
-            <a:pPr marL="342900" indent="-342900">
+            <a:endParaRPr lang="en-US" sz="1575" dirty="0"/>
+          </a:p>
+          <a:p>
+            <a:pPr marL="192873" indent="-192873">
               <a:buFont typeface="+mj-lt"/>
               <a:buAutoNum type="arabicPeriod" startAt="5"/>
             </a:pPr>
-            <a:r>
-              <a:rPr lang="en-US" sz="2800" dirty="0" smtClean="0"/>
+            <a:endParaRPr lang="en-US" sz="1575" dirty="0"/>
+          </a:p>
+          <a:p>
+            <a:pPr marL="192873" indent="-192873">
+              <a:buFont typeface="+mj-lt"/>
+              <a:buAutoNum type="arabicPeriod" startAt="5"/>
+            </a:pPr>
+            <a:r>
+              <a:rPr lang="en-US" sz="1575" dirty="0"/>
               <a:t>Find </a:t>
             </a:r>
             <a:r>
-              <a:rPr lang="en-US" sz="2800" dirty="0"/>
+              <a:rPr lang="en-US" sz="1575" dirty="0"/>
               <a:t>the line that </a:t>
             </a:r>
             <a:r>
-              <a:rPr lang="en-US" sz="2800" dirty="0" smtClean="0"/>
-              <a:t>says </a:t>
-            </a:r>
-            <a:r>
-              <a:rPr lang="en-US" sz="2800" dirty="0" smtClean="0"/>
-              <a:t>                    </a:t>
-            </a:r>
-            <a:r>
-              <a:rPr lang="en-US" sz="2800" b="1" dirty="0" err="1" smtClean="0"/>
+              <a:rPr lang="en-US" sz="1575" dirty="0"/>
+              <a:t>says                     </a:t>
+            </a:r>
+            <a:r>
+              <a:rPr lang="en-US" sz="1575" b="1" dirty="0" err="1"/>
               <a:t>mc.postToChat</a:t>
             </a:r>
             <a:r>
-              <a:rPr lang="en-US" sz="2800" b="1" dirty="0" smtClean="0"/>
+              <a:rPr lang="en-US" sz="1575" b="1" dirty="0"/>
               <a:t>(</a:t>
             </a:r>
             <a:r>
-              <a:rPr lang="en-US" sz="2800" dirty="0" smtClean="0">
+              <a:rPr lang="en-US" sz="1575" dirty="0">
                 <a:solidFill>
                   <a:srgbClr val="00B050"/>
                 </a:solidFill>
@@ -3770,7 +3711,7 @@
               <a:t>“</a:t>
             </a:r>
             <a:r>
-              <a:rPr lang="en-US" sz="2800" dirty="0">
+              <a:rPr lang="en-US" sz="1575" dirty="0">
                 <a:solidFill>
                   <a:srgbClr val="00B050"/>
                 </a:solidFill>
@@ -3778,7 +3719,7 @@
               <a:t>Hello World</a:t>
             </a:r>
             <a:r>
-              <a:rPr lang="en-US" sz="2800" dirty="0" smtClean="0">
+              <a:rPr lang="en-US" sz="1575" dirty="0">
                 <a:solidFill>
                   <a:srgbClr val="00B050"/>
                 </a:solidFill>
@@ -3786,75 +3727,121 @@
               <a:t>!”</a:t>
             </a:r>
             <a:r>
-              <a:rPr lang="en-US" sz="2800" b="1" dirty="0" smtClean="0"/>
+              <a:rPr lang="en-US" sz="1575" b="1" dirty="0"/>
               <a:t>)</a:t>
             </a:r>
             <a:r>
-              <a:rPr lang="en-US" sz="2800" dirty="0" smtClean="0"/>
-              <a:t> </a:t>
-            </a:r>
-            <a:r>
-              <a:rPr lang="en-US" sz="2800" dirty="0" smtClean="0"/>
-              <a:t>                              </a:t>
-            </a:r>
-            <a:r>
-              <a:rPr lang="en-US" sz="2800" i="1" dirty="0" smtClean="0"/>
-              <a:t>(</a:t>
-            </a:r>
-            <a:r>
-              <a:rPr lang="en-US" sz="2800" i="1" dirty="0" smtClean="0"/>
-              <a:t>this is called a FUNCTION, functions tell the computer what to do)</a:t>
-            </a:r>
-            <a:endParaRPr lang="en-US" sz="2800" i="1" dirty="0"/>
-          </a:p>
-          <a:p>
-            <a:pPr marL="342900" indent="-342900">
+              <a:rPr lang="en-US" sz="1575" dirty="0"/>
+              <a:t>                               </a:t>
+            </a:r>
+            <a:r>
+              <a:rPr lang="en-US" sz="1575" i="1" dirty="0"/>
+              <a:t>(this is called a FUNCTION</a:t>
+            </a:r>
+            <a:r>
+              <a:rPr lang="en-US" sz="1575" i="1" dirty="0" smtClean="0"/>
+              <a:t>,                                   </a:t>
+            </a:r>
+            <a:r>
+              <a:rPr lang="en-US" sz="1575" i="1" dirty="0"/>
+              <a:t>functions tell the computer </a:t>
+            </a:r>
+            <a:r>
+              <a:rPr lang="en-US" sz="1575" i="1" dirty="0" smtClean="0"/>
+              <a:t>                                      what </a:t>
+            </a:r>
+            <a:r>
+              <a:rPr lang="en-US" sz="1575" i="1" dirty="0"/>
+              <a:t>to do)</a:t>
+            </a:r>
+            <a:endParaRPr lang="en-US" sz="1575" i="1" dirty="0"/>
+          </a:p>
+          <a:p>
+            <a:pPr marL="192873" indent="-192873">
               <a:buFont typeface="+mj-lt"/>
               <a:buAutoNum type="arabicPeriod" startAt="5"/>
             </a:pPr>
-            <a:endParaRPr lang="en-US" sz="2800" dirty="0"/>
-          </a:p>
-          <a:p>
-            <a:pPr marL="342900" indent="-342900">
+            <a:endParaRPr lang="en-US" sz="1575" dirty="0" smtClean="0"/>
+          </a:p>
+          <a:p>
+            <a:pPr marL="192873" indent="-192873">
               <a:buFont typeface="+mj-lt"/>
               <a:buAutoNum type="arabicPeriod" startAt="5"/>
             </a:pPr>
-            <a:r>
-              <a:rPr lang="en-US" sz="2800" dirty="0"/>
-              <a:t>Change </a:t>
-            </a:r>
-            <a:r>
-              <a:rPr lang="en-US" sz="2800" dirty="0" smtClean="0"/>
-              <a:t>“</a:t>
-            </a:r>
-            <a:r>
-              <a:rPr lang="en-US" sz="2800" dirty="0"/>
-              <a:t>World” to </a:t>
-            </a:r>
-            <a:r>
-              <a:rPr lang="en-US" sz="2800" dirty="0" smtClean="0"/>
-              <a:t>“your name” and then save the file</a:t>
-            </a:r>
-            <a:endParaRPr lang="en-US" sz="2800" dirty="0"/>
-          </a:p>
-          <a:p>
-            <a:pPr marL="342900" indent="-342900">
+            <a:endParaRPr lang="en-US" sz="1575" dirty="0"/>
+          </a:p>
+          <a:p>
+            <a:pPr marL="192873" indent="-192873">
               <a:buFont typeface="+mj-lt"/>
               <a:buAutoNum type="arabicPeriod" startAt="5"/>
             </a:pPr>
-            <a:endParaRPr lang="en-US" sz="2800" dirty="0"/>
-          </a:p>
-          <a:p>
-            <a:pPr marL="342900" indent="-342900">
+            <a:r>
+              <a:rPr lang="en-US" sz="1575" dirty="0"/>
+              <a:t>Change </a:t>
+            </a:r>
+            <a:r>
+              <a:rPr lang="en-US" sz="1575" b="1" dirty="0">
+                <a:solidFill>
+                  <a:srgbClr val="00B050"/>
+                </a:solidFill>
+              </a:rPr>
+              <a:t>“</a:t>
+            </a:r>
+            <a:r>
+              <a:rPr lang="en-US" sz="1575" b="1" dirty="0">
+                <a:solidFill>
+                  <a:srgbClr val="00B050"/>
+                </a:solidFill>
+              </a:rPr>
+              <a:t>World” </a:t>
+            </a:r>
+            <a:r>
+              <a:rPr lang="en-US" sz="1575" dirty="0"/>
+              <a:t>to </a:t>
+            </a:r>
+            <a:r>
+              <a:rPr lang="en-US" sz="1575" b="1" dirty="0">
+                <a:solidFill>
+                  <a:srgbClr val="00B050"/>
+                </a:solidFill>
+              </a:rPr>
+              <a:t>“your name” </a:t>
+            </a:r>
+            <a:r>
+              <a:rPr lang="en-US" sz="1575" dirty="0"/>
+              <a:t>and then save the </a:t>
+            </a:r>
+            <a:r>
+              <a:rPr lang="en-US" sz="1575" dirty="0" smtClean="0"/>
+              <a:t>file by holding the ctrl key and pressing s</a:t>
+            </a:r>
+            <a:endParaRPr lang="en-US" sz="1575" dirty="0"/>
+          </a:p>
+          <a:p>
+            <a:pPr marL="192873" indent="-192873">
               <a:buFont typeface="+mj-lt"/>
               <a:buAutoNum type="arabicPeriod" startAt="5"/>
             </a:pPr>
-            <a:r>
-              <a:rPr lang="en-US" sz="2800" dirty="0" smtClean="0"/>
+            <a:endParaRPr lang="en-US" sz="1575" dirty="0" smtClean="0"/>
+          </a:p>
+          <a:p>
+            <a:pPr marL="192873" indent="-192873">
+              <a:buFont typeface="+mj-lt"/>
+              <a:buAutoNum type="arabicPeriod" startAt="5"/>
+            </a:pPr>
+            <a:endParaRPr lang="en-US" sz="1575" dirty="0"/>
+          </a:p>
+          <a:p>
+            <a:pPr marL="192873" indent="-192873">
+              <a:buFont typeface="+mj-lt"/>
+              <a:buAutoNum type="arabicPeriod" startAt="5"/>
+            </a:pPr>
+            <a:r>
+              <a:rPr lang="en-US" sz="1575" dirty="0"/>
               <a:t>Repeat steps 1, 2, 3, and 4. </a:t>
             </a:r>
             <a:r>
-              <a:rPr lang="en-US" sz="2800" dirty="0"/>
+              <a:rPr lang="en-US" sz="1575" dirty="0"/>
               <a:t>What changed?</a:t>
             </a:r>
           </a:p>
@@ -3882,8 +3869,8 @@
         </p:blipFill>
         <p:spPr>
           <a:xfrm>
-            <a:off x="5729917" y="1969236"/>
-            <a:ext cx="1763704" cy="1763704"/>
+            <a:off x="3404581" y="1214837"/>
+            <a:ext cx="992113" cy="1066427"/>
           </a:xfrm>
           <a:prstGeom prst="rect">
             <a:avLst/>
@@ -3898,8 +3885,8 @@
         </p:nvSpPr>
         <p:spPr>
           <a:xfrm>
-            <a:off x="494031" y="1978550"/>
-            <a:ext cx="5160174" cy="954107"/>
+            <a:off x="293317" y="1198044"/>
+            <a:ext cx="2902685" cy="577081"/>
           </a:xfrm>
           <a:prstGeom prst="rect">
             <a:avLst/>
@@ -3911,27 +3898,27 @@
           </a:bodyPr>
           <a:lstStyle/>
           <a:p>
-            <a:pPr marL="514350" indent="-514350">
+            <a:pPr marL="289310" indent="-289310">
               <a:buFont typeface="+mj-lt"/>
               <a:buAutoNum type="arabicPeriod"/>
             </a:pPr>
             <a:r>
-              <a:rPr lang="en-US" sz="2800" dirty="0" smtClean="0"/>
+              <a:rPr lang="en-US" sz="1575" dirty="0"/>
               <a:t>Load </a:t>
             </a:r>
             <a:r>
-              <a:rPr lang="en-US" sz="2800" b="1" dirty="0" smtClean="0"/>
+              <a:rPr lang="en-US" sz="1575" b="1" dirty="0"/>
               <a:t>World1</a:t>
             </a:r>
             <a:r>
-              <a:rPr lang="en-US" sz="2800" dirty="0" smtClean="0"/>
+              <a:rPr lang="en-US" sz="1575" dirty="0"/>
               <a:t> then find </a:t>
             </a:r>
             <a:r>
-              <a:rPr lang="en-US" sz="2800" dirty="0"/>
+              <a:rPr lang="en-US" sz="1575" dirty="0"/>
               <a:t>and right-click the computer block</a:t>
             </a:r>
-            <a:endParaRPr lang="en-GB" sz="2800" dirty="0"/>
+            <a:endParaRPr lang="en-GB" sz="1575" dirty="0"/>
           </a:p>
         </p:txBody>
       </p:sp>
@@ -3943,8 +3930,8 @@
         </p:nvSpPr>
         <p:spPr>
           <a:xfrm>
-            <a:off x="494030" y="3872470"/>
-            <a:ext cx="7626387" cy="1384995"/>
+            <a:off x="291106" y="2350527"/>
+            <a:ext cx="4289972" cy="1061829"/>
           </a:xfrm>
           <a:prstGeom prst="rect">
             <a:avLst/>
@@ -3956,47 +3943,55 @@
           </a:bodyPr>
           <a:lstStyle/>
           <a:p>
-            <a:pPr marL="514350" indent="-514350">
+            <a:pPr marL="289310" indent="-289310">
               <a:buFont typeface="+mj-lt"/>
               <a:buAutoNum type="arabicPeriod" startAt="2"/>
             </a:pPr>
             <a:r>
-              <a:rPr lang="en-US" sz="2800" dirty="0" smtClean="0"/>
+              <a:rPr lang="en-US" sz="1575" dirty="0"/>
               <a:t>Drag the </a:t>
             </a:r>
             <a:r>
-              <a:rPr lang="en-US" sz="2800" dirty="0"/>
+              <a:rPr lang="en-US" sz="1575" dirty="0"/>
               <a:t>yellow and blue </a:t>
             </a:r>
             <a:r>
-              <a:rPr lang="en-US" sz="2800" dirty="0" smtClean="0"/>
+              <a:rPr lang="en-US" sz="1575" dirty="0"/>
               <a:t>item called </a:t>
             </a:r>
             <a:r>
-              <a:rPr lang="en-US" sz="2800" b="1" dirty="0" err="1" smtClean="0"/>
+              <a:rPr lang="en-US" sz="1575" b="1" dirty="0" err="1"/>
               <a:t>helloworld</a:t>
             </a:r>
             <a:r>
-              <a:rPr lang="en-US" sz="2800" b="1" dirty="0" smtClean="0"/>
+              <a:rPr lang="en-US" sz="1575" b="1" dirty="0"/>
               <a:t> </a:t>
             </a:r>
             <a:r>
-              <a:rPr lang="en-US" sz="2800" dirty="0" smtClean="0"/>
+              <a:rPr lang="en-US" sz="1575" dirty="0"/>
               <a:t>to your inventory </a:t>
             </a:r>
             <a:r>
-              <a:rPr lang="en-US" sz="2800" i="1" dirty="0" smtClean="0"/>
-              <a:t>(this is called a SCRIPT, 		          scripts </a:t>
-            </a:r>
-            <a:r>
-              <a:rPr lang="en-US" sz="2800" i="1" dirty="0" smtClean="0"/>
-              <a:t>contain lines </a:t>
-            </a:r>
-            <a:r>
-              <a:rPr lang="en-US" sz="2800" i="1" dirty="0" smtClean="0"/>
+              <a:rPr lang="en-US" sz="1575" i="1" dirty="0"/>
+              <a:t>(this is called a SCRIPT, </a:t>
+            </a:r>
+            <a:r>
+              <a:rPr lang="en-US" sz="1575" i="1" dirty="0" smtClean="0"/>
+              <a:t>scripts </a:t>
+            </a:r>
+            <a:r>
+              <a:rPr lang="en-US" sz="1575" i="1" dirty="0"/>
+              <a:t>contain 	</a:t>
+            </a:r>
+            <a:r>
+              <a:rPr lang="en-US" sz="1575" i="1" dirty="0" smtClean="0"/>
+              <a:t>		         lines </a:t>
+            </a:r>
+            <a:r>
+              <a:rPr lang="en-US" sz="1575" i="1" dirty="0"/>
               <a:t>of code)</a:t>
             </a:r>
-            <a:endParaRPr lang="en-US" sz="2800" i="1" dirty="0"/>
+            <a:endParaRPr lang="en-US" sz="1575" i="1" dirty="0"/>
           </a:p>
         </p:txBody>
       </p:sp>
@@ -4022,8 +4017,8 @@
         </p:blipFill>
         <p:spPr>
           <a:xfrm>
-            <a:off x="5702880" y="4867098"/>
-            <a:ext cx="2339380" cy="2249920"/>
+            <a:off x="2795393" y="2932513"/>
+            <a:ext cx="1652134" cy="1707974"/>
           </a:xfrm>
           <a:prstGeom prst="rect">
             <a:avLst/>
@@ -4038,8 +4033,8 @@
         </p:nvSpPr>
         <p:spPr>
           <a:xfrm rot="16200000" flipH="1">
-            <a:off x="4551769" y="5830228"/>
-            <a:ext cx="1892732" cy="569706"/>
+            <a:off x="1952140" y="3642847"/>
+            <a:ext cx="1370248" cy="402342"/>
           </a:xfrm>
           <a:prstGeom prst="uturnArrow">
             <a:avLst>
@@ -4078,7 +4073,7 @@
           <a:lstStyle/>
           <a:p>
             <a:pPr algn="ctr"/>
-            <a:endParaRPr lang="en-US">
+            <a:endParaRPr lang="en-US" sz="617">
               <a:solidFill>
                 <a:schemeClr val="tx1"/>
               </a:solidFill>
@@ -4094,8 +4089,8 @@
         </p:nvSpPr>
         <p:spPr>
           <a:xfrm>
-            <a:off x="7077455" y="5222501"/>
-            <a:ext cx="738656" cy="290254"/>
+            <a:off x="3703238" y="3173183"/>
+            <a:ext cx="664880" cy="264278"/>
           </a:xfrm>
           <a:prstGeom prst="ellipse">
             <a:avLst/>
@@ -4128,7 +4123,7 @@
           <a:lstStyle/>
           <a:p>
             <a:pPr algn="ctr"/>
-            <a:endParaRPr lang="en-US"/>
+            <a:endParaRPr lang="en-US" sz="617"/>
           </a:p>
         </p:txBody>
       </p:sp>
@@ -4140,8 +4135,8 @@
         </p:nvCxnSpPr>
         <p:spPr>
           <a:xfrm>
-            <a:off x="5486400" y="2707341"/>
-            <a:ext cx="627529" cy="143748"/>
+            <a:off x="3144174" y="1620229"/>
+            <a:ext cx="513305" cy="108102"/>
           </a:xfrm>
           <a:prstGeom prst="straightConnector1">
             <a:avLst/>
@@ -4151,7 +4146,7 @@
               <a:schemeClr val="tx1"/>
             </a:solidFill>
             <a:headEnd w="lg" len="med"/>
-            <a:tailEnd type="triangle" w="lg" len="lg"/>
+            <a:tailEnd type="triangle" w="med" len="sm"/>
           </a:ln>
         </p:spPr>
         <p:style>
@@ -4191,8 +4186,8 @@
         </p:blipFill>
         <p:spPr>
           <a:xfrm>
-            <a:off x="14242373" y="2932657"/>
-            <a:ext cx="2552700" cy="2882900"/>
+            <a:off x="7887069" y="2786063"/>
+            <a:ext cx="1743060" cy="2115981"/>
           </a:xfrm>
           <a:prstGeom prst="rect">
             <a:avLst/>
@@ -4207,8 +4202,8 @@
         </p:nvSpPr>
         <p:spPr>
           <a:xfrm>
-            <a:off x="14611437" y="4135259"/>
-            <a:ext cx="1452283" cy="453279"/>
+            <a:off x="8301912" y="3670305"/>
+            <a:ext cx="816934" cy="312915"/>
           </a:xfrm>
           <a:prstGeom prst="ellipse">
             <a:avLst/>
@@ -4237,11 +4232,16 @@
           </a:fontRef>
         </p:style>
         <p:txBody>
-          <a:bodyPr rtlCol="0" anchor="ctr"/>
+          <a:bodyPr rot="0" spcFirstLastPara="0" vertOverflow="overflow" horzOverflow="overflow" vert="horz" wrap="square" lIns="51437" tIns="25718" rIns="51437" bIns="25718" numCol="1" spcCol="0" rtlCol="0" fromWordArt="0" anchor="ctr" anchorCtr="0" forceAA="0" compatLnSpc="1">
+            <a:prstTxWarp prst="textNoShape">
+              <a:avLst/>
+            </a:prstTxWarp>
+            <a:noAutofit/>
+          </a:bodyPr>
           <a:lstStyle/>
           <a:p>
             <a:pPr algn="ctr"/>
-            <a:endParaRPr lang="en-US"/>
+            <a:endParaRPr lang="en-US" sz="617"/>
           </a:p>
         </p:txBody>
       </p:sp>
@@ -4255,8 +4255,8 @@
         </p:nvCxnSpPr>
         <p:spPr>
           <a:xfrm>
-            <a:off x="13980731" y="3260088"/>
-            <a:ext cx="843388" cy="941552"/>
+            <a:off x="7875022" y="2590262"/>
+            <a:ext cx="546527" cy="1125868"/>
           </a:xfrm>
           <a:prstGeom prst="straightConnector1">
             <a:avLst/>
@@ -4306,14 +4306,48 @@
         </p:blipFill>
         <p:spPr>
           <a:xfrm>
-            <a:off x="3257628" y="169920"/>
-            <a:ext cx="782886" cy="782886"/>
+            <a:off x="1832471" y="97613"/>
+            <a:ext cx="440387" cy="473374"/>
           </a:xfrm>
           <a:prstGeom prst="rect">
             <a:avLst/>
           </a:prstGeom>
         </p:spPr>
       </p:pic>
+      <p:sp>
+        <p:nvSpPr>
+          <p:cNvPr id="37" name="TextBox 36"/>
+          <p:cNvSpPr txBox="1"/>
+          <p:nvPr/>
+        </p:nvSpPr>
+        <p:spPr>
+          <a:xfrm>
+            <a:off x="2316847" y="701728"/>
+            <a:ext cx="2588135" cy="369332"/>
+          </a:xfrm>
+          <a:prstGeom prst="rect">
+            <a:avLst/>
+          </a:prstGeom>
+          <a:noFill/>
+        </p:spPr>
+        <p:txBody>
+          <a:bodyPr wrap="square" rtlCol="0">
+            <a:spAutoFit/>
+          </a:bodyPr>
+          <a:lstStyle/>
+          <a:p>
+            <a:r>
+              <a:rPr lang="en-GB" sz="1800" dirty="0" smtClean="0"/>
+              <a:t>Let’s get started</a:t>
+            </a:r>
+            <a:r>
+              <a:rPr lang="is-IS" sz="1800" dirty="0" smtClean="0"/>
+              <a:t>…</a:t>
+            </a:r>
+            <a:endParaRPr lang="en-US" sz="1800" dirty="0"/>
+          </a:p>
+        </p:txBody>
+      </p:sp>
     </p:spTree>
     <p:extLst>
       <p:ext uri="{BB962C8B-B14F-4D97-AF65-F5344CB8AC3E}">
@@ -4346,45 +4380,47 @@
       </p:grpSpPr>
       <p:pic>
         <p:nvPicPr>
-          <p:cNvPr id="12" name="Picture 11"/>
+          <p:cNvPr id="15" name="Picture 14"/>
           <p:cNvPicPr>
             <a:picLocks noChangeAspect="1"/>
           </p:cNvPicPr>
           <p:nvPr/>
         </p:nvPicPr>
-        <p:blipFill>
+        <p:blipFill rotWithShape="1">
           <a:blip r:embed="rId2">
-            <a:alphaModFix/>
             <a:extLst>
               <a:ext uri="{28A0092B-C50C-407E-A947-70E740481C1C}">
                 <a14:useLocalDpi xmlns:a14="http://schemas.microsoft.com/office/drawing/2010/main" val="0"/>
               </a:ext>
             </a:extLst>
           </a:blip>
-          <a:stretch>
-            <a:fillRect/>
-          </a:stretch>
+          <a:srcRect l="12087" r="11779" b="6250"/>
+          <a:stretch/>
         </p:blipFill>
         <p:spPr>
           <a:xfrm>
-            <a:off x="0" y="-11199"/>
-            <a:ext cx="17666583" cy="9943801"/>
+            <a:off x="0" y="0"/>
+            <a:ext cx="9906000" cy="6858000"/>
           </a:xfrm>
           <a:prstGeom prst="rect">
             <a:avLst/>
           </a:prstGeom>
+          <a:noFill/>
+          <a:ln>
+            <a:noFill/>
+          </a:ln>
         </p:spPr>
       </p:pic>
       <p:sp>
         <p:nvSpPr>
-          <p:cNvPr id="13" name="Rounded Rectangle 12"/>
+          <p:cNvPr id="16" name="Rounded Rectangle 15"/>
           <p:cNvSpPr/>
           <p:nvPr/>
         </p:nvSpPr>
         <p:spPr>
           <a:xfrm>
-            <a:off x="276557" y="197224"/>
-            <a:ext cx="16985714" cy="9579891"/>
+            <a:off x="155569" y="162561"/>
+            <a:ext cx="9554751" cy="6523990"/>
           </a:xfrm>
           <a:prstGeom prst="roundRect">
             <a:avLst/>
@@ -4415,11 +4451,16 @@
           </a:fontRef>
         </p:style>
         <p:txBody>
-          <a:bodyPr rtlCol="0" anchor="ctr"/>
+          <a:bodyPr rot="0" spcFirstLastPara="0" vertOverflow="overflow" horzOverflow="overflow" vert="horz" wrap="square" lIns="51437" tIns="25718" rIns="51437" bIns="25718" numCol="1" spcCol="0" rtlCol="0" fromWordArt="0" anchor="ctr" anchorCtr="0" forceAA="0" compatLnSpc="1">
+            <a:prstTxWarp prst="textNoShape">
+              <a:avLst/>
+            </a:prstTxWarp>
+            <a:noAutofit/>
+          </a:bodyPr>
           <a:lstStyle/>
           <a:p>
             <a:pPr algn="ctr"/>
-            <a:endParaRPr lang="en-US"/>
+            <a:endParaRPr lang="en-US" sz="617"/>
           </a:p>
         </p:txBody>
       </p:sp>
@@ -4431,8 +4472,8 @@
         </p:nvSpPr>
         <p:spPr>
           <a:xfrm>
-            <a:off x="1693248" y="269012"/>
-            <a:ext cx="2089197" cy="707886"/>
+            <a:off x="952480" y="257408"/>
+            <a:ext cx="1175209" cy="438582"/>
           </a:xfrm>
           <a:prstGeom prst="rect">
             <a:avLst/>
@@ -4459,12 +4500,12 @@
           <a:p>
             <a:pPr algn="ctr"/>
             <a:r>
-              <a:rPr lang="en-GB" sz="4000" dirty="0" smtClean="0">
+              <a:rPr lang="en-GB" sz="2250" dirty="0">
                 <a:latin typeface="Minecrafter" pitchFamily="2" charset="0"/>
               </a:rPr>
               <a:t>TASK 2</a:t>
             </a:r>
-            <a:endParaRPr lang="en-GB" sz="4000" dirty="0">
+            <a:endParaRPr lang="en-GB" sz="2250" dirty="0">
               <a:latin typeface="Minecrafter" pitchFamily="2" charset="0"/>
             </a:endParaRPr>
           </a:p>
@@ -4478,8 +4519,8 @@
         </p:nvSpPr>
         <p:spPr>
           <a:xfrm>
-            <a:off x="410888" y="1251993"/>
-            <a:ext cx="5727022" cy="7417415"/>
+            <a:off x="321235" y="790837"/>
+            <a:ext cx="3221547" cy="4939814"/>
           </a:xfrm>
           <a:prstGeom prst="rect">
             <a:avLst/>
@@ -4491,213 +4532,148 @@
           </a:bodyPr>
           <a:lstStyle/>
           <a:p>
-            <a:pPr marL="514350" indent="-514350">
+            <a:pPr marL="289310" indent="-289310">
               <a:buFont typeface="+mj-lt"/>
               <a:buAutoNum type="arabicPeriod"/>
             </a:pPr>
             <a:r>
-              <a:rPr lang="en-US" sz="2800" dirty="0" smtClean="0"/>
+              <a:rPr lang="en-US" sz="1575" dirty="0"/>
               <a:t>From the computer block, take the script called </a:t>
             </a:r>
             <a:r>
-              <a:rPr lang="en-US" sz="2800" b="1" dirty="0" err="1" smtClean="0"/>
+              <a:rPr lang="en-US" sz="1575" b="1" dirty="0" err="1"/>
               <a:t>text_to_blocks</a:t>
             </a:r>
             <a:r>
-              <a:rPr lang="en-US" sz="2800" dirty="0" smtClean="0"/>
-              <a:t>, </a:t>
-            </a:r>
-            <a:r>
-              <a:rPr lang="en-US" sz="2800" dirty="0" smtClean="0"/>
-              <a:t>and drag it to your inventory</a:t>
-            </a:r>
-          </a:p>
-          <a:p>
-            <a:pPr marL="514350" indent="-514350">
+              <a:rPr lang="en-US" sz="1575" dirty="0"/>
+              <a:t>, and drag it to your inventory</a:t>
+            </a:r>
+          </a:p>
+          <a:p>
+            <a:pPr marL="289310" indent="-289310">
               <a:buFont typeface="+mj-lt"/>
               <a:buAutoNum type="arabicPeriod"/>
             </a:pPr>
-            <a:endParaRPr lang="en-US" sz="2800" dirty="0"/>
-          </a:p>
-          <a:p>
-            <a:pPr marL="514350" indent="-514350">
+            <a:endParaRPr lang="en-US" sz="1575" dirty="0"/>
+          </a:p>
+          <a:p>
+            <a:pPr marL="289310" indent="-289310">
               <a:buFont typeface="+mj-lt"/>
               <a:buAutoNum type="arabicPeriod"/>
             </a:pPr>
-            <a:endParaRPr lang="en-US" sz="2800" dirty="0" smtClean="0"/>
-          </a:p>
-          <a:p>
-            <a:pPr marL="514350" indent="-514350">
+            <a:endParaRPr lang="en-US" sz="1575" dirty="0"/>
+          </a:p>
+          <a:p>
+            <a:pPr marL="289310" indent="-289310">
               <a:buFont typeface="+mj-lt"/>
               <a:buAutoNum type="arabicPeriod"/>
             </a:pPr>
-            <a:endParaRPr lang="en-US" sz="2800" dirty="0"/>
-          </a:p>
-          <a:p>
-            <a:pPr marL="514350" indent="-514350">
+            <a:endParaRPr lang="en-US" sz="1575" dirty="0"/>
+          </a:p>
+          <a:p>
+            <a:pPr marL="289310" indent="-289310">
               <a:buFont typeface="+mj-lt"/>
               <a:buAutoNum type="arabicPeriod"/>
             </a:pPr>
-            <a:endParaRPr lang="en-US" sz="2800" dirty="0" smtClean="0"/>
-          </a:p>
-          <a:p>
-            <a:pPr marL="514350" indent="-514350">
+            <a:endParaRPr lang="en-US" sz="1575" dirty="0" smtClean="0"/>
+          </a:p>
+          <a:p>
+            <a:pPr marL="289310" indent="-289310">
               <a:buFont typeface="+mj-lt"/>
               <a:buAutoNum type="arabicPeriod"/>
             </a:pPr>
-            <a:endParaRPr lang="en-US" sz="2800" dirty="0"/>
-          </a:p>
-          <a:p>
-            <a:pPr marL="514350" indent="-514350">
+            <a:endParaRPr lang="en-US" sz="1575" dirty="0"/>
+          </a:p>
+          <a:p>
+            <a:pPr marL="289310" indent="-289310">
               <a:buFont typeface="+mj-lt"/>
               <a:buAutoNum type="arabicPeriod"/>
             </a:pPr>
-            <a:endParaRPr lang="en-US" sz="2800" dirty="0" smtClean="0"/>
-          </a:p>
-          <a:p>
-            <a:pPr marL="514350" indent="-514350">
+            <a:endParaRPr lang="en-US" sz="1575" dirty="0" smtClean="0"/>
+          </a:p>
+          <a:p>
+            <a:pPr marL="289310" indent="-289310">
               <a:buFont typeface="+mj-lt"/>
               <a:buAutoNum type="arabicPeriod"/>
             </a:pPr>
-            <a:endParaRPr lang="en-US" sz="2800" dirty="0" smtClean="0"/>
-          </a:p>
-          <a:p>
-            <a:pPr marL="514350" indent="-514350">
+            <a:endParaRPr lang="en-US" sz="1575" dirty="0"/>
+          </a:p>
+          <a:p>
+            <a:pPr marL="289310" indent="-289310">
               <a:buFont typeface="+mj-lt"/>
               <a:buAutoNum type="arabicPeriod"/>
             </a:pPr>
-            <a:r>
-              <a:rPr lang="en-US" sz="2800" dirty="0" smtClean="0"/>
-              <a:t>Press </a:t>
-            </a:r>
-            <a:r>
-              <a:rPr lang="en-US" sz="2800" b="1" dirty="0" smtClean="0"/>
-              <a:t>E </a:t>
-            </a:r>
-            <a:r>
-              <a:rPr lang="en-US" sz="2800" dirty="0" smtClean="0"/>
-              <a:t> to exit and with the script in your hand, right-click and see what happens</a:t>
-            </a:r>
-            <a:r>
-              <a:rPr lang="is-IS" sz="2800" dirty="0" smtClean="0"/>
-              <a:t>…</a:t>
-            </a:r>
-          </a:p>
-          <a:p>
-            <a:pPr marL="514350" indent="-514350">
+            <a:endParaRPr lang="en-US" sz="1575" dirty="0"/>
+          </a:p>
+          <a:p>
+            <a:pPr marL="289310" indent="-289310">
               <a:buFont typeface="+mj-lt"/>
               <a:buAutoNum type="arabicPeriod"/>
             </a:pPr>
-            <a:endParaRPr lang="is-IS" sz="2800" dirty="0"/>
-          </a:p>
-          <a:p>
-            <a:pPr marL="514350" indent="-514350">
+            <a:endParaRPr lang="en-US" sz="1575" dirty="0"/>
+          </a:p>
+          <a:p>
+            <a:pPr marL="289310" indent="-289310">
               <a:buFont typeface="+mj-lt"/>
               <a:buAutoNum type="arabicPeriod"/>
             </a:pPr>
-            <a:r>
-              <a:rPr lang="en-US" sz="2800" dirty="0"/>
+            <a:endParaRPr lang="en-US" sz="1575" dirty="0"/>
+          </a:p>
+          <a:p>
+            <a:pPr marL="289310" indent="-289310">
+              <a:buFont typeface="+mj-lt"/>
+              <a:buAutoNum type="arabicPeriod"/>
+            </a:pPr>
+            <a:r>
+              <a:rPr lang="en-US" sz="1575" dirty="0"/>
+              <a:t>Press </a:t>
+            </a:r>
+            <a:r>
+              <a:rPr lang="en-US" sz="1575" b="1" dirty="0"/>
+              <a:t>E </a:t>
+            </a:r>
+            <a:r>
+              <a:rPr lang="en-US" sz="1575" dirty="0"/>
+              <a:t> to exit and with the script in your hand, right-click and see what happens</a:t>
+            </a:r>
+            <a:r>
+              <a:rPr lang="is-IS" sz="1575" dirty="0"/>
+              <a:t>…</a:t>
+            </a:r>
+          </a:p>
+          <a:p>
+            <a:pPr marL="289310" indent="-289310">
+              <a:buFont typeface="+mj-lt"/>
+              <a:buAutoNum type="arabicPeriod"/>
+            </a:pPr>
+            <a:endParaRPr lang="is-IS" sz="1575" dirty="0"/>
+          </a:p>
+          <a:p>
+            <a:pPr marL="289310" indent="-289310">
+              <a:buFont typeface="+mj-lt"/>
+              <a:buAutoNum type="arabicPeriod"/>
+            </a:pPr>
+            <a:r>
+              <a:rPr lang="en-US" sz="1575" dirty="0"/>
               <a:t>Pause the game by pressing </a:t>
             </a:r>
             <a:r>
-              <a:rPr lang="en-US" sz="2800" b="1" dirty="0"/>
+              <a:rPr lang="en-US" sz="1575" b="1" dirty="0"/>
               <a:t>Esc </a:t>
             </a:r>
             <a:r>
-              <a:rPr lang="en-US" sz="2800" dirty="0"/>
-              <a:t>and load the file called </a:t>
-            </a:r>
-            <a:r>
-              <a:rPr lang="en-US" sz="2800" b="1" dirty="0" err="1" smtClean="0"/>
+              <a:rPr lang="en-US" sz="1575" dirty="0"/>
+              <a:t>and load the file </a:t>
+            </a:r>
+            <a:r>
+              <a:rPr lang="en-US" sz="1575" dirty="0" smtClean="0"/>
+              <a:t>on the right side called </a:t>
+            </a:r>
+            <a:r>
+              <a:rPr lang="en-US" sz="1575" b="1" dirty="0" err="1"/>
               <a:t>text_to_blocks.py</a:t>
             </a:r>
-            <a:endParaRPr lang="en-US" sz="2800" b="1" dirty="0" smtClean="0"/>
-          </a:p>
-        </p:txBody>
-      </p:sp>
-      <p:pic>
-        <p:nvPicPr>
-          <p:cNvPr id="6" name="Picture 5"/>
-          <p:cNvPicPr>
-            <a:picLocks noChangeAspect="1"/>
-          </p:cNvPicPr>
-          <p:nvPr/>
-        </p:nvPicPr>
-        <p:blipFill>
-          <a:blip r:embed="rId4">
-            <a:extLst>
-              <a:ext uri="{28A0092B-C50C-407E-A947-70E740481C1C}">
-                <a14:useLocalDpi xmlns:a14="http://schemas.microsoft.com/office/drawing/2010/main" val="0"/>
-              </a:ext>
-            </a:extLst>
-          </a:blip>
-          <a:stretch>
-            <a:fillRect/>
-          </a:stretch>
-        </p:blipFill>
-        <p:spPr>
-          <a:xfrm>
-            <a:off x="3782445" y="2848597"/>
-            <a:ext cx="2859363" cy="2389915"/>
-          </a:xfrm>
-          <a:prstGeom prst="rect">
-            <a:avLst/>
-          </a:prstGeom>
-        </p:spPr>
-      </p:pic>
-      <p:sp>
-        <p:nvSpPr>
-          <p:cNvPr id="29" name="U-Turn Arrow 28"/>
-          <p:cNvSpPr/>
-          <p:nvPr/>
-        </p:nvSpPr>
-        <p:spPr>
-          <a:xfrm rot="16200000" flipH="1">
-            <a:off x="2860526" y="3891675"/>
-            <a:ext cx="1975099" cy="554551"/>
-          </a:xfrm>
-          <a:prstGeom prst="uturnArrow">
-            <a:avLst>
-              <a:gd name="adj1" fmla="val 21154"/>
-              <a:gd name="adj2" fmla="val 25000"/>
-              <a:gd name="adj3" fmla="val 25000"/>
-              <a:gd name="adj4" fmla="val 43750"/>
-              <a:gd name="adj5" fmla="val 54333"/>
-            </a:avLst>
-          </a:prstGeom>
-          <a:solidFill>
-            <a:schemeClr val="accent4"/>
-          </a:solidFill>
-          <a:ln>
-            <a:solidFill>
-              <a:schemeClr val="tx1"/>
-            </a:solidFill>
-          </a:ln>
-        </p:spPr>
-        <p:style>
-          <a:lnRef idx="1">
-            <a:schemeClr val="accent4"/>
-          </a:lnRef>
-          <a:fillRef idx="2">
-            <a:schemeClr val="accent4"/>
-          </a:fillRef>
-          <a:effectRef idx="1">
-            <a:schemeClr val="accent4"/>
-          </a:effectRef>
-          <a:fontRef idx="minor">
-            <a:schemeClr val="dk1"/>
-          </a:fontRef>
-        </p:style>
-        <p:txBody>
-          <a:bodyPr rtlCol="0" anchor="ctr"/>
-          <a:lstStyle/>
-          <a:p>
-            <a:pPr algn="ctr"/>
-            <a:endParaRPr lang="en-US">
-              <a:solidFill>
-                <a:schemeClr val="tx1"/>
-              </a:solidFill>
-            </a:endParaRPr>
+            <a:endParaRPr lang="en-US" sz="1575" b="1" dirty="0"/>
           </a:p>
         </p:txBody>
       </p:sp>
@@ -4709,8 +4685,8 @@
         </p:nvSpPr>
         <p:spPr>
           <a:xfrm>
-            <a:off x="3933409" y="187000"/>
-            <a:ext cx="4600991" cy="1077218"/>
+            <a:off x="2149974" y="162561"/>
+            <a:ext cx="2588135" cy="646331"/>
           </a:xfrm>
           <a:prstGeom prst="rect">
             <a:avLst/>
@@ -4724,18 +4700,18 @@
           <a:lstStyle/>
           <a:p>
             <a:r>
-              <a:rPr lang="en-US" sz="3200" dirty="0" smtClean="0"/>
+              <a:rPr lang="en-US" sz="1800" dirty="0"/>
               <a:t>Now we’ll try something a bit </a:t>
             </a:r>
             <a:r>
-              <a:rPr lang="en-US" sz="3200" b="1" dirty="0" smtClean="0"/>
+              <a:rPr lang="en-US" sz="1800" b="1" dirty="0"/>
               <a:t>BIGGER</a:t>
             </a:r>
             <a:r>
-              <a:rPr lang="is-IS" sz="3200" dirty="0" smtClean="0"/>
+              <a:rPr lang="is-IS" sz="1800" dirty="0"/>
               <a:t>…</a:t>
             </a:r>
-            <a:endParaRPr lang="en-US" sz="3200" dirty="0"/>
+            <a:endParaRPr lang="en-US" sz="1800" dirty="0"/>
           </a:p>
         </p:txBody>
       </p:sp>
@@ -4747,8 +4723,8 @@
         </p:nvSpPr>
         <p:spPr>
           <a:xfrm>
-            <a:off x="8833291" y="1251993"/>
-            <a:ext cx="6750904" cy="5262979"/>
+            <a:off x="5026631" y="820176"/>
+            <a:ext cx="3899159" cy="5182188"/>
           </a:xfrm>
           <a:prstGeom prst="rect">
             <a:avLst/>
@@ -4760,151 +4736,318 @@
           </a:bodyPr>
           <a:lstStyle/>
           <a:p>
-            <a:pPr marL="514350" indent="-514350">
+            <a:pPr marL="289310" indent="-289310">
               <a:buFont typeface="+mj-lt"/>
               <a:buAutoNum type="arabicPeriod" startAt="4"/>
             </a:pPr>
             <a:r>
-              <a:rPr lang="en-US" sz="2800" dirty="0" smtClean="0"/>
+              <a:rPr lang="en-US" sz="1575" dirty="0"/>
               <a:t>Now find the lines that say:</a:t>
             </a:r>
           </a:p>
           <a:p>
             <a:pPr lvl="1"/>
             <a:r>
-              <a:rPr lang="en-US" sz="2800" b="1" dirty="0"/>
+              <a:rPr lang="en-US" sz="1575" b="1" dirty="0"/>
               <a:t>word = </a:t>
             </a:r>
             <a:r>
-              <a:rPr lang="en-US" sz="2800" b="1" dirty="0">
+              <a:rPr lang="en-US" sz="1575" b="1" dirty="0">
                 <a:solidFill>
                   <a:srgbClr val="00B050"/>
                 </a:solidFill>
               </a:rPr>
               <a:t>“NGCM”</a:t>
             </a:r>
-            <a:endParaRPr lang="en-US" sz="2800" dirty="0"/>
+            <a:endParaRPr lang="en-US" sz="1575" dirty="0"/>
           </a:p>
           <a:p>
             <a:pPr lvl="1"/>
             <a:r>
-              <a:rPr lang="en-US" sz="2800" b="1" dirty="0" err="1"/>
+              <a:rPr lang="en-US" sz="1575" b="1" dirty="0" err="1"/>
               <a:t>colour</a:t>
             </a:r>
             <a:r>
-              <a:rPr lang="en-US" sz="2800" b="1" dirty="0"/>
+              <a:rPr lang="en-US" sz="1575" b="1" dirty="0"/>
               <a:t> = </a:t>
             </a:r>
             <a:r>
-              <a:rPr lang="en-US" sz="2800" b="1" dirty="0">
+              <a:rPr lang="en-US" sz="1575" b="1" dirty="0">
                 <a:solidFill>
                   <a:srgbClr val="00B050"/>
                 </a:solidFill>
               </a:rPr>
               <a:t>”black”</a:t>
             </a:r>
-            <a:endParaRPr lang="en-US" sz="2800" dirty="0"/>
+            <a:endParaRPr lang="en-US" sz="1575" dirty="0"/>
           </a:p>
           <a:p>
             <a:pPr lvl="1"/>
             <a:r>
-              <a:rPr lang="en-US" sz="2800" dirty="0"/>
+              <a:rPr lang="en-US" sz="1575" dirty="0"/>
               <a:t>and change them to your name and </a:t>
             </a:r>
             <a:r>
-              <a:rPr lang="en-US" sz="2800" dirty="0" err="1"/>
+              <a:rPr lang="en-US" sz="1575" dirty="0" err="1"/>
               <a:t>favourite</a:t>
             </a:r>
             <a:r>
-              <a:rPr lang="en-US" sz="2800" dirty="0"/>
+              <a:rPr lang="en-US" sz="1575" dirty="0"/>
               <a:t> </a:t>
             </a:r>
             <a:r>
-              <a:rPr lang="en-US" sz="2800" dirty="0" err="1" smtClean="0"/>
+              <a:rPr lang="en-US" sz="1575" dirty="0" err="1" smtClean="0"/>
               <a:t>colour</a:t>
             </a:r>
             <a:r>
-              <a:rPr lang="en-US" sz="2800" dirty="0" smtClean="0"/>
-              <a:t> </a:t>
-            </a:r>
-            <a:r>
-              <a:rPr lang="en-US" sz="2800" i="1" dirty="0" smtClean="0"/>
-              <a:t>(these are called variables and give the computer important information)</a:t>
-            </a:r>
-          </a:p>
-          <a:p>
-            <a:pPr marL="514350" indent="-514350">
+              <a:rPr lang="en-US" sz="1575" dirty="0" smtClean="0"/>
+              <a:t> from below </a:t>
+            </a:r>
+            <a:r>
+              <a:rPr lang="en-US" sz="1575" i="1" dirty="0"/>
+              <a:t>(these are called variables and give the computer important information</a:t>
+            </a:r>
+            <a:r>
+              <a:rPr lang="en-US" sz="1575" i="1" dirty="0" smtClean="0"/>
+              <a:t>)</a:t>
+            </a:r>
+          </a:p>
+          <a:p>
+            <a:pPr lvl="1"/>
+            <a:endParaRPr lang="en-US" sz="1575" i="1" dirty="0"/>
+          </a:p>
+          <a:p>
+            <a:pPr lvl="1"/>
+            <a:r>
+              <a:rPr lang="en-US" sz="1575" b="1" dirty="0" err="1" smtClean="0"/>
+              <a:t>Colours</a:t>
+            </a:r>
+            <a:r>
+              <a:rPr lang="en-US" sz="1575" b="1" dirty="0" smtClean="0"/>
+              <a:t> to choose from:</a:t>
+            </a:r>
+          </a:p>
+          <a:p>
+            <a:pPr lvl="1"/>
+            <a:endParaRPr lang="en-US" sz="1575" b="1" dirty="0"/>
+          </a:p>
+          <a:p>
+            <a:pPr lvl="1"/>
+            <a:r>
+              <a:rPr lang="en-US" sz="1575" b="1" dirty="0" smtClean="0"/>
+              <a:t>Red		Cyan		Pink</a:t>
+            </a:r>
+          </a:p>
+          <a:p>
+            <a:pPr lvl="1"/>
+            <a:r>
+              <a:rPr lang="en-US" sz="1575" b="1" dirty="0" smtClean="0"/>
+              <a:t>Orange		Blue		Black</a:t>
+            </a:r>
+          </a:p>
+          <a:p>
+            <a:pPr lvl="1"/>
+            <a:r>
+              <a:rPr lang="en-US" sz="1575" b="1" dirty="0" smtClean="0"/>
+              <a:t>Yellow		Light Blue	Gray</a:t>
+            </a:r>
+          </a:p>
+          <a:p>
+            <a:pPr lvl="1"/>
+            <a:r>
+              <a:rPr lang="en-US" sz="1575" b="1" dirty="0" smtClean="0"/>
+              <a:t>Green		Magenta	Light Gray</a:t>
+            </a:r>
+          </a:p>
+          <a:p>
+            <a:pPr lvl="1"/>
+            <a:r>
+              <a:rPr lang="en-US" sz="1575" b="1" dirty="0" smtClean="0"/>
+              <a:t>Lime		Purple		White</a:t>
+            </a:r>
+          </a:p>
+          <a:p>
+            <a:pPr lvl="1"/>
+            <a:r>
+              <a:rPr lang="en-US" sz="1575" b="1" dirty="0" smtClean="0"/>
+              <a:t>Brown</a:t>
+            </a:r>
+            <a:endParaRPr lang="en-US" sz="1575" b="1" dirty="0"/>
+          </a:p>
+          <a:p>
+            <a:pPr marL="289310" indent="-289310">
               <a:buFont typeface="+mj-lt"/>
               <a:buAutoNum type="arabicPeriod" startAt="4"/>
             </a:pPr>
-            <a:endParaRPr lang="en-US" sz="2800" dirty="0" smtClean="0"/>
-          </a:p>
-          <a:p>
-            <a:pPr marL="514350" indent="-514350">
+            <a:endParaRPr lang="en-US" sz="1575" dirty="0"/>
+          </a:p>
+          <a:p>
+            <a:pPr marL="289310" indent="-289310">
               <a:buFont typeface="+mj-lt"/>
               <a:buAutoNum type="arabicPeriod" startAt="4"/>
             </a:pPr>
             <a:r>
-              <a:rPr lang="en-US" sz="2800" dirty="0" smtClean="0"/>
+              <a:rPr lang="en-US" sz="1575" dirty="0"/>
               <a:t>After saving the file, repeat steps 1 and 2 again, what changed this time?</a:t>
             </a:r>
           </a:p>
           <a:p>
             <a:pPr lvl="1"/>
-            <a:endParaRPr lang="en-US" sz="2800" dirty="0"/>
+            <a:endParaRPr lang="en-US" sz="1575" dirty="0"/>
           </a:p>
           <a:p>
             <a:pPr lvl="1"/>
-            <a:endParaRPr lang="en-US" sz="2800" dirty="0"/>
-          </a:p>
-        </p:txBody>
-      </p:sp>
-      <p:sp>
-        <p:nvSpPr>
-          <p:cNvPr id="27" name="Oval 26"/>
-          <p:cNvSpPr/>
+            <a:endParaRPr lang="en-US" sz="1575" dirty="0"/>
+          </a:p>
+        </p:txBody>
+      </p:sp>
+      <p:grpSp>
+        <p:nvGrpSpPr>
+          <p:cNvPr id="3" name="Group 2"/>
+          <p:cNvGrpSpPr/>
           <p:nvPr/>
-        </p:nvSpPr>
-        <p:spPr>
-          <a:xfrm>
-            <a:off x="5460218" y="3284077"/>
-            <a:ext cx="1181589" cy="212696"/>
-          </a:xfrm>
-          <a:prstGeom prst="ellipse">
-            <a:avLst/>
-          </a:prstGeom>
-          <a:noFill/>
-          <a:ln>
+        </p:nvGrpSpPr>
+        <p:grpSpPr>
+          <a:xfrm>
+            <a:off x="1879824" y="1789488"/>
+            <a:ext cx="2260621" cy="1958233"/>
+            <a:chOff x="2008637" y="2245238"/>
+            <a:chExt cx="1727493" cy="1344368"/>
+          </a:xfrm>
+        </p:grpSpPr>
+        <p:pic>
+          <p:nvPicPr>
+            <p:cNvPr id="6" name="Picture 5"/>
+            <p:cNvPicPr>
+              <a:picLocks noChangeAspect="1"/>
+            </p:cNvPicPr>
+            <p:nvPr/>
+          </p:nvPicPr>
+          <p:blipFill>
+            <a:blip r:embed="rId4">
+              <a:extLst>
+                <a:ext uri="{28A0092B-C50C-407E-A947-70E740481C1C}">
+                  <a14:useLocalDpi xmlns:a14="http://schemas.microsoft.com/office/drawing/2010/main" val="0"/>
+                </a:ext>
+              </a:extLst>
+            </a:blip>
+            <a:stretch>
+              <a:fillRect/>
+            </a:stretch>
+          </p:blipFill>
+          <p:spPr>
+            <a:xfrm>
+              <a:off x="2127689" y="2245238"/>
+              <a:ext cx="1608440" cy="1344368"/>
+            </a:xfrm>
+            <a:prstGeom prst="rect">
+              <a:avLst/>
+            </a:prstGeom>
+          </p:spPr>
+        </p:pic>
+        <p:sp>
+          <p:nvSpPr>
+            <p:cNvPr id="29" name="U-Turn Arrow 28"/>
+            <p:cNvSpPr/>
+            <p:nvPr/>
+          </p:nvSpPr>
+          <p:spPr>
+            <a:xfrm rot="16200000" flipH="1">
+              <a:off x="1609095" y="2831987"/>
+              <a:ext cx="1111027" cy="311944"/>
+            </a:xfrm>
+            <a:prstGeom prst="uturnArrow">
+              <a:avLst>
+                <a:gd name="adj1" fmla="val 21154"/>
+                <a:gd name="adj2" fmla="val 25000"/>
+                <a:gd name="adj3" fmla="val 25000"/>
+                <a:gd name="adj4" fmla="val 43750"/>
+                <a:gd name="adj5" fmla="val 54333"/>
+              </a:avLst>
+            </a:prstGeom>
             <a:solidFill>
               <a:schemeClr val="accent4"/>
             </a:solidFill>
-          </a:ln>
-        </p:spPr>
-        <p:style>
-          <a:lnRef idx="2">
-            <a:schemeClr val="accent1">
-              <a:shade val="50000"/>
-            </a:schemeClr>
-          </a:lnRef>
-          <a:fillRef idx="1">
-            <a:schemeClr val="accent1"/>
-          </a:fillRef>
-          <a:effectRef idx="0">
-            <a:schemeClr val="accent1"/>
-          </a:effectRef>
-          <a:fontRef idx="minor">
-            <a:schemeClr val="lt1"/>
-          </a:fontRef>
-        </p:style>
-        <p:txBody>
-          <a:bodyPr rtlCol="0" anchor="ctr"/>
-          <a:lstStyle/>
-          <a:p>
-            <a:pPr algn="ctr"/>
-            <a:endParaRPr lang="en-US"/>
-          </a:p>
-        </p:txBody>
-      </p:sp>
+            <a:ln>
+              <a:solidFill>
+                <a:schemeClr val="tx1"/>
+              </a:solidFill>
+            </a:ln>
+          </p:spPr>
+          <p:style>
+            <a:lnRef idx="1">
+              <a:schemeClr val="accent4"/>
+            </a:lnRef>
+            <a:fillRef idx="2">
+              <a:schemeClr val="accent4"/>
+            </a:fillRef>
+            <a:effectRef idx="1">
+              <a:schemeClr val="accent4"/>
+            </a:effectRef>
+            <a:fontRef idx="minor">
+              <a:schemeClr val="dk1"/>
+            </a:fontRef>
+          </p:style>
+          <p:txBody>
+            <a:bodyPr rtlCol="0" anchor="ctr"/>
+            <a:lstStyle/>
+            <a:p>
+              <a:pPr algn="ctr"/>
+              <a:endParaRPr lang="en-US" sz="617">
+                <a:solidFill>
+                  <a:schemeClr val="tx1"/>
+                </a:solidFill>
+              </a:endParaRPr>
+            </a:p>
+          </p:txBody>
+        </p:sp>
+        <p:sp>
+          <p:nvSpPr>
+            <p:cNvPr id="27" name="Oval 26"/>
+            <p:cNvSpPr/>
+            <p:nvPr/>
+          </p:nvSpPr>
+          <p:spPr>
+            <a:xfrm>
+              <a:off x="3071466" y="2490204"/>
+              <a:ext cx="664664" cy="119645"/>
+            </a:xfrm>
+            <a:prstGeom prst="ellipse">
+              <a:avLst/>
+            </a:prstGeom>
+            <a:noFill/>
+            <a:ln>
+              <a:solidFill>
+                <a:schemeClr val="accent4"/>
+              </a:solidFill>
+            </a:ln>
+          </p:spPr>
+          <p:style>
+            <a:lnRef idx="2">
+              <a:schemeClr val="accent1">
+                <a:shade val="50000"/>
+              </a:schemeClr>
+            </a:lnRef>
+            <a:fillRef idx="1">
+              <a:schemeClr val="accent1"/>
+            </a:fillRef>
+            <a:effectRef idx="0">
+              <a:schemeClr val="accent1"/>
+            </a:effectRef>
+            <a:fontRef idx="minor">
+              <a:schemeClr val="lt1"/>
+            </a:fontRef>
+          </p:style>
+          <p:txBody>
+            <a:bodyPr rtlCol="0" anchor="ctr"/>
+            <a:lstStyle/>
+            <a:p>
+              <a:pPr algn="ctr"/>
+              <a:endParaRPr lang="en-US" sz="617"/>
+            </a:p>
+          </p:txBody>
+        </p:sp>
+      </p:grpSp>
     </p:spTree>
     <p:extLst>
       <p:ext uri="{BB962C8B-B14F-4D97-AF65-F5344CB8AC3E}">
@@ -4937,45 +5080,47 @@
       </p:grpSpPr>
       <p:pic>
         <p:nvPicPr>
-          <p:cNvPr id="12" name="Picture 11"/>
+          <p:cNvPr id="15" name="Picture 14"/>
           <p:cNvPicPr>
             <a:picLocks noChangeAspect="1"/>
           </p:cNvPicPr>
           <p:nvPr/>
         </p:nvPicPr>
-        <p:blipFill>
+        <p:blipFill rotWithShape="1">
           <a:blip r:embed="rId2">
-            <a:alphaModFix/>
             <a:extLst>
               <a:ext uri="{28A0092B-C50C-407E-A947-70E740481C1C}">
                 <a14:useLocalDpi xmlns:a14="http://schemas.microsoft.com/office/drawing/2010/main" val="0"/>
               </a:ext>
             </a:extLst>
           </a:blip>
-          <a:stretch>
-            <a:fillRect/>
-          </a:stretch>
+          <a:srcRect l="12087" r="11779" b="6250"/>
+          <a:stretch/>
         </p:blipFill>
         <p:spPr>
           <a:xfrm>
-            <a:off x="0" y="-11199"/>
-            <a:ext cx="17666583" cy="9943801"/>
+            <a:off x="0" y="0"/>
+            <a:ext cx="9906000" cy="6858000"/>
           </a:xfrm>
           <a:prstGeom prst="rect">
             <a:avLst/>
           </a:prstGeom>
+          <a:noFill/>
+          <a:ln>
+            <a:noFill/>
+          </a:ln>
         </p:spPr>
       </p:pic>
       <p:sp>
         <p:nvSpPr>
-          <p:cNvPr id="13" name="Rounded Rectangle 12"/>
+          <p:cNvPr id="16" name="Rounded Rectangle 15"/>
           <p:cNvSpPr/>
           <p:nvPr/>
         </p:nvSpPr>
         <p:spPr>
           <a:xfrm>
-            <a:off x="340434" y="187001"/>
-            <a:ext cx="16985714" cy="9566600"/>
+            <a:off x="155569" y="162561"/>
+            <a:ext cx="9554751" cy="6523990"/>
           </a:xfrm>
           <a:prstGeom prst="roundRect">
             <a:avLst/>
@@ -5006,11 +5151,16 @@
           </a:fontRef>
         </p:style>
         <p:txBody>
-          <a:bodyPr rtlCol="0" anchor="ctr"/>
+          <a:bodyPr rot="0" spcFirstLastPara="0" vertOverflow="overflow" horzOverflow="overflow" vert="horz" wrap="square" lIns="51437" tIns="25718" rIns="51437" bIns="25718" numCol="1" spcCol="0" rtlCol="0" fromWordArt="0" anchor="ctr" anchorCtr="0" forceAA="0" compatLnSpc="1">
+            <a:prstTxWarp prst="textNoShape">
+              <a:avLst/>
+            </a:prstTxWarp>
+            <a:noAutofit/>
+          </a:bodyPr>
           <a:lstStyle/>
           <a:p>
             <a:pPr algn="ctr"/>
-            <a:endParaRPr lang="en-US"/>
+            <a:endParaRPr lang="en-US" sz="617"/>
           </a:p>
         </p:txBody>
       </p:sp>
@@ -5022,8 +5172,8 @@
         </p:nvSpPr>
         <p:spPr>
           <a:xfrm>
-            <a:off x="1693248" y="269012"/>
-            <a:ext cx="2089197" cy="707886"/>
+            <a:off x="959615" y="266435"/>
+            <a:ext cx="1175209" cy="438582"/>
           </a:xfrm>
           <a:prstGeom prst="rect">
             <a:avLst/>
@@ -5050,18 +5200,12 @@
           <a:p>
             <a:pPr algn="ctr"/>
             <a:r>
-              <a:rPr lang="en-GB" sz="4000" dirty="0" smtClean="0">
+              <a:rPr lang="en-GB" sz="2250" dirty="0">
                 <a:latin typeface="Minecrafter" pitchFamily="2" charset="0"/>
               </a:rPr>
-              <a:t>TASK </a:t>
-            </a:r>
-            <a:r>
-              <a:rPr lang="en-GB" sz="4000" dirty="0" smtClean="0">
-                <a:latin typeface="Minecrafter" pitchFamily="2" charset="0"/>
-              </a:rPr>
-              <a:t>3</a:t>
-            </a:r>
-            <a:endParaRPr lang="en-GB" sz="4000" dirty="0">
+              <a:t>TASK 3</a:t>
+            </a:r>
+            <a:endParaRPr lang="en-GB" sz="2250" dirty="0">
               <a:latin typeface="Minecrafter" pitchFamily="2" charset="0"/>
             </a:endParaRPr>
           </a:p>
@@ -5075,8 +5219,8 @@
         </p:nvSpPr>
         <p:spPr>
           <a:xfrm>
-            <a:off x="410887" y="1251993"/>
-            <a:ext cx="7832805" cy="6555641"/>
+            <a:off x="231132" y="1347122"/>
+            <a:ext cx="4406085" cy="4074192"/>
           </a:xfrm>
           <a:prstGeom prst="rect">
             <a:avLst/>
@@ -5089,90 +5233,82 @@
           <a:lstStyle/>
           <a:p>
             <a:r>
-              <a:rPr lang="en-US" sz="2800" dirty="0" smtClean="0"/>
+              <a:rPr lang="en-US" sz="1800" dirty="0"/>
               <a:t>In Minecraft, one of the first things to do is to build a house, but what if you could build one with a single click?</a:t>
             </a:r>
-            <a:endParaRPr lang="en-US" sz="2800" dirty="0"/>
-          </a:p>
-          <a:p>
-            <a:pPr marL="514350" indent="-514350">
+            <a:endParaRPr lang="en-US" sz="1800" dirty="0"/>
+          </a:p>
+          <a:p>
+            <a:pPr marL="289310" indent="-289310">
               <a:buFont typeface="+mj-lt"/>
               <a:buAutoNum type="arabicPeriod"/>
             </a:pPr>
-            <a:endParaRPr lang="en-US" sz="2800" dirty="0" smtClean="0"/>
-          </a:p>
-          <a:p>
-            <a:pPr marL="514350" indent="-514350">
+            <a:endParaRPr lang="en-US" sz="1575" dirty="0"/>
+          </a:p>
+          <a:p>
+            <a:pPr marL="289310" indent="-289310">
               <a:buFont typeface="+mj-lt"/>
               <a:buAutoNum type="arabicPeriod"/>
             </a:pPr>
             <a:r>
-              <a:rPr lang="en-US" sz="2800" dirty="0" smtClean="0"/>
+              <a:rPr lang="en-US" sz="1575" dirty="0"/>
               <a:t>This time we’ll look at the code first, open the file </a:t>
             </a:r>
             <a:r>
-              <a:rPr lang="en-US" sz="2800" b="1" dirty="0" err="1" smtClean="0"/>
+              <a:rPr lang="en-US" sz="1575" b="1" dirty="0" err="1"/>
               <a:t>house.py</a:t>
             </a:r>
             <a:r>
-              <a:rPr lang="en-US" sz="2800" dirty="0"/>
-              <a:t> </a:t>
-            </a:r>
-            <a:r>
-              <a:rPr lang="en-US" sz="2800" dirty="0" smtClean="0"/>
-              <a:t>on the right hand side of your screen</a:t>
-            </a:r>
-          </a:p>
-          <a:p>
-            <a:pPr marL="514350" indent="-514350">
+              <a:rPr lang="en-US" sz="1575" dirty="0"/>
+              <a:t> on the right hand side of your screen</a:t>
+            </a:r>
+          </a:p>
+          <a:p>
+            <a:pPr marL="289310" indent="-289310">
               <a:buFont typeface="+mj-lt"/>
               <a:buAutoNum type="arabicPeriod"/>
             </a:pPr>
-            <a:endParaRPr lang="en-US" sz="2800" dirty="0"/>
-          </a:p>
-          <a:p>
-            <a:pPr marL="514350" indent="-514350">
+            <a:endParaRPr lang="en-US" sz="1575" dirty="0"/>
+          </a:p>
+          <a:p>
+            <a:pPr marL="289310" indent="-289310">
               <a:buFont typeface="+mj-lt"/>
               <a:buAutoNum type="arabicPeriod"/>
             </a:pPr>
             <a:r>
-              <a:rPr lang="en-US" sz="2800" dirty="0" smtClean="0"/>
-              <a:t>This time you’ll notice</a:t>
-            </a:r>
-            <a:r>
-              <a:rPr lang="en-US" sz="2800" dirty="0" smtClean="0"/>
-              <a:t> the variables are whole numbers </a:t>
-            </a:r>
-            <a:r>
-              <a:rPr lang="en-US" sz="2800" i="1" dirty="0" smtClean="0"/>
+              <a:rPr lang="en-US" sz="1575" dirty="0"/>
+              <a:t>This time you’ll notice the variables are whole numbers </a:t>
+            </a:r>
+            <a:r>
+              <a:rPr lang="en-US" sz="1575" i="1" dirty="0"/>
               <a:t>(we call these integers, and are a type of data in programming)</a:t>
             </a:r>
-            <a:endParaRPr lang="en-US" sz="2800" i="1" dirty="0"/>
-          </a:p>
-          <a:p>
-            <a:pPr marL="514350" indent="-514350">
+            <a:endParaRPr lang="en-US" sz="1575" i="1" dirty="0"/>
+          </a:p>
+          <a:p>
+            <a:pPr marL="289310" indent="-289310">
               <a:buFont typeface="+mj-lt"/>
               <a:buAutoNum type="arabicPeriod"/>
             </a:pPr>
-            <a:endParaRPr lang="en-US" sz="2800" dirty="0" smtClean="0"/>
-          </a:p>
-          <a:p>
-            <a:pPr marL="514350" indent="-514350">
+            <a:endParaRPr lang="en-US" sz="1575" dirty="0"/>
+          </a:p>
+          <a:p>
+            <a:pPr marL="289310" indent="-289310">
               <a:buFont typeface="+mj-lt"/>
               <a:buAutoNum type="arabicPeriod"/>
             </a:pPr>
             <a:r>
-              <a:rPr lang="en-US" sz="2800" dirty="0" smtClean="0"/>
+              <a:rPr lang="en-US" sz="1575" dirty="0"/>
               <a:t>Change the length and height variables to how many blocks long, and how many blocks tall you want your house</a:t>
             </a:r>
-            <a:endParaRPr lang="en-US" sz="2800" dirty="0"/>
-          </a:p>
-          <a:p>
-            <a:pPr marL="514350" indent="-514350">
+            <a:endParaRPr lang="en-US" sz="1575" dirty="0"/>
+          </a:p>
+          <a:p>
+            <a:pPr marL="289310" indent="-289310">
               <a:buFont typeface="+mj-lt"/>
               <a:buAutoNum type="arabicPeriod"/>
             </a:pPr>
-            <a:endParaRPr lang="en-US" sz="2800" dirty="0" smtClean="0"/>
+            <a:endParaRPr lang="en-US" sz="1575" dirty="0"/>
           </a:p>
         </p:txBody>
       </p:sp>
@@ -5184,8 +5320,8 @@
         </p:nvSpPr>
         <p:spPr>
           <a:xfrm>
-            <a:off x="3933409" y="187000"/>
-            <a:ext cx="3769387" cy="1077218"/>
+            <a:off x="2212609" y="162561"/>
+            <a:ext cx="2120344" cy="646331"/>
           </a:xfrm>
           <a:prstGeom prst="rect">
             <a:avLst/>
@@ -5199,10 +5335,10 @@
           <a:lstStyle/>
           <a:p>
             <a:r>
-              <a:rPr lang="en-GB" sz="3200" dirty="0" smtClean="0"/>
+              <a:rPr lang="en-GB" sz="1800" dirty="0"/>
               <a:t>How about building a shelter?</a:t>
             </a:r>
-            <a:endParaRPr lang="en-US" sz="3200" dirty="0"/>
+            <a:endParaRPr lang="en-US" sz="1800" dirty="0"/>
           </a:p>
         </p:txBody>
       </p:sp>
@@ -5214,8 +5350,8 @@
         </p:nvSpPr>
         <p:spPr>
           <a:xfrm>
-            <a:off x="9343363" y="2951579"/>
-            <a:ext cx="6750904" cy="5693866"/>
+            <a:off x="5103183" y="2412119"/>
+            <a:ext cx="3797498" cy="3243196"/>
           </a:xfrm>
           <a:prstGeom prst="rect">
             <a:avLst/>
@@ -5227,91 +5363,90 @@
           </a:bodyPr>
           <a:lstStyle/>
           <a:p>
-            <a:pPr marL="514350" indent="-514350">
+            <a:pPr marL="289310" indent="-289310">
               <a:buFont typeface="+mj-lt"/>
               <a:buAutoNum type="arabicPeriod" startAt="4"/>
             </a:pPr>
             <a:r>
-              <a:rPr lang="en-US" sz="2800" dirty="0"/>
+              <a:rPr lang="en-US" sz="1575" dirty="0"/>
               <a:t>Use the script </a:t>
             </a:r>
             <a:r>
-              <a:rPr lang="en-US" sz="2800" b="1" dirty="0"/>
+              <a:rPr lang="en-US" sz="1575" b="1" dirty="0"/>
               <a:t>house</a:t>
             </a:r>
             <a:r>
-              <a:rPr lang="en-US" sz="2800" dirty="0"/>
+              <a:rPr lang="en-US" sz="1575" dirty="0"/>
               <a:t> in the Minecraft world and see what happens</a:t>
             </a:r>
             <a:r>
-              <a:rPr lang="is-IS" sz="2800" dirty="0"/>
+              <a:rPr lang="is-IS" sz="1575" dirty="0"/>
               <a:t>…</a:t>
             </a:r>
-            <a:endParaRPr lang="en-US" sz="2800" dirty="0"/>
-          </a:p>
-          <a:p>
-            <a:pPr marL="514350" indent="-514350">
+            <a:endParaRPr lang="en-US" sz="1575" dirty="0"/>
+          </a:p>
+          <a:p>
+            <a:pPr marL="289310" indent="-289310">
               <a:buFont typeface="+mj-lt"/>
               <a:buAutoNum type="arabicPeriod" startAt="4"/>
             </a:pPr>
-            <a:endParaRPr lang="en-US" sz="2800" dirty="0" smtClean="0"/>
-          </a:p>
-          <a:p>
-            <a:pPr marL="514350" indent="-514350">
+            <a:endParaRPr lang="en-US" sz="1575" dirty="0"/>
+          </a:p>
+          <a:p>
+            <a:pPr marL="289310" indent="-289310">
               <a:buFont typeface="+mj-lt"/>
               <a:buAutoNum type="arabicPeriod" startAt="4"/>
             </a:pPr>
             <a:r>
-              <a:rPr lang="en-US" sz="2800" dirty="0" smtClean="0"/>
+              <a:rPr lang="en-US" sz="1575" dirty="0"/>
               <a:t>Now change the numbers in the script to be bigger than 30</a:t>
             </a:r>
           </a:p>
           <a:p>
-            <a:pPr marL="514350" indent="-514350">
+            <a:pPr marL="289310" indent="-289310">
               <a:buFont typeface="+mj-lt"/>
               <a:buAutoNum type="arabicPeriod" startAt="4"/>
             </a:pPr>
-            <a:endParaRPr lang="en-US" sz="2800" dirty="0"/>
-          </a:p>
-          <a:p>
-            <a:pPr marL="514350" indent="-514350">
+            <a:endParaRPr lang="en-US" sz="1575" dirty="0"/>
+          </a:p>
+          <a:p>
+            <a:pPr marL="289310" indent="-289310">
               <a:buFont typeface="+mj-lt"/>
               <a:buAutoNum type="arabicPeriod" startAt="4"/>
             </a:pPr>
             <a:r>
-              <a:rPr lang="en-US" sz="2800" dirty="0" smtClean="0"/>
+              <a:rPr lang="en-US" sz="1575" dirty="0"/>
               <a:t>When you use the script this time, what happens?</a:t>
             </a:r>
-            <a:endParaRPr lang="en-US" sz="2800" dirty="0"/>
-          </a:p>
-          <a:p>
-            <a:pPr marL="514350" indent="-514350">
+          </a:p>
+          <a:p>
+            <a:pPr marL="289310" indent="-289310">
               <a:buFont typeface="+mj-lt"/>
               <a:buAutoNum type="arabicPeriod" startAt="4"/>
             </a:pPr>
-            <a:endParaRPr lang="en-US" sz="2800" dirty="0" smtClean="0"/>
-          </a:p>
-          <a:p>
-            <a:pPr marL="514350" indent="-514350">
+            <a:endParaRPr lang="en-US" sz="1575" dirty="0"/>
+          </a:p>
+          <a:p>
+            <a:pPr marL="289310" indent="-289310">
               <a:buFont typeface="+mj-lt"/>
               <a:buAutoNum type="arabicPeriod" startAt="4"/>
             </a:pPr>
-            <a:endParaRPr lang="en-US" sz="2800" dirty="0"/>
-          </a:p>
-          <a:p>
-            <a:pPr marL="514350" indent="-514350">
+            <a:endParaRPr lang="en-US" sz="1575" dirty="0"/>
+          </a:p>
+          <a:p>
+            <a:pPr marL="289310" indent="-289310">
               <a:buFont typeface="+mj-lt"/>
               <a:buAutoNum type="arabicPeriod" startAt="4"/>
             </a:pPr>
-            <a:endParaRPr lang="en-US" sz="2800" dirty="0" smtClean="0"/>
+            <a:endParaRPr lang="en-US" sz="1575" dirty="0"/>
           </a:p>
           <a:p>
             <a:pPr lvl="1"/>
-            <a:endParaRPr lang="en-US" sz="2800" dirty="0"/>
+            <a:endParaRPr lang="en-US" sz="1575" dirty="0"/>
           </a:p>
           <a:p>
             <a:pPr lvl="1"/>
-            <a:endParaRPr lang="en-US" sz="2800" dirty="0"/>
+            <a:endParaRPr lang="en-US" sz="1575" dirty="0"/>
           </a:p>
         </p:txBody>
       </p:sp>
@@ -5347,45 +5482,47 @@
       </p:grpSpPr>
       <p:pic>
         <p:nvPicPr>
-          <p:cNvPr id="12" name="Picture 11"/>
+          <p:cNvPr id="8" name="Picture 7"/>
           <p:cNvPicPr>
             <a:picLocks noChangeAspect="1"/>
           </p:cNvPicPr>
           <p:nvPr/>
         </p:nvPicPr>
-        <p:blipFill>
+        <p:blipFill rotWithShape="1">
           <a:blip r:embed="rId2">
-            <a:alphaModFix/>
             <a:extLst>
               <a:ext uri="{28A0092B-C50C-407E-A947-70E740481C1C}">
                 <a14:useLocalDpi xmlns:a14="http://schemas.microsoft.com/office/drawing/2010/main" val="0"/>
               </a:ext>
             </a:extLst>
           </a:blip>
-          <a:stretch>
-            <a:fillRect/>
-          </a:stretch>
+          <a:srcRect l="12087" r="11779" b="6250"/>
+          <a:stretch/>
         </p:blipFill>
         <p:spPr>
           <a:xfrm>
-            <a:off x="0" y="-11199"/>
-            <a:ext cx="17666583" cy="9943801"/>
+            <a:off x="0" y="0"/>
+            <a:ext cx="9906000" cy="6858000"/>
           </a:xfrm>
           <a:prstGeom prst="rect">
             <a:avLst/>
           </a:prstGeom>
+          <a:noFill/>
+          <a:ln>
+            <a:noFill/>
+          </a:ln>
         </p:spPr>
       </p:pic>
       <p:sp>
         <p:nvSpPr>
-          <p:cNvPr id="13" name="Rounded Rectangle 12"/>
+          <p:cNvPr id="9" name="Rounded Rectangle 8"/>
           <p:cNvSpPr/>
           <p:nvPr/>
         </p:nvSpPr>
         <p:spPr>
           <a:xfrm>
-            <a:off x="340434" y="187001"/>
-            <a:ext cx="16985714" cy="9566600"/>
+            <a:off x="155569" y="162561"/>
+            <a:ext cx="9554751" cy="6523990"/>
           </a:xfrm>
           <a:prstGeom prst="roundRect">
             <a:avLst/>
@@ -5416,11 +5553,16 @@
           </a:fontRef>
         </p:style>
         <p:txBody>
-          <a:bodyPr rtlCol="0" anchor="ctr"/>
+          <a:bodyPr rot="0" spcFirstLastPara="0" vertOverflow="overflow" horzOverflow="overflow" vert="horz" wrap="square" lIns="51437" tIns="25718" rIns="51437" bIns="25718" numCol="1" spcCol="0" rtlCol="0" fromWordArt="0" anchor="ctr" anchorCtr="0" forceAA="0" compatLnSpc="1">
+            <a:prstTxWarp prst="textNoShape">
+              <a:avLst/>
+            </a:prstTxWarp>
+            <a:noAutofit/>
+          </a:bodyPr>
           <a:lstStyle/>
           <a:p>
             <a:pPr algn="ctr"/>
-            <a:endParaRPr lang="en-US"/>
+            <a:endParaRPr lang="en-US" sz="617"/>
           </a:p>
         </p:txBody>
       </p:sp>
@@ -5432,8 +5574,8 @@
         </p:nvSpPr>
         <p:spPr>
           <a:xfrm>
-            <a:off x="1693248" y="269012"/>
-            <a:ext cx="2089197" cy="707886"/>
+            <a:off x="951674" y="266600"/>
+            <a:ext cx="1175209" cy="438582"/>
           </a:xfrm>
           <a:prstGeom prst="rect">
             <a:avLst/>
@@ -5460,18 +5602,12 @@
           <a:p>
             <a:pPr algn="ctr"/>
             <a:r>
-              <a:rPr lang="en-GB" sz="4000" dirty="0" smtClean="0">
+              <a:rPr lang="en-GB" sz="2250" dirty="0">
                 <a:latin typeface="Minecrafter" pitchFamily="2" charset="0"/>
               </a:rPr>
-              <a:t>TASK </a:t>
-            </a:r>
-            <a:r>
-              <a:rPr lang="en-GB" sz="4000" dirty="0">
-                <a:latin typeface="Minecrafter" pitchFamily="2" charset="0"/>
-              </a:rPr>
-              <a:t>4</a:t>
-            </a:r>
-            <a:endParaRPr lang="en-GB" sz="4000" dirty="0">
+              <a:t>TASK 4</a:t>
+            </a:r>
+            <a:endParaRPr lang="en-GB" sz="2250" dirty="0">
               <a:latin typeface="Minecrafter" pitchFamily="2" charset="0"/>
             </a:endParaRPr>
           </a:p>
@@ -5485,8 +5621,8 @@
         </p:nvSpPr>
         <p:spPr>
           <a:xfrm>
-            <a:off x="410887" y="1771944"/>
-            <a:ext cx="7832805" cy="6986528"/>
+            <a:off x="231131" y="1117613"/>
+            <a:ext cx="4406085" cy="3970318"/>
           </a:xfrm>
           <a:prstGeom prst="rect">
             <a:avLst/>
@@ -5498,120 +5634,116 @@
           </a:bodyPr>
           <a:lstStyle/>
           <a:p>
-            <a:pPr marL="514350" indent="-514350">
+            <a:pPr marL="289310" indent="-289310">
               <a:buFont typeface="+mj-lt"/>
               <a:buAutoNum type="arabicPeriod"/>
             </a:pPr>
-            <a:endParaRPr lang="en-US" sz="2800" dirty="0" smtClean="0"/>
-          </a:p>
-          <a:p>
-            <a:pPr marL="514350" indent="-514350">
+            <a:endParaRPr lang="en-US" sz="1575" dirty="0"/>
+          </a:p>
+          <a:p>
+            <a:pPr marL="289310" indent="-289310">
               <a:buFont typeface="+mj-lt"/>
               <a:buAutoNum type="arabicPeriod"/>
             </a:pPr>
             <a:r>
-              <a:rPr lang="en-US" sz="2800" dirty="0" smtClean="0"/>
+              <a:rPr lang="en-US" sz="1575" dirty="0"/>
               <a:t>From the computer block, take and use the </a:t>
             </a:r>
             <a:r>
-              <a:rPr lang="en-US" sz="2800" b="1" dirty="0" err="1" smtClean="0"/>
+              <a:rPr lang="en-US" sz="1575" b="1" dirty="0" err="1"/>
               <a:t>SpawnTarget</a:t>
             </a:r>
             <a:r>
-              <a:rPr lang="en-US" sz="2800" dirty="0"/>
-              <a:t> </a:t>
-            </a:r>
-            <a:r>
-              <a:rPr lang="en-US" sz="2800" dirty="0" smtClean="0"/>
-              <a:t>script</a:t>
-            </a:r>
-            <a:endParaRPr lang="en-US" sz="2800" b="1" dirty="0" smtClean="0"/>
-          </a:p>
-          <a:p>
-            <a:pPr marL="514350" indent="-514350">
+              <a:rPr lang="en-US" sz="1575" dirty="0"/>
+              <a:t> script</a:t>
+            </a:r>
+            <a:endParaRPr lang="en-US" sz="1575" b="1" dirty="0"/>
+          </a:p>
+          <a:p>
+            <a:pPr marL="289310" indent="-289310">
               <a:buFont typeface="+mj-lt"/>
               <a:buAutoNum type="arabicPeriod"/>
             </a:pPr>
-            <a:endParaRPr lang="en-US" sz="2800" dirty="0"/>
-          </a:p>
-          <a:p>
-            <a:pPr marL="514350" indent="-514350">
+            <a:endParaRPr lang="en-US" sz="1575" dirty="0"/>
+          </a:p>
+          <a:p>
+            <a:pPr marL="289310" indent="-289310">
               <a:buFont typeface="+mj-lt"/>
               <a:buAutoNum type="arabicPeriod"/>
             </a:pPr>
             <a:r>
-              <a:rPr lang="en-US" sz="2800" dirty="0" smtClean="0"/>
+              <a:rPr lang="en-US" sz="1575" dirty="0"/>
               <a:t>Now take the </a:t>
             </a:r>
             <a:r>
-              <a:rPr lang="en-US" sz="2800" b="1" dirty="0" err="1" smtClean="0"/>
+              <a:rPr lang="en-US" sz="1575" b="1" dirty="0" err="1"/>
               <a:t>FireProjectile</a:t>
             </a:r>
             <a:r>
-              <a:rPr lang="en-US" sz="2800" dirty="0" smtClean="0"/>
+              <a:rPr lang="en-US" sz="1575" dirty="0"/>
               <a:t> script, and aiming at the target, use the script</a:t>
             </a:r>
             <a:r>
-              <a:rPr lang="is-IS" sz="2800" dirty="0" smtClean="0"/>
+              <a:rPr lang="is-IS" sz="1575" dirty="0"/>
               <a:t>…</a:t>
             </a:r>
           </a:p>
           <a:p>
-            <a:pPr marL="514350" indent="-514350">
+            <a:pPr marL="289310" indent="-289310">
               <a:buFont typeface="+mj-lt"/>
               <a:buAutoNum type="arabicPeriod"/>
             </a:pPr>
-            <a:endParaRPr lang="is-IS" sz="2800" i="1" dirty="0"/>
-          </a:p>
-          <a:p>
-            <a:pPr marL="514350" indent="-514350">
+            <a:endParaRPr lang="is-IS" sz="1575" i="1" dirty="0"/>
+          </a:p>
+          <a:p>
+            <a:pPr marL="289310" indent="-289310">
               <a:buFont typeface="+mj-lt"/>
               <a:buAutoNum type="arabicPeriod"/>
             </a:pPr>
             <a:r>
-              <a:rPr lang="is-IS" sz="2800" dirty="0" smtClean="0"/>
+              <a:rPr lang="is-IS" sz="1575" dirty="0"/>
               <a:t>In this piece of code, we can change how fast we want the TNT to go, and how much gravity (the force pulling the TNT down) we want...</a:t>
             </a:r>
           </a:p>
           <a:p>
-            <a:pPr marL="514350" indent="-514350">
+            <a:pPr marL="289310" indent="-289310">
               <a:buFont typeface="+mj-lt"/>
               <a:buAutoNum type="arabicPeriod"/>
             </a:pPr>
-            <a:endParaRPr lang="is-IS" sz="2800" dirty="0"/>
-          </a:p>
-          <a:p>
-            <a:pPr marL="514350" indent="-514350">
+            <a:endParaRPr lang="is-IS" sz="1575" dirty="0"/>
+          </a:p>
+          <a:p>
+            <a:pPr marL="289310" indent="-289310">
               <a:buFont typeface="+mj-lt"/>
               <a:buAutoNum type="arabicPeriod"/>
             </a:pPr>
             <a:r>
-              <a:rPr lang="is-IS" sz="2800" dirty="0" smtClean="0"/>
+              <a:rPr lang="is-IS" sz="1575" dirty="0"/>
               <a:t>Open the </a:t>
             </a:r>
             <a:r>
-              <a:rPr lang="is-IS" sz="2800" b="1" dirty="0" smtClean="0"/>
+              <a:rPr lang="is-IS" sz="1575" b="1" dirty="0"/>
               <a:t>FireProjectile.py</a:t>
             </a:r>
             <a:r>
-              <a:rPr lang="is-IS" sz="2800" dirty="0" smtClean="0"/>
+              <a:rPr lang="is-IS" sz="1575" dirty="0"/>
               <a:t> script on the right, and notice now how we can change the variables within the brackets</a:t>
             </a:r>
-            <a:endParaRPr lang="en-US" sz="2800" dirty="0"/>
-          </a:p>
-          <a:p>
-            <a:pPr marL="514350" indent="-514350">
+            <a:endParaRPr lang="en-US" sz="1575" dirty="0"/>
+          </a:p>
+          <a:p>
+            <a:pPr marL="289310" indent="-289310">
               <a:buFont typeface="+mj-lt"/>
               <a:buAutoNum type="arabicPeriod"/>
             </a:pPr>
-            <a:endParaRPr lang="en-US" sz="2800" dirty="0" smtClean="0"/>
-          </a:p>
-          <a:p>
-            <a:pPr marL="514350" indent="-514350">
+            <a:endParaRPr lang="en-US" sz="1575" dirty="0"/>
+          </a:p>
+          <a:p>
+            <a:pPr marL="289310" indent="-289310">
               <a:buFont typeface="+mj-lt"/>
               <a:buAutoNum type="arabicPeriod"/>
             </a:pPr>
-            <a:endParaRPr lang="en-US" sz="2800" dirty="0" smtClean="0"/>
+            <a:endParaRPr lang="en-US" sz="1575" dirty="0"/>
           </a:p>
         </p:txBody>
       </p:sp>
@@ -5623,8 +5755,8 @@
         </p:nvSpPr>
         <p:spPr>
           <a:xfrm>
-            <a:off x="3933409" y="187000"/>
-            <a:ext cx="5103686" cy="1569660"/>
+            <a:off x="2126883" y="178422"/>
+            <a:ext cx="2870910" cy="923330"/>
           </a:xfrm>
           <a:prstGeom prst="rect">
             <a:avLst/>
@@ -5638,14 +5770,14 @@
           <a:lstStyle/>
           <a:p>
             <a:r>
-              <a:rPr lang="en-GB" sz="3200" dirty="0" smtClean="0"/>
+              <a:rPr lang="en-GB" sz="1800" dirty="0"/>
               <a:t>Now that we’ve built something, let’s blow something up</a:t>
             </a:r>
             <a:r>
-              <a:rPr lang="is-IS" sz="3200" dirty="0" smtClean="0"/>
+              <a:rPr lang="is-IS" sz="1800" dirty="0"/>
               <a:t>…</a:t>
             </a:r>
-            <a:endParaRPr lang="en-US" sz="3200" dirty="0"/>
+            <a:endParaRPr lang="en-US" sz="1800" dirty="0"/>
           </a:p>
         </p:txBody>
       </p:sp>
@@ -5657,8 +5789,8 @@
         </p:nvSpPr>
         <p:spPr>
           <a:xfrm>
-            <a:off x="9377530" y="549038"/>
-            <a:ext cx="6750904" cy="10002738"/>
+            <a:off x="5275019" y="1353625"/>
+            <a:ext cx="3797498" cy="5666936"/>
           </a:xfrm>
           <a:prstGeom prst="rect">
             <a:avLst/>
@@ -5670,16 +5802,16 @@
           </a:bodyPr>
           <a:lstStyle/>
           <a:p>
-            <a:pPr marL="514350" indent="-514350">
+            <a:pPr marL="289310" indent="-289310">
               <a:buFont typeface="+mj-lt"/>
               <a:buAutoNum type="arabicPeriod" startAt="5"/>
             </a:pPr>
             <a:r>
-              <a:rPr lang="en-US" sz="2800" dirty="0" smtClean="0"/>
+              <a:rPr lang="en-US" sz="1575" dirty="0"/>
               <a:t>Change the first number to anything between 1 – 100, and then pick a body from the list below to replace </a:t>
             </a:r>
             <a:r>
-              <a:rPr lang="en-US" sz="2800" b="1" dirty="0" smtClean="0">
+              <a:rPr lang="en-US" sz="1575" b="1" dirty="0">
                 <a:solidFill>
                   <a:srgbClr val="00B050"/>
                 </a:solidFill>
@@ -5687,20 +5819,20 @@
               <a:t>“earth”</a:t>
             </a:r>
             <a:r>
-              <a:rPr lang="en-US" sz="2800" dirty="0" smtClean="0"/>
+              <a:rPr lang="en-US" sz="1575" dirty="0"/>
               <a:t>:</a:t>
             </a:r>
           </a:p>
           <a:p>
-            <a:pPr marL="514350" indent="-514350">
+            <a:pPr marL="289310" indent="-289310">
               <a:buFont typeface="+mj-lt"/>
               <a:buAutoNum type="arabicPeriod" startAt="5"/>
             </a:pPr>
-            <a:endParaRPr lang="en-US" sz="2800" dirty="0" smtClean="0"/>
-          </a:p>
-          <a:p>
-            <a:r>
-              <a:rPr lang="en-US" sz="2800" b="1" dirty="0" smtClean="0">
+            <a:endParaRPr lang="en-US" sz="1575" dirty="0"/>
+          </a:p>
+          <a:p>
+            <a:r>
+              <a:rPr lang="en-US" sz="1575" b="1" dirty="0">
                 <a:solidFill>
                   <a:srgbClr val="00B050"/>
                 </a:solidFill>
@@ -5710,7 +5842,7 @@
           </a:p>
           <a:p>
             <a:r>
-              <a:rPr lang="en-US" sz="2800" b="1" dirty="0" smtClean="0">
+              <a:rPr lang="en-US" sz="1575" b="1" dirty="0">
                 <a:solidFill>
                   <a:srgbClr val="00B050"/>
                 </a:solidFill>
@@ -5720,7 +5852,7 @@
           </a:p>
           <a:p>
             <a:r>
-              <a:rPr lang="en-US" sz="2800" b="1" dirty="0" smtClean="0">
+              <a:rPr lang="en-US" sz="1575" b="1" dirty="0">
                 <a:solidFill>
                   <a:srgbClr val="00B050"/>
                 </a:solidFill>
@@ -5728,7 +5860,7 @@
               <a:t>“</a:t>
             </a:r>
             <a:r>
-              <a:rPr lang="en-US" sz="2800" b="1" dirty="0" err="1" smtClean="0">
+              <a:rPr lang="en-US" sz="1575" b="1" dirty="0" err="1">
                 <a:solidFill>
                   <a:srgbClr val="00B050"/>
                 </a:solidFill>
@@ -5736,7 +5868,7 @@
               <a:t>venus</a:t>
             </a:r>
             <a:r>
-              <a:rPr lang="en-US" sz="2800" b="1" dirty="0" smtClean="0">
+              <a:rPr lang="en-US" sz="1575" b="1" dirty="0">
                 <a:solidFill>
                   <a:srgbClr val="00B050"/>
                 </a:solidFill>
@@ -5746,7 +5878,7 @@
           </a:p>
           <a:p>
             <a:r>
-              <a:rPr lang="en-US" sz="2800" b="1" dirty="0" smtClean="0">
+              <a:rPr lang="en-US" sz="1575" b="1" dirty="0">
                 <a:solidFill>
                   <a:srgbClr val="00B050"/>
                 </a:solidFill>
@@ -5756,7 +5888,7 @@
           </a:p>
           <a:p>
             <a:r>
-              <a:rPr lang="en-US" sz="2800" b="1" dirty="0" smtClean="0">
+              <a:rPr lang="en-US" sz="1575" b="1" dirty="0">
                 <a:solidFill>
                   <a:srgbClr val="00B050"/>
                 </a:solidFill>
@@ -5766,7 +5898,7 @@
           </a:p>
           <a:p>
             <a:r>
-              <a:rPr lang="en-US" sz="2800" b="1" dirty="0" smtClean="0">
+              <a:rPr lang="en-US" sz="1575" b="1" dirty="0">
                 <a:solidFill>
                   <a:srgbClr val="00B050"/>
                 </a:solidFill>
@@ -5774,7 +5906,7 @@
               <a:t>“</a:t>
             </a:r>
             <a:r>
-              <a:rPr lang="en-US" sz="2800" b="1" dirty="0" err="1" smtClean="0">
+              <a:rPr lang="en-US" sz="1575" b="1" dirty="0" err="1">
                 <a:solidFill>
                   <a:srgbClr val="00B050"/>
                 </a:solidFill>
@@ -5782,7 +5914,7 @@
               <a:t>jupiter</a:t>
             </a:r>
             <a:r>
-              <a:rPr lang="en-US" sz="2800" b="1" dirty="0" smtClean="0">
+              <a:rPr lang="en-US" sz="1575" b="1" dirty="0">
                 <a:solidFill>
                   <a:srgbClr val="00B050"/>
                 </a:solidFill>
@@ -5792,7 +5924,7 @@
           </a:p>
           <a:p>
             <a:r>
-              <a:rPr lang="en-US" sz="2800" b="1" dirty="0" smtClean="0">
+              <a:rPr lang="en-US" sz="1575" b="1" dirty="0">
                 <a:solidFill>
                   <a:srgbClr val="00B050"/>
                 </a:solidFill>
@@ -5800,7 +5932,7 @@
               <a:t>“</a:t>
             </a:r>
             <a:r>
-              <a:rPr lang="en-US" sz="2800" b="1" dirty="0" err="1" smtClean="0">
+              <a:rPr lang="en-US" sz="1575" b="1" dirty="0" err="1">
                 <a:solidFill>
                   <a:srgbClr val="00B050"/>
                 </a:solidFill>
@@ -5808,7 +5940,7 @@
               <a:t>saturn</a:t>
             </a:r>
             <a:r>
-              <a:rPr lang="en-US" sz="2800" b="1" dirty="0" smtClean="0">
+              <a:rPr lang="en-US" sz="1575" b="1" dirty="0">
                 <a:solidFill>
                   <a:srgbClr val="00B050"/>
                 </a:solidFill>
@@ -5818,7 +5950,7 @@
           </a:p>
           <a:p>
             <a:r>
-              <a:rPr lang="en-US" sz="2800" b="1" dirty="0" smtClean="0">
+              <a:rPr lang="en-US" sz="1575" b="1" dirty="0">
                 <a:solidFill>
                   <a:srgbClr val="00B050"/>
                 </a:solidFill>
@@ -5826,7 +5958,7 @@
               <a:t>“</a:t>
             </a:r>
             <a:r>
-              <a:rPr lang="en-US" sz="2800" b="1" dirty="0" err="1" smtClean="0">
+              <a:rPr lang="en-US" sz="1575" b="1" dirty="0" err="1">
                 <a:solidFill>
                   <a:srgbClr val="00B050"/>
                 </a:solidFill>
@@ -5834,7 +5966,7 @@
               <a:t>uranus</a:t>
             </a:r>
             <a:r>
-              <a:rPr lang="en-US" sz="2800" b="1" dirty="0" smtClean="0">
+              <a:rPr lang="en-US" sz="1575" b="1" dirty="0">
                 <a:solidFill>
                   <a:srgbClr val="00B050"/>
                 </a:solidFill>
@@ -5844,7 +5976,7 @@
           </a:p>
           <a:p>
             <a:r>
-              <a:rPr lang="en-US" sz="2800" b="1" dirty="0" smtClean="0">
+              <a:rPr lang="en-US" sz="1575" b="1" dirty="0">
                 <a:solidFill>
                   <a:srgbClr val="00B050"/>
                 </a:solidFill>
@@ -5852,7 +5984,7 @@
               <a:t>“</a:t>
             </a:r>
             <a:r>
-              <a:rPr lang="en-US" sz="2800" b="1" dirty="0" err="1" smtClean="0">
+              <a:rPr lang="en-US" sz="1575" b="1" dirty="0" err="1">
                 <a:solidFill>
                   <a:srgbClr val="00B050"/>
                 </a:solidFill>
@@ -5860,7 +5992,7 @@
               <a:t>neptune</a:t>
             </a:r>
             <a:r>
-              <a:rPr lang="en-US" sz="2800" b="1" dirty="0" smtClean="0">
+              <a:rPr lang="en-US" sz="1575" b="1" dirty="0">
                 <a:solidFill>
                   <a:srgbClr val="00B050"/>
                 </a:solidFill>
@@ -5870,7 +6002,7 @@
           </a:p>
           <a:p>
             <a:r>
-              <a:rPr lang="en-US" sz="2800" b="1" dirty="0" smtClean="0">
+              <a:rPr lang="en-US" sz="1575" b="1" dirty="0">
                 <a:solidFill>
                   <a:srgbClr val="00B050"/>
                 </a:solidFill>
@@ -5878,7 +6010,7 @@
               <a:t>“</a:t>
             </a:r>
             <a:r>
-              <a:rPr lang="en-US" sz="2800" b="1" dirty="0" err="1" smtClean="0">
+              <a:rPr lang="en-US" sz="1575" b="1" dirty="0" err="1">
                 <a:solidFill>
                   <a:srgbClr val="00B050"/>
                 </a:solidFill>
@@ -5886,7 +6018,7 @@
               <a:t>pluto</a:t>
             </a:r>
             <a:r>
-              <a:rPr lang="en-US" sz="2800" b="1" dirty="0" smtClean="0">
+              <a:rPr lang="en-US" sz="1575" b="1" dirty="0">
                 <a:solidFill>
                   <a:srgbClr val="00B050"/>
                 </a:solidFill>
@@ -5895,48 +6027,48 @@
             </a:r>
           </a:p>
           <a:p>
-            <a:endParaRPr lang="en-US" sz="2800" b="1" dirty="0">
+            <a:endParaRPr lang="en-US" sz="1575" b="1" dirty="0">
               <a:solidFill>
                 <a:srgbClr val="00B050"/>
               </a:solidFill>
             </a:endParaRPr>
           </a:p>
           <a:p>
-            <a:pPr marL="514350" indent="-514350">
+            <a:pPr marL="289310" indent="-289310">
               <a:buFont typeface="+mj-lt"/>
               <a:buAutoNum type="arabicPeriod" startAt="6"/>
             </a:pPr>
             <a:r>
-              <a:rPr lang="en-US" sz="2800" dirty="0" smtClean="0"/>
+              <a:rPr lang="en-US" sz="1575" dirty="0"/>
               <a:t>Once you’ve done these, if you haven’t run out of time, feel free to have a play with any of the scripts in the computer block</a:t>
             </a:r>
             <a:r>
-              <a:rPr lang="is-IS" sz="2800" dirty="0" smtClean="0"/>
+              <a:rPr lang="is-IS" sz="1575" dirty="0"/>
               <a:t>…</a:t>
             </a:r>
-            <a:endParaRPr lang="en-US" sz="2800" dirty="0" smtClean="0"/>
-          </a:p>
-          <a:p>
-            <a:pPr marL="514350" indent="-514350">
+            <a:endParaRPr lang="en-US" sz="1575" dirty="0"/>
+          </a:p>
+          <a:p>
+            <a:pPr marL="289310" indent="-289310">
               <a:buFont typeface="+mj-lt"/>
               <a:buAutoNum type="arabicPeriod" startAt="5"/>
             </a:pPr>
-            <a:endParaRPr lang="en-US" sz="2800" dirty="0"/>
-          </a:p>
-          <a:p>
-            <a:pPr marL="514350" indent="-514350">
+            <a:endParaRPr lang="en-US" sz="1575" dirty="0"/>
+          </a:p>
+          <a:p>
+            <a:pPr marL="289310" indent="-289310">
               <a:buFont typeface="+mj-lt"/>
               <a:buAutoNum type="arabicPeriod" startAt="5"/>
             </a:pPr>
-            <a:endParaRPr lang="en-US" sz="2800" dirty="0" smtClean="0"/>
+            <a:endParaRPr lang="en-US" sz="1575" dirty="0"/>
           </a:p>
           <a:p>
             <a:pPr lvl="1"/>
-            <a:endParaRPr lang="en-US" sz="2800" dirty="0"/>
+            <a:endParaRPr lang="en-US" sz="1575" dirty="0"/>
           </a:p>
           <a:p>
             <a:pPr lvl="1"/>
-            <a:endParaRPr lang="en-US" sz="2800" dirty="0"/>
+            <a:endParaRPr lang="en-US" sz="1575" dirty="0"/>
           </a:p>
         </p:txBody>
       </p:sp>
@@ -5970,7 +6102,7 @@
         <a:srgbClr val="E7E6E6"/>
       </a:lt2>
       <a:accent1>
-        <a:srgbClr val="5B9BD5"/>
+        <a:srgbClr val="4472C4"/>
       </a:accent1>
       <a:accent2>
         <a:srgbClr val="ED7D31"/>
@@ -5982,7 +6114,7 @@
         <a:srgbClr val="FFC000"/>
       </a:accent4>
       <a:accent5>
-        <a:srgbClr val="4472C4"/>
+        <a:srgbClr val="5B9BD5"/>
       </a:accent5>
       <a:accent6>
         <a:srgbClr val="70AD47"/>

</xml_diff>

<commit_message>
Updated build_house_code.py Moved checkerboard to development folder Edited tasks
</commit_message>
<xml_diff>
--- a/programming_challenge/tasks.horizontal.pptx
+++ b/programming_challenge/tasks.horizontal.pptx
@@ -5790,7 +5790,7 @@
         <p:spPr>
           <a:xfrm>
             <a:off x="5275019" y="1353625"/>
-            <a:ext cx="3797498" cy="5666936"/>
+            <a:ext cx="3797498" cy="5909310"/>
           </a:xfrm>
           <a:prstGeom prst="rect">
             <a:avLst/>
@@ -5816,12 +5816,21 @@
                   <a:srgbClr val="00B050"/>
                 </a:solidFill>
               </a:rPr>
-              <a:t>“earth”</a:t>
-            </a:r>
-            <a:r>
-              <a:rPr lang="en-US" sz="1575" dirty="0"/>
-              <a:t>:</a:t>
-            </a:r>
+              <a:t>“earth</a:t>
+            </a:r>
+            <a:r>
+              <a:rPr lang="en-US" sz="1575" b="1" dirty="0" smtClean="0">
+                <a:solidFill>
+                  <a:srgbClr val="00B050"/>
+                </a:solidFill>
+              </a:rPr>
+              <a:t>” </a:t>
+            </a:r>
+            <a:r>
+              <a:rPr lang="en-US" sz="1575" dirty="0" smtClean="0"/>
+              <a:t>and repeat steps 1, 2, and 3</a:t>
+            </a:r>
+            <a:endParaRPr lang="en-US" sz="1575" dirty="0"/>
           </a:p>
           <a:p>
             <a:pPr marL="289310" indent="-289310">
@@ -6040,7 +6049,15 @@
             </a:pPr>
             <a:r>
               <a:rPr lang="en-US" sz="1575" dirty="0"/>
-              <a:t>Once you’ve done these, if you haven’t run out of time, feel free to have a play with any of the scripts in the computer block</a:t>
+              <a:t>Once </a:t>
+            </a:r>
+            <a:r>
+              <a:rPr lang="en-US" sz="1575" dirty="0" smtClean="0"/>
+              <a:t>you’ve completed the tasks, </a:t>
+            </a:r>
+            <a:r>
+              <a:rPr lang="en-US" sz="1575" dirty="0"/>
+              <a:t>if you haven’t run out of time, feel free to have a play with any of the scripts in the computer block</a:t>
             </a:r>
             <a:r>
               <a:rPr lang="is-IS" sz="1575" dirty="0"/>

</xml_diff>

<commit_message>
Updated tasks with hello and yellow colour
</commit_message>
<xml_diff>
--- a/programming_challenge/tasks.horizontal.pptx
+++ b/programming_challenge/tasks.horizontal.pptx
@@ -200,7 +200,7 @@
           <a:p>
             <a:fld id="{227BA57D-FEB7-7D40-AB44-A416CA343704}" type="datetimeFigureOut">
               <a:rPr lang="en-US" smtClean="0"/>
-              <a:t>2/20/17</a:t>
+              <a:t>2/21/17</a:t>
             </a:fld>
             <a:endParaRPr lang="en-US"/>
           </a:p>
@@ -599,7 +599,7 @@
           <a:p>
             <a:fld id="{95152C5E-F11D-7D48-B0EF-D154E0F808AA}" type="datetimeFigureOut">
               <a:rPr lang="en-US" smtClean="0"/>
-              <a:t>2/20/17</a:t>
+              <a:t>2/21/17</a:t>
             </a:fld>
             <a:endParaRPr lang="en-US"/>
           </a:p>
@@ -764,7 +764,7 @@
           <a:p>
             <a:fld id="{95152C5E-F11D-7D48-B0EF-D154E0F808AA}" type="datetimeFigureOut">
               <a:rPr lang="en-US" smtClean="0"/>
-              <a:t>2/20/17</a:t>
+              <a:t>2/21/17</a:t>
             </a:fld>
             <a:endParaRPr lang="en-US"/>
           </a:p>
@@ -939,7 +939,7 @@
           <a:p>
             <a:fld id="{95152C5E-F11D-7D48-B0EF-D154E0F808AA}" type="datetimeFigureOut">
               <a:rPr lang="en-US" smtClean="0"/>
-              <a:t>2/20/17</a:t>
+              <a:t>2/21/17</a:t>
             </a:fld>
             <a:endParaRPr lang="en-US"/>
           </a:p>
@@ -1104,7 +1104,7 @@
           <a:p>
             <a:fld id="{95152C5E-F11D-7D48-B0EF-D154E0F808AA}" type="datetimeFigureOut">
               <a:rPr lang="en-US" smtClean="0"/>
-              <a:t>2/20/17</a:t>
+              <a:t>2/21/17</a:t>
             </a:fld>
             <a:endParaRPr lang="en-US"/>
           </a:p>
@@ -1343,7 +1343,7 @@
           <a:p>
             <a:fld id="{95152C5E-F11D-7D48-B0EF-D154E0F808AA}" type="datetimeFigureOut">
               <a:rPr lang="en-US" smtClean="0"/>
-              <a:t>2/20/17</a:t>
+              <a:t>2/21/17</a:t>
             </a:fld>
             <a:endParaRPr lang="en-US"/>
           </a:p>
@@ -1570,7 +1570,7 @@
           <a:p>
             <a:fld id="{95152C5E-F11D-7D48-B0EF-D154E0F808AA}" type="datetimeFigureOut">
               <a:rPr lang="en-US" smtClean="0"/>
-              <a:t>2/20/17</a:t>
+              <a:t>2/21/17</a:t>
             </a:fld>
             <a:endParaRPr lang="en-US"/>
           </a:p>
@@ -1932,7 +1932,7 @@
           <a:p>
             <a:fld id="{95152C5E-F11D-7D48-B0EF-D154E0F808AA}" type="datetimeFigureOut">
               <a:rPr lang="en-US" smtClean="0"/>
-              <a:t>2/20/17</a:t>
+              <a:t>2/21/17</a:t>
             </a:fld>
             <a:endParaRPr lang="en-US"/>
           </a:p>
@@ -2045,7 +2045,7 @@
           <a:p>
             <a:fld id="{95152C5E-F11D-7D48-B0EF-D154E0F808AA}" type="datetimeFigureOut">
               <a:rPr lang="en-US" smtClean="0"/>
-              <a:t>2/20/17</a:t>
+              <a:t>2/21/17</a:t>
             </a:fld>
             <a:endParaRPr lang="en-US"/>
           </a:p>
@@ -2135,7 +2135,7 @@
           <a:p>
             <a:fld id="{95152C5E-F11D-7D48-B0EF-D154E0F808AA}" type="datetimeFigureOut">
               <a:rPr lang="en-US" smtClean="0"/>
-              <a:t>2/20/17</a:t>
+              <a:t>2/21/17</a:t>
             </a:fld>
             <a:endParaRPr lang="en-US"/>
           </a:p>
@@ -2407,7 +2407,7 @@
           <a:p>
             <a:fld id="{95152C5E-F11D-7D48-B0EF-D154E0F808AA}" type="datetimeFigureOut">
               <a:rPr lang="en-US" smtClean="0"/>
-              <a:t>2/20/17</a:t>
+              <a:t>2/21/17</a:t>
             </a:fld>
             <a:endParaRPr lang="en-US"/>
           </a:p>
@@ -2659,7 +2659,7 @@
           <a:p>
             <a:fld id="{95152C5E-F11D-7D48-B0EF-D154E0F808AA}" type="datetimeFigureOut">
               <a:rPr lang="en-US" smtClean="0"/>
-              <a:t>2/20/17</a:t>
+              <a:t>2/21/17</a:t>
             </a:fld>
             <a:endParaRPr lang="en-US"/>
           </a:p>
@@ -2867,7 +2867,7 @@
           <a:p>
             <a:fld id="{95152C5E-F11D-7D48-B0EF-D154E0F808AA}" type="datetimeFigureOut">
               <a:rPr lang="en-US" smtClean="0"/>
-              <a:t>2/20/17</a:t>
+              <a:t>2/21/17</a:t>
             </a:fld>
             <a:endParaRPr lang="en-US"/>
           </a:p>
@@ -3569,9 +3569,6 @@
               </a:rPr>
               <a:t>TASK 1</a:t>
             </a:r>
-            <a:endParaRPr lang="en-GB" sz="2250" dirty="0">
-              <a:latin typeface="Minecrafter" pitchFamily="2" charset="0"/>
-            </a:endParaRPr>
           </a:p>
         </p:txBody>
       </p:sp>
@@ -3603,11 +3600,7 @@
             </a:pPr>
             <a:r>
               <a:rPr lang="en-US" sz="1575" dirty="0"/>
-              <a:t>Next, we’ll look at the script </a:t>
-            </a:r>
-            <a:r>
-              <a:rPr lang="en-US" sz="1575" dirty="0"/>
-              <a:t>itself, first pause the game by pressing </a:t>
+              <a:t>Next, we’ll look at the script itself, first pause the game by pressing </a:t>
             </a:r>
             <a:r>
               <a:rPr lang="en-US" sz="1575" b="1" dirty="0"/>
@@ -3639,15 +3632,7 @@
             </a:pPr>
             <a:r>
               <a:rPr lang="en-US" sz="1575" dirty="0"/>
-              <a:t>Now look </a:t>
-            </a:r>
-            <a:r>
-              <a:rPr lang="en-US" sz="1575" dirty="0"/>
-              <a:t>on the right hand side of </a:t>
-            </a:r>
-            <a:r>
-              <a:rPr lang="en-US" sz="1575" dirty="0"/>
-              <a:t>your screen and click the file called </a:t>
+              <a:t>Now look on the right hand side of your screen and click the file called </a:t>
             </a:r>
             <a:r>
               <a:rPr lang="en-US" sz="1575" b="1" dirty="0" err="1"/>
@@ -3684,15 +3669,7 @@
             </a:pPr>
             <a:r>
               <a:rPr lang="en-US" sz="1575" dirty="0"/>
-              <a:t>Find </a:t>
-            </a:r>
-            <a:r>
-              <a:rPr lang="en-US" sz="1575" dirty="0"/>
-              <a:t>the line that </a:t>
-            </a:r>
-            <a:r>
-              <a:rPr lang="en-US" sz="1575" dirty="0"/>
-              <a:t>says                     </a:t>
+              <a:t>Find the line that says                     </a:t>
             </a:r>
             <a:r>
               <a:rPr lang="en-US" sz="1575" b="1" dirty="0" err="1"/>
@@ -3708,23 +3685,7 @@
                   <a:srgbClr val="00B050"/>
                 </a:solidFill>
               </a:rPr>
-              <a:t>“</a:t>
-            </a:r>
-            <a:r>
-              <a:rPr lang="en-US" sz="1575" dirty="0">
-                <a:solidFill>
-                  <a:srgbClr val="00B050"/>
-                </a:solidFill>
-              </a:rPr>
-              <a:t>Hello World</a:t>
-            </a:r>
-            <a:r>
-              <a:rPr lang="en-US" sz="1575" dirty="0">
-                <a:solidFill>
-                  <a:srgbClr val="00B050"/>
-                </a:solidFill>
-              </a:rPr>
-              <a:t>!”</a:t>
+              <a:t>“Hello World!”</a:t>
             </a:r>
             <a:r>
               <a:rPr lang="en-US" sz="1575" b="1" dirty="0"/>
@@ -3754,7 +3715,6 @@
               <a:rPr lang="en-US" sz="1575" i="1" dirty="0"/>
               <a:t>to do)</a:t>
             </a:r>
-            <a:endParaRPr lang="en-US" sz="1575" i="1" dirty="0"/>
           </a:p>
           <a:p>
             <a:pPr marL="192873" indent="-192873">
@@ -3785,15 +3745,7 @@
                   <a:srgbClr val="00B050"/>
                 </a:solidFill>
               </a:rPr>
-              <a:t>“</a:t>
-            </a:r>
-            <a:r>
-              <a:rPr lang="en-US" sz="1575" b="1" dirty="0">
-                <a:solidFill>
-                  <a:srgbClr val="00B050"/>
-                </a:solidFill>
-              </a:rPr>
-              <a:t>World” </a:t>
+              <a:t>“World” </a:t>
             </a:r>
             <a:r>
               <a:rPr lang="en-US" sz="1575" dirty="0"/>
@@ -3838,11 +3790,7 @@
             </a:pPr>
             <a:r>
               <a:rPr lang="en-US" sz="1575" dirty="0"/>
-              <a:t>Repeat steps 1, 2, 3, and 4. </a:t>
-            </a:r>
-            <a:r>
-              <a:rPr lang="en-US" sz="1575" dirty="0"/>
-              <a:t>What changed?</a:t>
+              <a:t>Repeat steps 1, 2, 3, and 4. What changed?</a:t>
             </a:r>
           </a:p>
         </p:txBody>
@@ -3912,11 +3860,7 @@
             </a:r>
             <a:r>
               <a:rPr lang="en-US" sz="1575" dirty="0"/>
-              <a:t> then find </a:t>
-            </a:r>
-            <a:r>
-              <a:rPr lang="en-US" sz="1575" dirty="0"/>
-              <a:t>and right-click the computer block</a:t>
+              <a:t> then find and right-click the computer block</a:t>
             </a:r>
             <a:endParaRPr lang="en-GB" sz="1575" dirty="0"/>
           </a:p>
@@ -3949,15 +3893,7 @@
             </a:pPr>
             <a:r>
               <a:rPr lang="en-US" sz="1575" dirty="0"/>
-              <a:t>Drag the </a:t>
-            </a:r>
-            <a:r>
-              <a:rPr lang="en-US" sz="1575" dirty="0"/>
-              <a:t>yellow and blue </a:t>
-            </a:r>
-            <a:r>
-              <a:rPr lang="en-US" sz="1575" dirty="0"/>
-              <a:t>item called </a:t>
+              <a:t>Drag the yellow and blue item called </a:t>
             </a:r>
             <a:r>
               <a:rPr lang="en-US" sz="1575" b="1" dirty="0" err="1"/>
@@ -3991,7 +3927,6 @@
               <a:rPr lang="en-US" sz="1575" i="1" dirty="0"/>
               <a:t>of code)</a:t>
             </a:r>
-            <a:endParaRPr lang="en-US" sz="1575" i="1" dirty="0"/>
           </a:p>
         </p:txBody>
       </p:sp>
@@ -4505,9 +4440,6 @@
               </a:rPr>
               <a:t>TASK 2</a:t>
             </a:r>
-            <a:endParaRPr lang="en-GB" sz="2250" dirty="0">
-              <a:latin typeface="Minecrafter" pitchFamily="2" charset="0"/>
-            </a:endParaRPr>
           </a:p>
         </p:txBody>
       </p:sp>
@@ -4752,32 +4684,64 @@
               <a:t>word = </a:t>
             </a:r>
             <a:r>
-              <a:rPr lang="en-US" sz="1575" b="1" dirty="0">
+              <a:rPr lang="en-US" sz="1575" b="1" dirty="0" smtClean="0">
                 <a:solidFill>
                   <a:srgbClr val="00B050"/>
                 </a:solidFill>
               </a:rPr>
-              <a:t>“NGCM”</a:t>
-            </a:r>
-            <a:endParaRPr lang="en-US" sz="1575" dirty="0"/>
-          </a:p>
-          <a:p>
-            <a:pPr lvl="1"/>
-            <a:r>
-              <a:rPr lang="en-US" sz="1575" b="1" dirty="0" err="1"/>
-              <a:t>colour</a:t>
-            </a:r>
-            <a:r>
-              <a:rPr lang="en-US" sz="1575" b="1" dirty="0"/>
-              <a:t> = </a:t>
-            </a:r>
-            <a:r>
-              <a:rPr lang="en-US" sz="1575" b="1" dirty="0">
+              <a:t>“</a:t>
+            </a:r>
+            <a:r>
+              <a:rPr lang="en-US" sz="1575" b="1" dirty="0" smtClean="0">
                 <a:solidFill>
                   <a:srgbClr val="00B050"/>
                 </a:solidFill>
               </a:rPr>
-              <a:t>”black”</a:t>
+              <a:t>Hello</a:t>
+            </a:r>
+            <a:r>
+              <a:rPr lang="en-US" sz="1575" b="1" dirty="0" smtClean="0">
+                <a:solidFill>
+                  <a:srgbClr val="00B050"/>
+                </a:solidFill>
+              </a:rPr>
+              <a:t>”</a:t>
+            </a:r>
+            <a:endParaRPr lang="en-US" sz="1575" dirty="0"/>
+          </a:p>
+          <a:p>
+            <a:pPr lvl="1"/>
+            <a:r>
+              <a:rPr lang="en-US" sz="1575" b="1" dirty="0" err="1"/>
+              <a:t>colour</a:t>
+            </a:r>
+            <a:r>
+              <a:rPr lang="en-US" sz="1575" b="1" dirty="0"/>
+              <a:t> = </a:t>
+            </a:r>
+            <a:r>
+              <a:rPr lang="en-US" sz="1575" b="1" dirty="0" smtClean="0">
+                <a:solidFill>
+                  <a:srgbClr val="00B050"/>
+                </a:solidFill>
+              </a:rPr>
+              <a:t>”</a:t>
+            </a:r>
+            <a:r>
+              <a:rPr lang="en-US" sz="1575" b="1" dirty="0" smtClean="0">
+                <a:solidFill>
+                  <a:srgbClr val="00B050"/>
+                </a:solidFill>
+              </a:rPr>
+              <a:t>yellow</a:t>
+            </a:r>
+            <a:r>
+              <a:rPr lang="en-US" sz="1575" b="1" dirty="0" smtClean="0">
+                <a:solidFill>
+                  <a:srgbClr val="00B050"/>
+                </a:solidFill>
+              </a:rPr>
+              <a:t>”</a:t>
             </a:r>
             <a:endParaRPr lang="en-US" sz="1575" dirty="0"/>
           </a:p>
@@ -5205,9 +5169,6 @@
               </a:rPr>
               <a:t>TASK 3</a:t>
             </a:r>
-            <a:endParaRPr lang="en-GB" sz="2250" dirty="0">
-              <a:latin typeface="Minecrafter" pitchFamily="2" charset="0"/>
-            </a:endParaRPr>
           </a:p>
         </p:txBody>
       </p:sp>
@@ -5236,7 +5197,6 @@
               <a:rPr lang="en-US" sz="1800" dirty="0"/>
               <a:t>In Minecraft, one of the first things to do is to build a house, but what if you could build one with a single click?</a:t>
             </a:r>
-            <a:endParaRPr lang="en-US" sz="1800" dirty="0"/>
           </a:p>
           <a:p>
             <a:pPr marL="289310" indent="-289310">
@@ -5283,7 +5243,6 @@
               <a:rPr lang="en-US" sz="1575" i="1" dirty="0"/>
               <a:t>(we call these integers, and are a type of data in programming)</a:t>
             </a:r>
-            <a:endParaRPr lang="en-US" sz="1575" i="1" dirty="0"/>
           </a:p>
           <a:p>
             <a:pPr marL="289310" indent="-289310">
@@ -5301,7 +5260,6 @@
               <a:rPr lang="en-US" sz="1575" dirty="0"/>
               <a:t>Change the length and height variables to how many blocks long, and how many blocks tall you want your house</a:t>
             </a:r>
-            <a:endParaRPr lang="en-US" sz="1575" dirty="0"/>
           </a:p>
           <a:p>
             <a:pPr marL="289310" indent="-289310">
@@ -5607,9 +5565,6 @@
               </a:rPr>
               <a:t>TASK 4</a:t>
             </a:r>
-            <a:endParaRPr lang="en-GB" sz="2250" dirty="0">
-              <a:latin typeface="Minecrafter" pitchFamily="2" charset="0"/>
-            </a:endParaRPr>
           </a:p>
         </p:txBody>
       </p:sp>

</xml_diff>